<commit_message>
Presentatie, laaste versie van de laaste versie.
</commit_message>
<xml_diff>
--- a/doc/presentationV4.pptx
+++ b/doc/presentationV4.pptx
@@ -27,10 +27,10 @@
     <p:sldId id="286" r:id="rId18"/>
     <p:sldId id="273" r:id="rId19"/>
     <p:sldId id="259" r:id="rId20"/>
-    <p:sldId id="280" r:id="rId21"/>
+    <p:sldId id="287" r:id="rId21"/>
     <p:sldId id="283" r:id="rId22"/>
-    <p:sldId id="261" r:id="rId23"/>
-    <p:sldId id="281" r:id="rId24"/>
+    <p:sldId id="288" r:id="rId23"/>
+    <p:sldId id="261" r:id="rId24"/>
     <p:sldId id="284" r:id="rId25"/>
     <p:sldId id="266" r:id="rId26"/>
     <p:sldId id="278" r:id="rId27"/>
@@ -3748,37 +3748,37 @@
     </dgm:pt>
   </dgm:ptLst>
   <dgm:cxnLst>
-    <dgm:cxn modelId="{16AFB758-5B12-499E-B973-C370EDAEC6AA}" type="presOf" srcId="{12C8F8D2-B214-469F-A5B8-137A5A5F5C78}" destId="{A4186596-4516-436E-B7F5-62BEA1A004B1}" srcOrd="1" destOrd="0" presId="urn:microsoft.com/office/officeart/2005/8/layout/process1"/>
-    <dgm:cxn modelId="{0C0067F0-4353-43C3-9EA1-11C636D07D95}" srcId="{A9404D15-0FE2-48C7-B124-F3AA4084C521}" destId="{0C1973F0-E5DA-4261-BF88-4987F488EC8F}" srcOrd="2" destOrd="0" parTransId="{4920E1E6-90CC-4B13-B6A6-36ACD0C94685}" sibTransId="{603E6C79-C511-4DA2-9B83-06FD848A88A9}"/>
-    <dgm:cxn modelId="{2E74ED3E-DE6E-453D-A9E7-77D6F0C32A9F}" type="presOf" srcId="{104819FF-E3FD-4670-BF4C-75691EE1BC2F}" destId="{3060179B-F9E4-4C7A-A2C1-0E6B1FBF79A5}" srcOrd="0" destOrd="0" presId="urn:microsoft.com/office/officeart/2005/8/layout/process1"/>
-    <dgm:cxn modelId="{CBD475DD-8B2D-48E5-8995-85696800DB5E}" type="presOf" srcId="{8455D91F-FCF9-4A14-84B9-0A5D80F085F5}" destId="{B93EC08B-667F-483B-AB6B-DDB49872FC96}" srcOrd="0" destOrd="0" presId="urn:microsoft.com/office/officeart/2005/8/layout/process1"/>
+    <dgm:cxn modelId="{889DB193-109E-46D0-9AE1-7278B9EC4197}" type="presOf" srcId="{2C1CA45A-9E01-425B-A98B-7CB05E79D89F}" destId="{4E210EBB-77AC-4270-8B31-8373F5B94957}" srcOrd="0" destOrd="0" presId="urn:microsoft.com/office/officeart/2005/8/layout/process1"/>
+    <dgm:cxn modelId="{7C844402-D793-4E0F-8BC2-BF63FB7DF95C}" srcId="{A9404D15-0FE2-48C7-B124-F3AA4084C521}" destId="{8455D91F-FCF9-4A14-84B9-0A5D80F085F5}" srcOrd="1" destOrd="0" parTransId="{94806B8D-0FA7-4FB4-A5D7-94786E09FC8B}" sibTransId="{D1B971C2-4C0E-4B5D-A4F9-903AA47838E2}"/>
+    <dgm:cxn modelId="{BAE3115C-FF13-43E7-8E62-71625F88D60A}" srcId="{A9404D15-0FE2-48C7-B124-F3AA4084C521}" destId="{A833BA43-9527-4913-863A-ADCED2EB30D7}" srcOrd="6" destOrd="0" parTransId="{82063D08-BEDF-4B87-AA4E-19E5AF88A199}" sibTransId="{6B709411-2AF7-429D-BEE9-BF01DE9BD075}"/>
     <dgm:cxn modelId="{999033E2-05A1-43ED-9ECA-4019AFBCA3E2}" srcId="{A9404D15-0FE2-48C7-B124-F3AA4084C521}" destId="{104819FF-E3FD-4670-BF4C-75691EE1BC2F}" srcOrd="7" destOrd="0" parTransId="{427F1791-DE8E-4502-9A6F-A3A1D2EB8565}" sibTransId="{076C8251-BC3F-479E-9F2F-D07A7FD938AC}"/>
     <dgm:cxn modelId="{338E1C2A-09BD-4985-836B-47445A999FBC}" type="presOf" srcId="{D1B971C2-4C0E-4B5D-A4F9-903AA47838E2}" destId="{D9B5B382-4419-4BCD-8C2A-B6D4D2CFE6ED}" srcOrd="0" destOrd="0" presId="urn:microsoft.com/office/officeart/2005/8/layout/process1"/>
+    <dgm:cxn modelId="{3552D56A-30DF-4EA5-9E57-50AB639563F6}" type="presOf" srcId="{65A9CF9F-C018-4B6E-84D0-7F589B346169}" destId="{C26E7E2D-83BD-4457-B475-F157B59F2827}" srcOrd="1" destOrd="0" presId="urn:microsoft.com/office/officeart/2005/8/layout/process1"/>
+    <dgm:cxn modelId="{793FF210-C291-4066-9E35-E31B67FF2E00}" type="presOf" srcId="{B9F8E4DD-44DF-4E1D-87FA-EE5364E8D2EC}" destId="{61BACCEA-61C1-4723-AF8C-1B36EEF6ABE5}" srcOrd="0" destOrd="0" presId="urn:microsoft.com/office/officeart/2005/8/layout/process1"/>
+    <dgm:cxn modelId="{092EE062-13EF-423B-850D-17539DCBD1FD}" type="presOf" srcId="{6B709411-2AF7-429D-BEE9-BF01DE9BD075}" destId="{FDCE0427-44E3-4613-A014-4EAD39419459}" srcOrd="0" destOrd="0" presId="urn:microsoft.com/office/officeart/2005/8/layout/process1"/>
+    <dgm:cxn modelId="{520A79BE-EDD4-49A1-9054-1A632ADF5956}" type="presOf" srcId="{6B026640-4EB6-41D1-BD82-BCEE24D8EB18}" destId="{11F1FD18-8427-4210-8E38-B264AF8DA68F}" srcOrd="0" destOrd="0" presId="urn:microsoft.com/office/officeart/2005/8/layout/process1"/>
     <dgm:cxn modelId="{E691E83D-8465-4C00-A797-36A6B500E926}" type="presOf" srcId="{A833BA43-9527-4913-863A-ADCED2EB30D7}" destId="{4C8CDEEC-2955-42A5-9846-0EFE6EED863D}" srcOrd="0" destOrd="0" presId="urn:microsoft.com/office/officeart/2005/8/layout/process1"/>
-    <dgm:cxn modelId="{793FF210-C291-4066-9E35-E31B67FF2E00}" type="presOf" srcId="{B9F8E4DD-44DF-4E1D-87FA-EE5364E8D2EC}" destId="{61BACCEA-61C1-4723-AF8C-1B36EEF6ABE5}" srcOrd="0" destOrd="0" presId="urn:microsoft.com/office/officeart/2005/8/layout/process1"/>
+    <dgm:cxn modelId="{673BFD6D-AB2C-483D-97E9-FB95D7E68D3F}" srcId="{A9404D15-0FE2-48C7-B124-F3AA4084C521}" destId="{B7CD2013-BE13-47A0-B83A-8076EB8CFE0A}" srcOrd="4" destOrd="0" parTransId="{1FE23C5F-6A05-4E5D-85FC-C7E7A17EECE6}" sibTransId="{2C1CA45A-9E01-425B-A98B-7CB05E79D89F}"/>
+    <dgm:cxn modelId="{47C55149-3D87-4247-8852-4C900796BA8E}" type="presOf" srcId="{0C1973F0-E5DA-4261-BF88-4987F488EC8F}" destId="{4ED1FBEA-F495-4C56-9A27-D2DACB3549B2}" srcOrd="0" destOrd="0" presId="urn:microsoft.com/office/officeart/2005/8/layout/process1"/>
+    <dgm:cxn modelId="{16AFB758-5B12-499E-B973-C370EDAEC6AA}" type="presOf" srcId="{12C8F8D2-B214-469F-A5B8-137A5A5F5C78}" destId="{A4186596-4516-436E-B7F5-62BEA1A004B1}" srcOrd="1" destOrd="0" presId="urn:microsoft.com/office/officeart/2005/8/layout/process1"/>
+    <dgm:cxn modelId="{9B58F889-4508-42CD-97A6-77FCBF0945FF}" srcId="{A9404D15-0FE2-48C7-B124-F3AA4084C521}" destId="{B9F8E4DD-44DF-4E1D-87FA-EE5364E8D2EC}" srcOrd="5" destOrd="0" parTransId="{9AE0AB3B-5C27-480B-9EA6-3EF53828B9C9}" sibTransId="{12C8F8D2-B214-469F-A5B8-137A5A5F5C78}"/>
+    <dgm:cxn modelId="{D2B414EA-084E-43C1-AB7B-257BB428F5D9}" type="presOf" srcId="{D1B971C2-4C0E-4B5D-A4F9-903AA47838E2}" destId="{49509D84-2A66-412F-BC24-E3FA0246E3BF}" srcOrd="1" destOrd="0" presId="urn:microsoft.com/office/officeart/2005/8/layout/process1"/>
+    <dgm:cxn modelId="{0C0067F0-4353-43C3-9EA1-11C636D07D95}" srcId="{A9404D15-0FE2-48C7-B124-F3AA4084C521}" destId="{0C1973F0-E5DA-4261-BF88-4987F488EC8F}" srcOrd="2" destOrd="0" parTransId="{4920E1E6-90CC-4B13-B6A6-36ACD0C94685}" sibTransId="{603E6C79-C511-4DA2-9B83-06FD848A88A9}"/>
+    <dgm:cxn modelId="{96599E31-A2DF-425A-8B8B-ED0D413AB78C}" type="presOf" srcId="{B7CD2013-BE13-47A0-B83A-8076EB8CFE0A}" destId="{260CCCBC-E5D3-4029-A377-D3549F00A094}" srcOrd="0" destOrd="0" presId="urn:microsoft.com/office/officeart/2005/8/layout/process1"/>
+    <dgm:cxn modelId="{24B53F25-169F-41DE-9A40-5E5130B6E336}" srcId="{A9404D15-0FE2-48C7-B124-F3AA4084C521}" destId="{00F39A38-0571-4035-837A-C97C40F3C796}" srcOrd="3" destOrd="0" parTransId="{B92E5754-698B-4252-AC8C-8E1FF4DB0706}" sibTransId="{DD1F5B78-5CC3-494F-BDE6-26B167A10048}"/>
+    <dgm:cxn modelId="{DC44627F-72CA-4EDA-A227-EB35193C92CD}" type="presOf" srcId="{DD1F5B78-5CC3-494F-BDE6-26B167A10048}" destId="{F8A8CF5F-F8B3-4BD3-8370-2B8EB78D0585}" srcOrd="1" destOrd="0" presId="urn:microsoft.com/office/officeart/2005/8/layout/process1"/>
+    <dgm:cxn modelId="{2C14ABAA-ED1A-407E-9B36-8F11C25158F6}" type="presOf" srcId="{6B709411-2AF7-429D-BEE9-BF01DE9BD075}" destId="{7BAAC852-AA74-4C61-A04C-FEDF32584A64}" srcOrd="1" destOrd="0" presId="urn:microsoft.com/office/officeart/2005/8/layout/process1"/>
     <dgm:cxn modelId="{73854DFD-ECE5-4865-9C97-057760C965A5}" type="presOf" srcId="{12C8F8D2-B214-469F-A5B8-137A5A5F5C78}" destId="{24EF0AB0-63C7-4EC8-9063-AB9C1B23E1D0}" srcOrd="0" destOrd="0" presId="urn:microsoft.com/office/officeart/2005/8/layout/process1"/>
-    <dgm:cxn modelId="{3552D56A-30DF-4EA5-9E57-50AB639563F6}" type="presOf" srcId="{65A9CF9F-C018-4B6E-84D0-7F589B346169}" destId="{C26E7E2D-83BD-4457-B475-F157B59F2827}" srcOrd="1" destOrd="0" presId="urn:microsoft.com/office/officeart/2005/8/layout/process1"/>
+    <dgm:cxn modelId="{CBD475DD-8B2D-48E5-8995-85696800DB5E}" type="presOf" srcId="{8455D91F-FCF9-4A14-84B9-0A5D80F085F5}" destId="{B93EC08B-667F-483B-AB6B-DDB49872FC96}" srcOrd="0" destOrd="0" presId="urn:microsoft.com/office/officeart/2005/8/layout/process1"/>
     <dgm:cxn modelId="{AD06635A-B78D-455A-8909-2905EE8BED86}" type="presOf" srcId="{A9404D15-0FE2-48C7-B124-F3AA4084C521}" destId="{4CE8EB27-9A4E-40ED-8DA0-76DAFD527696}" srcOrd="0" destOrd="0" presId="urn:microsoft.com/office/officeart/2005/8/layout/process1"/>
+    <dgm:cxn modelId="{DEDAF7BD-B93A-412E-98B6-DED7D49FEEDA}" type="presOf" srcId="{603E6C79-C511-4DA2-9B83-06FD848A88A9}" destId="{0E210ADB-EB7B-4F5D-B29C-42824D602B86}" srcOrd="1" destOrd="0" presId="urn:microsoft.com/office/officeart/2005/8/layout/process1"/>
+    <dgm:cxn modelId="{9379021F-CB9B-458C-B1E9-C7611F1CD9FA}" type="presOf" srcId="{65A9CF9F-C018-4B6E-84D0-7F589B346169}" destId="{B4D23FF9-57E3-42B4-A7EC-53BEA845F009}" srcOrd="0" destOrd="0" presId="urn:microsoft.com/office/officeart/2005/8/layout/process1"/>
+    <dgm:cxn modelId="{0B1985A0-44D7-4327-86B1-49FF8A5D2928}" type="presOf" srcId="{00F39A38-0571-4035-837A-C97C40F3C796}" destId="{96D011E9-A295-45E0-A4EF-46653C059DAF}" srcOrd="0" destOrd="0" presId="urn:microsoft.com/office/officeart/2005/8/layout/process1"/>
+    <dgm:cxn modelId="{2E74ED3E-DE6E-453D-A9E7-77D6F0C32A9F}" type="presOf" srcId="{104819FF-E3FD-4670-BF4C-75691EE1BC2F}" destId="{3060179B-F9E4-4C7A-A2C1-0E6B1FBF79A5}" srcOrd="0" destOrd="0" presId="urn:microsoft.com/office/officeart/2005/8/layout/process1"/>
+    <dgm:cxn modelId="{0CBDA980-711E-4376-9225-BB8B27822DE7}" type="presOf" srcId="{DD1F5B78-5CC3-494F-BDE6-26B167A10048}" destId="{9D847244-6C20-4217-AEC3-92D406A09F26}" srcOrd="0" destOrd="0" presId="urn:microsoft.com/office/officeart/2005/8/layout/process1"/>
+    <dgm:cxn modelId="{EE4030C3-0B05-4F68-846F-040FF6215F81}" srcId="{A9404D15-0FE2-48C7-B124-F3AA4084C521}" destId="{6B026640-4EB6-41D1-BD82-BCEE24D8EB18}" srcOrd="0" destOrd="0" parTransId="{8275F2A4-9222-4B11-A1D2-DC49191E0B47}" sibTransId="{65A9CF9F-C018-4B6E-84D0-7F589B346169}"/>
+    <dgm:cxn modelId="{44473325-93C6-4489-A82B-AC5064EC62FE}" type="presOf" srcId="{2C1CA45A-9E01-425B-A98B-7CB05E79D89F}" destId="{786A3A9A-F140-449E-8678-74A146AE5613}" srcOrd="1" destOrd="0" presId="urn:microsoft.com/office/officeart/2005/8/layout/process1"/>
     <dgm:cxn modelId="{117A67FD-A0C8-4577-9907-D2BE3A9E1D42}" type="presOf" srcId="{603E6C79-C511-4DA2-9B83-06FD848A88A9}" destId="{40C0B906-B0F8-41AC-998E-CC6EAD196B0F}" srcOrd="0" destOrd="0" presId="urn:microsoft.com/office/officeart/2005/8/layout/process1"/>
-    <dgm:cxn modelId="{47C55149-3D87-4247-8852-4C900796BA8E}" type="presOf" srcId="{0C1973F0-E5DA-4261-BF88-4987F488EC8F}" destId="{4ED1FBEA-F495-4C56-9A27-D2DACB3549B2}" srcOrd="0" destOrd="0" presId="urn:microsoft.com/office/officeart/2005/8/layout/process1"/>
-    <dgm:cxn modelId="{24B53F25-169F-41DE-9A40-5E5130B6E336}" srcId="{A9404D15-0FE2-48C7-B124-F3AA4084C521}" destId="{00F39A38-0571-4035-837A-C97C40F3C796}" srcOrd="3" destOrd="0" parTransId="{B92E5754-698B-4252-AC8C-8E1FF4DB0706}" sibTransId="{DD1F5B78-5CC3-494F-BDE6-26B167A10048}"/>
-    <dgm:cxn modelId="{2C14ABAA-ED1A-407E-9B36-8F11C25158F6}" type="presOf" srcId="{6B709411-2AF7-429D-BEE9-BF01DE9BD075}" destId="{7BAAC852-AA74-4C61-A04C-FEDF32584A64}" srcOrd="1" destOrd="0" presId="urn:microsoft.com/office/officeart/2005/8/layout/process1"/>
-    <dgm:cxn modelId="{7C844402-D793-4E0F-8BC2-BF63FB7DF95C}" srcId="{A9404D15-0FE2-48C7-B124-F3AA4084C521}" destId="{8455D91F-FCF9-4A14-84B9-0A5D80F085F5}" srcOrd="1" destOrd="0" parTransId="{94806B8D-0FA7-4FB4-A5D7-94786E09FC8B}" sibTransId="{D1B971C2-4C0E-4B5D-A4F9-903AA47838E2}"/>
-    <dgm:cxn modelId="{889DB193-109E-46D0-9AE1-7278B9EC4197}" type="presOf" srcId="{2C1CA45A-9E01-425B-A98B-7CB05E79D89F}" destId="{4E210EBB-77AC-4270-8B31-8373F5B94957}" srcOrd="0" destOrd="0" presId="urn:microsoft.com/office/officeart/2005/8/layout/process1"/>
-    <dgm:cxn modelId="{DEDAF7BD-B93A-412E-98B6-DED7D49FEEDA}" type="presOf" srcId="{603E6C79-C511-4DA2-9B83-06FD848A88A9}" destId="{0E210ADB-EB7B-4F5D-B29C-42824D602B86}" srcOrd="1" destOrd="0" presId="urn:microsoft.com/office/officeart/2005/8/layout/process1"/>
-    <dgm:cxn modelId="{44473325-93C6-4489-A82B-AC5064EC62FE}" type="presOf" srcId="{2C1CA45A-9E01-425B-A98B-7CB05E79D89F}" destId="{786A3A9A-F140-449E-8678-74A146AE5613}" srcOrd="1" destOrd="0" presId="urn:microsoft.com/office/officeart/2005/8/layout/process1"/>
-    <dgm:cxn modelId="{BAE3115C-FF13-43E7-8E62-71625F88D60A}" srcId="{A9404D15-0FE2-48C7-B124-F3AA4084C521}" destId="{A833BA43-9527-4913-863A-ADCED2EB30D7}" srcOrd="6" destOrd="0" parTransId="{82063D08-BEDF-4B87-AA4E-19E5AF88A199}" sibTransId="{6B709411-2AF7-429D-BEE9-BF01DE9BD075}"/>
-    <dgm:cxn modelId="{EE4030C3-0B05-4F68-846F-040FF6215F81}" srcId="{A9404D15-0FE2-48C7-B124-F3AA4084C521}" destId="{6B026640-4EB6-41D1-BD82-BCEE24D8EB18}" srcOrd="0" destOrd="0" parTransId="{8275F2A4-9222-4B11-A1D2-DC49191E0B47}" sibTransId="{65A9CF9F-C018-4B6E-84D0-7F589B346169}"/>
-    <dgm:cxn modelId="{D2B414EA-084E-43C1-AB7B-257BB428F5D9}" type="presOf" srcId="{D1B971C2-4C0E-4B5D-A4F9-903AA47838E2}" destId="{49509D84-2A66-412F-BC24-E3FA0246E3BF}" srcOrd="1" destOrd="0" presId="urn:microsoft.com/office/officeart/2005/8/layout/process1"/>
-    <dgm:cxn modelId="{520A79BE-EDD4-49A1-9054-1A632ADF5956}" type="presOf" srcId="{6B026640-4EB6-41D1-BD82-BCEE24D8EB18}" destId="{11F1FD18-8427-4210-8E38-B264AF8DA68F}" srcOrd="0" destOrd="0" presId="urn:microsoft.com/office/officeart/2005/8/layout/process1"/>
-    <dgm:cxn modelId="{673BFD6D-AB2C-483D-97E9-FB95D7E68D3F}" srcId="{A9404D15-0FE2-48C7-B124-F3AA4084C521}" destId="{B7CD2013-BE13-47A0-B83A-8076EB8CFE0A}" srcOrd="4" destOrd="0" parTransId="{1FE23C5F-6A05-4E5D-85FC-C7E7A17EECE6}" sibTransId="{2C1CA45A-9E01-425B-A98B-7CB05E79D89F}"/>
-    <dgm:cxn modelId="{9379021F-CB9B-458C-B1E9-C7611F1CD9FA}" type="presOf" srcId="{65A9CF9F-C018-4B6E-84D0-7F589B346169}" destId="{B4D23FF9-57E3-42B4-A7EC-53BEA845F009}" srcOrd="0" destOrd="0" presId="urn:microsoft.com/office/officeart/2005/8/layout/process1"/>
-    <dgm:cxn modelId="{96599E31-A2DF-425A-8B8B-ED0D413AB78C}" type="presOf" srcId="{B7CD2013-BE13-47A0-B83A-8076EB8CFE0A}" destId="{260CCCBC-E5D3-4029-A377-D3549F00A094}" srcOrd="0" destOrd="0" presId="urn:microsoft.com/office/officeart/2005/8/layout/process1"/>
-    <dgm:cxn modelId="{092EE062-13EF-423B-850D-17539DCBD1FD}" type="presOf" srcId="{6B709411-2AF7-429D-BEE9-BF01DE9BD075}" destId="{FDCE0427-44E3-4613-A014-4EAD39419459}" srcOrd="0" destOrd="0" presId="urn:microsoft.com/office/officeart/2005/8/layout/process1"/>
-    <dgm:cxn modelId="{0B1985A0-44D7-4327-86B1-49FF8A5D2928}" type="presOf" srcId="{00F39A38-0571-4035-837A-C97C40F3C796}" destId="{96D011E9-A295-45E0-A4EF-46653C059DAF}" srcOrd="0" destOrd="0" presId="urn:microsoft.com/office/officeart/2005/8/layout/process1"/>
-    <dgm:cxn modelId="{DC44627F-72CA-4EDA-A227-EB35193C92CD}" type="presOf" srcId="{DD1F5B78-5CC3-494F-BDE6-26B167A10048}" destId="{F8A8CF5F-F8B3-4BD3-8370-2B8EB78D0585}" srcOrd="1" destOrd="0" presId="urn:microsoft.com/office/officeart/2005/8/layout/process1"/>
-    <dgm:cxn modelId="{0CBDA980-711E-4376-9225-BB8B27822DE7}" type="presOf" srcId="{DD1F5B78-5CC3-494F-BDE6-26B167A10048}" destId="{9D847244-6C20-4217-AEC3-92D406A09F26}" srcOrd="0" destOrd="0" presId="urn:microsoft.com/office/officeart/2005/8/layout/process1"/>
-    <dgm:cxn modelId="{9B58F889-4508-42CD-97A6-77FCBF0945FF}" srcId="{A9404D15-0FE2-48C7-B124-F3AA4084C521}" destId="{B9F8E4DD-44DF-4E1D-87FA-EE5364E8D2EC}" srcOrd="5" destOrd="0" parTransId="{9AE0AB3B-5C27-480B-9EA6-3EF53828B9C9}" sibTransId="{12C8F8D2-B214-469F-A5B8-137A5A5F5C78}"/>
     <dgm:cxn modelId="{6993BBCF-C948-454E-A32D-DC38C5C2B12C}" type="presParOf" srcId="{4CE8EB27-9A4E-40ED-8DA0-76DAFD527696}" destId="{11F1FD18-8427-4210-8E38-B264AF8DA68F}" srcOrd="0" destOrd="0" presId="urn:microsoft.com/office/officeart/2005/8/layout/process1"/>
     <dgm:cxn modelId="{27A200CD-1643-421A-9966-730ADE7286EE}" type="presParOf" srcId="{4CE8EB27-9A4E-40ED-8DA0-76DAFD527696}" destId="{B4D23FF9-57E3-42B4-A7EC-53BEA845F009}" srcOrd="1" destOrd="0" presId="urn:microsoft.com/office/officeart/2005/8/layout/process1"/>
     <dgm:cxn modelId="{A08DBFEF-F887-4671-82FD-BBB6DD18B810}" type="presParOf" srcId="{B4D23FF9-57E3-42B4-A7EC-53BEA845F009}" destId="{C26E7E2D-83BD-4457-B475-F157B59F2827}" srcOrd="0" destOrd="0" presId="urn:microsoft.com/office/officeart/2005/8/layout/process1"/>
@@ -3806,7 +3806,7 @@
   <dgm:whole/>
   <dgm:extLst>
     <a:ext uri="http://schemas.microsoft.com/office/drawing/2008/diagram">
-      <dsp:dataModelExt xmlns:dsp="http://schemas.microsoft.com/office/drawing/2008/diagram" xmlns="" relId="rId7" minVer="http://schemas.openxmlformats.org/drawingml/2006/diagram"/>
+      <dsp:dataModelExt xmlns:dsp="http://schemas.microsoft.com/office/drawing/2008/diagram" relId="rId7" minVer="http://schemas.openxmlformats.org/drawingml/2006/diagram"/>
     </a:ext>
   </dgm:extLst>
 </dgm:dataModel>
@@ -4431,37 +4431,37 @@
     </dgm:pt>
   </dgm:ptLst>
   <dgm:cxnLst>
-    <dgm:cxn modelId="{1D5A355C-1A42-43E2-A5D8-12E370E09B03}" type="presOf" srcId="{070E32FB-0F40-4A39-A84C-DFEBE682817C}" destId="{6000A985-A315-4B7F-A890-70B34583CE92}" srcOrd="0" destOrd="1" presId="urn:microsoft.com/office/officeart/2005/8/layout/process2"/>
     <dgm:cxn modelId="{CEED8862-A0C0-463E-83C5-FE80CE7E9E64}" srcId="{9CC09261-16CA-4EC2-B395-262CF4000709}" destId="{5A1D3876-754F-40F7-8F25-EF121EB41242}" srcOrd="0" destOrd="0" parTransId="{066FFB11-22EE-4DB9-8CAD-EDC8D10BEA64}" sibTransId="{FA88543C-7F53-4179-BDD2-72B3E4AF4513}"/>
-    <dgm:cxn modelId="{759F95AE-8D02-4DF9-BC7F-0060BDADC3BC}" srcId="{D798F737-8283-4C0C-B96B-00E07F4FDD14}" destId="{C2E8DA81-00BD-4F1F-A3AD-327387590727}" srcOrd="1" destOrd="0" parTransId="{EF39F424-8D76-4FD1-995A-30D1C373EBEE}" sibTransId="{BC3EF7C7-D099-49A2-81FE-207303A85E91}"/>
-    <dgm:cxn modelId="{F5DC1B0B-527B-478C-AAA4-0D09A8159D6D}" type="presOf" srcId="{3AC1E29E-F1DD-4B77-AB6D-E75AC072B2E4}" destId="{EFE1D112-B732-47A2-AA00-01C441A1EB8D}" srcOrd="0" destOrd="0" presId="urn:microsoft.com/office/officeart/2005/8/layout/process2"/>
-    <dgm:cxn modelId="{B95EB8EC-C03D-4350-AFA3-E087EF42DF7D}" type="presOf" srcId="{5A4C9242-0947-4829-9308-37674E420474}" destId="{6000A985-A315-4B7F-A890-70B34583CE92}" srcOrd="0" destOrd="0" presId="urn:microsoft.com/office/officeart/2005/8/layout/process2"/>
-    <dgm:cxn modelId="{FE0944E0-7696-48DD-B388-3662FF1B8CC9}" type="presOf" srcId="{C675EFCB-F894-44D7-ABB2-D3B825DE6C66}" destId="{34F05ADA-F875-4E51-A411-35829CF438E0}" srcOrd="1" destOrd="0" presId="urn:microsoft.com/office/officeart/2005/8/layout/process2"/>
-    <dgm:cxn modelId="{12D91199-B922-47E3-ACC5-6A78FF41E461}" type="presOf" srcId="{C2E8DA81-00BD-4F1F-A3AD-327387590727}" destId="{D3E295EC-B36B-46E1-8C2E-C99918E917EC}" srcOrd="0" destOrd="2" presId="urn:microsoft.com/office/officeart/2005/8/layout/process2"/>
-    <dgm:cxn modelId="{F3A626D7-A5B8-470F-8CD5-4182AE8499CB}" srcId="{5A4C9242-0947-4829-9308-37674E420474}" destId="{070E32FB-0F40-4A39-A84C-DFEBE682817C}" srcOrd="0" destOrd="0" parTransId="{7C19778F-918D-48E2-93F4-2DE5CA08DB7B}" sibTransId="{36FF2B40-A85D-4A8C-8AB3-2B7363776C42}"/>
-    <dgm:cxn modelId="{ADFD8FC7-DA52-45D6-8902-92FA5AD8886A}" srcId="{963AC17F-9D9F-489F-AB85-B501836E101D}" destId="{9CC09261-16CA-4EC2-B395-262CF4000709}" srcOrd="2" destOrd="0" parTransId="{782577F9-5BC1-42F2-9FA1-1899F9D10892}" sibTransId="{C675EFCB-F894-44D7-ABB2-D3B825DE6C66}"/>
-    <dgm:cxn modelId="{EEBD0890-5D1D-45D0-A673-83EF5B6CF93E}" srcId="{963AC17F-9D9F-489F-AB85-B501836E101D}" destId="{D798F737-8283-4C0C-B96B-00E07F4FDD14}" srcOrd="0" destOrd="0" parTransId="{CAFF2345-13B5-45E1-9F88-802EE05E9A5A}" sibTransId="{9BB1DDC0-334B-4402-B3AE-AC0150FA4BD3}"/>
-    <dgm:cxn modelId="{04EC8B5E-274D-47D7-A8BE-733E3DBBAC1F}" type="presOf" srcId="{9BB1DDC0-334B-4402-B3AE-AC0150FA4BD3}" destId="{F843E46D-AEEF-4983-80E8-6F20E00016FE}" srcOrd="1" destOrd="0" presId="urn:microsoft.com/office/officeart/2005/8/layout/process2"/>
     <dgm:cxn modelId="{1B27EDC9-AB78-425D-BCFE-160FB1B87B35}" type="presOf" srcId="{D747E4EE-075C-4D50-9FBC-684C92DEA969}" destId="{C409EAA2-6C98-4D52-B1FB-5A72A5A21E56}" srcOrd="0" destOrd="2" presId="urn:microsoft.com/office/officeart/2005/8/layout/process2"/>
-    <dgm:cxn modelId="{8B53F8D6-9BBC-4E71-97F6-221B816BFE68}" type="presOf" srcId="{9CC09261-16CA-4EC2-B395-262CF4000709}" destId="{7A195775-A776-4477-AAE4-9045E67C6713}" srcOrd="0" destOrd="0" presId="urn:microsoft.com/office/officeart/2005/8/layout/process2"/>
-    <dgm:cxn modelId="{60981E25-9F08-44A3-B855-DB5167A28416}" type="presOf" srcId="{D798F737-8283-4C0C-B96B-00E07F4FDD14}" destId="{D3E295EC-B36B-46E1-8C2E-C99918E917EC}" srcOrd="0" destOrd="0" presId="urn:microsoft.com/office/officeart/2005/8/layout/process2"/>
-    <dgm:cxn modelId="{A8DAAF8F-916F-4DD3-82C2-8AAEEABA9CCD}" srcId="{963AC17F-9D9F-489F-AB85-B501836E101D}" destId="{5A4C9242-0947-4829-9308-37674E420474}" srcOrd="3" destOrd="0" parTransId="{C7D08FD7-757C-402D-A4E8-FBC996A62204}" sibTransId="{C2218C3B-8E68-474E-AF1B-1FC939B5E0AA}"/>
-    <dgm:cxn modelId="{FD31F7F6-8006-448E-B054-DB7418073EA9}" type="presOf" srcId="{9BB1DDC0-334B-4402-B3AE-AC0150FA4BD3}" destId="{28C96A49-E33C-46B7-9291-0DEC4204F35C}" srcOrd="0" destOrd="0" presId="urn:microsoft.com/office/officeart/2005/8/layout/process2"/>
-    <dgm:cxn modelId="{DE4FAFB8-F45C-44CF-A5C0-0217D14F751C}" srcId="{5A4C9242-0947-4829-9308-37674E420474}" destId="{B6564F96-94F9-4A14-9ABE-2DFB417ABFB4}" srcOrd="1" destOrd="0" parTransId="{C5E72ACE-601A-479D-8717-8B2D00D5D1F4}" sibTransId="{66D2DD8A-6EB2-4EFF-BA49-7C61C386FF4B}"/>
-    <dgm:cxn modelId="{6B052875-3433-4123-8D60-4A09C1077132}" srcId="{963AC17F-9D9F-489F-AB85-B501836E101D}" destId="{E18926CB-AA09-4AE3-98B9-CDF0672FFB09}" srcOrd="1" destOrd="0" parTransId="{13023068-E6D3-4091-8291-6B68A166472A}" sibTransId="{3AC1E29E-F1DD-4B77-AB6D-E75AC072B2E4}"/>
-    <dgm:cxn modelId="{DC4F27E3-4302-4190-A570-31CADB2D5824}" srcId="{D798F737-8283-4C0C-B96B-00E07F4FDD14}" destId="{444E769D-FE95-4234-9D62-6AA42C890900}" srcOrd="0" destOrd="0" parTransId="{CB7C3C04-0D7C-43BE-9963-2854077A5BF3}" sibTransId="{34D00DBC-F6CD-44C7-A3DE-B965518217E1}"/>
-    <dgm:cxn modelId="{5A583CD7-B1D3-43B2-B2D5-F664B2B17275}" type="presOf" srcId="{E18926CB-AA09-4AE3-98B9-CDF0672FFB09}" destId="{C409EAA2-6C98-4D52-B1FB-5A72A5A21E56}" srcOrd="0" destOrd="0" presId="urn:microsoft.com/office/officeart/2005/8/layout/process2"/>
-    <dgm:cxn modelId="{1E35FAEC-6BCD-4EA6-9FF8-95C1E665F2FB}" srcId="{E18926CB-AA09-4AE3-98B9-CDF0672FFB09}" destId="{D747E4EE-075C-4D50-9FBC-684C92DEA969}" srcOrd="1" destOrd="0" parTransId="{D1158A60-FC9A-4B34-B47D-957DA05D46AF}" sibTransId="{DE67E0E4-D972-4CBC-80CE-E149F586C431}"/>
-    <dgm:cxn modelId="{9F9D2A15-3C67-46CE-903C-719590B7441D}" type="presOf" srcId="{CA02BF23-DCC9-4E31-A073-6DFB23CA5B0C}" destId="{7A195775-A776-4477-AAE4-9045E67C6713}" srcOrd="0" destOrd="2" presId="urn:microsoft.com/office/officeart/2005/8/layout/process2"/>
-    <dgm:cxn modelId="{00CF82D4-1DB5-42D4-8634-A974216A8E53}" type="presOf" srcId="{5A1D3876-754F-40F7-8F25-EF121EB41242}" destId="{7A195775-A776-4477-AAE4-9045E67C6713}" srcOrd="0" destOrd="1" presId="urn:microsoft.com/office/officeart/2005/8/layout/process2"/>
-    <dgm:cxn modelId="{B1864410-4667-4283-9846-388872F7F25E}" type="presOf" srcId="{E7398FED-6B4C-4A61-9914-D185AC780BAA}" destId="{C409EAA2-6C98-4D52-B1FB-5A72A5A21E56}" srcOrd="0" destOrd="1" presId="urn:microsoft.com/office/officeart/2005/8/layout/process2"/>
+    <dgm:cxn modelId="{2740D879-874B-452C-8122-0720784E2714}" srcId="{E18926CB-AA09-4AE3-98B9-CDF0672FFB09}" destId="{E7398FED-6B4C-4A61-9914-D185AC780BAA}" srcOrd="0" destOrd="0" parTransId="{714FB7C3-9663-4D92-B40B-41DF7ED33370}" sibTransId="{DA15C907-E62A-4944-B869-6E7705582452}"/>
     <dgm:cxn modelId="{2BC074B9-8443-4384-AB89-9ED7D1FA2764}" type="presOf" srcId="{963AC17F-9D9F-489F-AB85-B501836E101D}" destId="{677F11FD-2259-43A0-8AE5-D03BD3E442C1}" srcOrd="0" destOrd="0" presId="urn:microsoft.com/office/officeart/2005/8/layout/process2"/>
     <dgm:cxn modelId="{01C7AD50-1D3C-4C4A-85D0-641F931B35AE}" type="presOf" srcId="{3AC1E29E-F1DD-4B77-AB6D-E75AC072B2E4}" destId="{6036B0E9-A64E-4557-997C-E9DA29D644EC}" srcOrd="1" destOrd="0" presId="urn:microsoft.com/office/officeart/2005/8/layout/process2"/>
-    <dgm:cxn modelId="{2740D879-874B-452C-8122-0720784E2714}" srcId="{E18926CB-AA09-4AE3-98B9-CDF0672FFB09}" destId="{E7398FED-6B4C-4A61-9914-D185AC780BAA}" srcOrd="0" destOrd="0" parTransId="{714FB7C3-9663-4D92-B40B-41DF7ED33370}" sibTransId="{DA15C907-E62A-4944-B869-6E7705582452}"/>
+    <dgm:cxn modelId="{FE0944E0-7696-48DD-B388-3662FF1B8CC9}" type="presOf" srcId="{C675EFCB-F894-44D7-ABB2-D3B825DE6C66}" destId="{34F05ADA-F875-4E51-A411-35829CF438E0}" srcOrd="1" destOrd="0" presId="urn:microsoft.com/office/officeart/2005/8/layout/process2"/>
     <dgm:cxn modelId="{7997D165-7A57-44CA-B3C0-75259539AE1F}" type="presOf" srcId="{C675EFCB-F894-44D7-ABB2-D3B825DE6C66}" destId="{D9DFA680-0D7B-4961-822C-730E98277F49}" srcOrd="0" destOrd="0" presId="urn:microsoft.com/office/officeart/2005/8/layout/process2"/>
+    <dgm:cxn modelId="{9F9D2A15-3C67-46CE-903C-719590B7441D}" type="presOf" srcId="{CA02BF23-DCC9-4E31-A073-6DFB23CA5B0C}" destId="{7A195775-A776-4477-AAE4-9045E67C6713}" srcOrd="0" destOrd="2" presId="urn:microsoft.com/office/officeart/2005/8/layout/process2"/>
+    <dgm:cxn modelId="{2864B841-A8E4-4BF1-B62C-801D6AE14908}" type="presOf" srcId="{B6564F96-94F9-4A14-9ABE-2DFB417ABFB4}" destId="{6000A985-A315-4B7F-A890-70B34583CE92}" srcOrd="0" destOrd="2" presId="urn:microsoft.com/office/officeart/2005/8/layout/process2"/>
+    <dgm:cxn modelId="{DE4FAFB8-F45C-44CF-A5C0-0217D14F751C}" srcId="{5A4C9242-0947-4829-9308-37674E420474}" destId="{B6564F96-94F9-4A14-9ABE-2DFB417ABFB4}" srcOrd="1" destOrd="0" parTransId="{C5E72ACE-601A-479D-8717-8B2D00D5D1F4}" sibTransId="{66D2DD8A-6EB2-4EFF-BA49-7C61C386FF4B}"/>
+    <dgm:cxn modelId="{8B53F8D6-9BBC-4E71-97F6-221B816BFE68}" type="presOf" srcId="{9CC09261-16CA-4EC2-B395-262CF4000709}" destId="{7A195775-A776-4477-AAE4-9045E67C6713}" srcOrd="0" destOrd="0" presId="urn:microsoft.com/office/officeart/2005/8/layout/process2"/>
+    <dgm:cxn modelId="{EEBD0890-5D1D-45D0-A673-83EF5B6CF93E}" srcId="{963AC17F-9D9F-489F-AB85-B501836E101D}" destId="{D798F737-8283-4C0C-B96B-00E07F4FDD14}" srcOrd="0" destOrd="0" parTransId="{CAFF2345-13B5-45E1-9F88-802EE05E9A5A}" sibTransId="{9BB1DDC0-334B-4402-B3AE-AC0150FA4BD3}"/>
+    <dgm:cxn modelId="{12D91199-B922-47E3-ACC5-6A78FF41E461}" type="presOf" srcId="{C2E8DA81-00BD-4F1F-A3AD-327387590727}" destId="{D3E295EC-B36B-46E1-8C2E-C99918E917EC}" srcOrd="0" destOrd="2" presId="urn:microsoft.com/office/officeart/2005/8/layout/process2"/>
+    <dgm:cxn modelId="{ADFD8FC7-DA52-45D6-8902-92FA5AD8886A}" srcId="{963AC17F-9D9F-489F-AB85-B501836E101D}" destId="{9CC09261-16CA-4EC2-B395-262CF4000709}" srcOrd="2" destOrd="0" parTransId="{782577F9-5BC1-42F2-9FA1-1899F9D10892}" sibTransId="{C675EFCB-F894-44D7-ABB2-D3B825DE6C66}"/>
+    <dgm:cxn modelId="{A8DAAF8F-916F-4DD3-82C2-8AAEEABA9CCD}" srcId="{963AC17F-9D9F-489F-AB85-B501836E101D}" destId="{5A4C9242-0947-4829-9308-37674E420474}" srcOrd="3" destOrd="0" parTransId="{C7D08FD7-757C-402D-A4E8-FBC996A62204}" sibTransId="{C2218C3B-8E68-474E-AF1B-1FC939B5E0AA}"/>
+    <dgm:cxn modelId="{00CF82D4-1DB5-42D4-8634-A974216A8E53}" type="presOf" srcId="{5A1D3876-754F-40F7-8F25-EF121EB41242}" destId="{7A195775-A776-4477-AAE4-9045E67C6713}" srcOrd="0" destOrd="1" presId="urn:microsoft.com/office/officeart/2005/8/layout/process2"/>
+    <dgm:cxn modelId="{1E35FAEC-6BCD-4EA6-9FF8-95C1E665F2FB}" srcId="{E18926CB-AA09-4AE3-98B9-CDF0672FFB09}" destId="{D747E4EE-075C-4D50-9FBC-684C92DEA969}" srcOrd="1" destOrd="0" parTransId="{D1158A60-FC9A-4B34-B47D-957DA05D46AF}" sibTransId="{DE67E0E4-D972-4CBC-80CE-E149F586C431}"/>
+    <dgm:cxn modelId="{6B052875-3433-4123-8D60-4A09C1077132}" srcId="{963AC17F-9D9F-489F-AB85-B501836E101D}" destId="{E18926CB-AA09-4AE3-98B9-CDF0672FFB09}" srcOrd="1" destOrd="0" parTransId="{13023068-E6D3-4091-8291-6B68A166472A}" sibTransId="{3AC1E29E-F1DD-4B77-AB6D-E75AC072B2E4}"/>
+    <dgm:cxn modelId="{60981E25-9F08-44A3-B855-DB5167A28416}" type="presOf" srcId="{D798F737-8283-4C0C-B96B-00E07F4FDD14}" destId="{D3E295EC-B36B-46E1-8C2E-C99918E917EC}" srcOrd="0" destOrd="0" presId="urn:microsoft.com/office/officeart/2005/8/layout/process2"/>
+    <dgm:cxn modelId="{F3A626D7-A5B8-470F-8CD5-4182AE8499CB}" srcId="{5A4C9242-0947-4829-9308-37674E420474}" destId="{070E32FB-0F40-4A39-A84C-DFEBE682817C}" srcOrd="0" destOrd="0" parTransId="{7C19778F-918D-48E2-93F4-2DE5CA08DB7B}" sibTransId="{36FF2B40-A85D-4A8C-8AB3-2B7363776C42}"/>
+    <dgm:cxn modelId="{5A583CD7-B1D3-43B2-B2D5-F664B2B17275}" type="presOf" srcId="{E18926CB-AA09-4AE3-98B9-CDF0672FFB09}" destId="{C409EAA2-6C98-4D52-B1FB-5A72A5A21E56}" srcOrd="0" destOrd="0" presId="urn:microsoft.com/office/officeart/2005/8/layout/process2"/>
+    <dgm:cxn modelId="{B1864410-4667-4283-9846-388872F7F25E}" type="presOf" srcId="{E7398FED-6B4C-4A61-9914-D185AC780BAA}" destId="{C409EAA2-6C98-4D52-B1FB-5A72A5A21E56}" srcOrd="0" destOrd="1" presId="urn:microsoft.com/office/officeart/2005/8/layout/process2"/>
     <dgm:cxn modelId="{A3409E98-2DA4-4D26-875A-10E6E907A771}" type="presOf" srcId="{444E769D-FE95-4234-9D62-6AA42C890900}" destId="{D3E295EC-B36B-46E1-8C2E-C99918E917EC}" srcOrd="0" destOrd="1" presId="urn:microsoft.com/office/officeart/2005/8/layout/process2"/>
+    <dgm:cxn modelId="{04EC8B5E-274D-47D7-A8BE-733E3DBBAC1F}" type="presOf" srcId="{9BB1DDC0-334B-4402-B3AE-AC0150FA4BD3}" destId="{F843E46D-AEEF-4983-80E8-6F20E00016FE}" srcOrd="1" destOrd="0" presId="urn:microsoft.com/office/officeart/2005/8/layout/process2"/>
     <dgm:cxn modelId="{BDC75906-D1EA-4068-ADB5-0EE8680A759B}" srcId="{9CC09261-16CA-4EC2-B395-262CF4000709}" destId="{CA02BF23-DCC9-4E31-A073-6DFB23CA5B0C}" srcOrd="1" destOrd="0" parTransId="{CA82F55B-88F0-4EA0-BA05-7ADDB73F354F}" sibTransId="{AA7AFD1A-683F-4E9E-AD6B-099050F410C8}"/>
-    <dgm:cxn modelId="{2864B841-A8E4-4BF1-B62C-801D6AE14908}" type="presOf" srcId="{B6564F96-94F9-4A14-9ABE-2DFB417ABFB4}" destId="{6000A985-A315-4B7F-A890-70B34583CE92}" srcOrd="0" destOrd="2" presId="urn:microsoft.com/office/officeart/2005/8/layout/process2"/>
+    <dgm:cxn modelId="{FD31F7F6-8006-448E-B054-DB7418073EA9}" type="presOf" srcId="{9BB1DDC0-334B-4402-B3AE-AC0150FA4BD3}" destId="{28C96A49-E33C-46B7-9291-0DEC4204F35C}" srcOrd="0" destOrd="0" presId="urn:microsoft.com/office/officeart/2005/8/layout/process2"/>
+    <dgm:cxn modelId="{B95EB8EC-C03D-4350-AFA3-E087EF42DF7D}" type="presOf" srcId="{5A4C9242-0947-4829-9308-37674E420474}" destId="{6000A985-A315-4B7F-A890-70B34583CE92}" srcOrd="0" destOrd="0" presId="urn:microsoft.com/office/officeart/2005/8/layout/process2"/>
+    <dgm:cxn modelId="{DC4F27E3-4302-4190-A570-31CADB2D5824}" srcId="{D798F737-8283-4C0C-B96B-00E07F4FDD14}" destId="{444E769D-FE95-4234-9D62-6AA42C890900}" srcOrd="0" destOrd="0" parTransId="{CB7C3C04-0D7C-43BE-9963-2854077A5BF3}" sibTransId="{34D00DBC-F6CD-44C7-A3DE-B965518217E1}"/>
+    <dgm:cxn modelId="{1D5A355C-1A42-43E2-A5D8-12E370E09B03}" type="presOf" srcId="{070E32FB-0F40-4A39-A84C-DFEBE682817C}" destId="{6000A985-A315-4B7F-A890-70B34583CE92}" srcOrd="0" destOrd="1" presId="urn:microsoft.com/office/officeart/2005/8/layout/process2"/>
+    <dgm:cxn modelId="{F5DC1B0B-527B-478C-AAA4-0D09A8159D6D}" type="presOf" srcId="{3AC1E29E-F1DD-4B77-AB6D-E75AC072B2E4}" destId="{EFE1D112-B732-47A2-AA00-01C441A1EB8D}" srcOrd="0" destOrd="0" presId="urn:microsoft.com/office/officeart/2005/8/layout/process2"/>
+    <dgm:cxn modelId="{759F95AE-8D02-4DF9-BC7F-0060BDADC3BC}" srcId="{D798F737-8283-4C0C-B96B-00E07F4FDD14}" destId="{C2E8DA81-00BD-4F1F-A3AD-327387590727}" srcOrd="1" destOrd="0" parTransId="{EF39F424-8D76-4FD1-995A-30D1C373EBEE}" sibTransId="{BC3EF7C7-D099-49A2-81FE-207303A85E91}"/>
     <dgm:cxn modelId="{CB95F611-4C78-4D42-8665-BC72A16C4807}" type="presParOf" srcId="{677F11FD-2259-43A0-8AE5-D03BD3E442C1}" destId="{D3E295EC-B36B-46E1-8C2E-C99918E917EC}" srcOrd="0" destOrd="0" presId="urn:microsoft.com/office/officeart/2005/8/layout/process2"/>
     <dgm:cxn modelId="{483048B2-4AA6-49D1-AB66-022FD970B482}" type="presParOf" srcId="{677F11FD-2259-43A0-8AE5-D03BD3E442C1}" destId="{28C96A49-E33C-46B7-9291-0DEC4204F35C}" srcOrd="1" destOrd="0" presId="urn:microsoft.com/office/officeart/2005/8/layout/process2"/>
     <dgm:cxn modelId="{4D0A2C50-109E-499D-8E6E-DF2F0F57E416}" type="presParOf" srcId="{28C96A49-E33C-46B7-9291-0DEC4204F35C}" destId="{F843E46D-AEEF-4983-80E8-6F20E00016FE}" srcOrd="0" destOrd="0" presId="urn:microsoft.com/office/officeart/2005/8/layout/process2"/>
@@ -4477,7 +4477,7 @@
   <dgm:whole/>
   <dgm:extLst>
     <a:ext uri="http://schemas.microsoft.com/office/drawing/2008/diagram">
-      <dsp:dataModelExt xmlns:dsp="http://schemas.microsoft.com/office/drawing/2008/diagram" xmlns="" relId="rId12" minVer="http://schemas.openxmlformats.org/drawingml/2006/diagram"/>
+      <dsp:dataModelExt xmlns:dsp="http://schemas.microsoft.com/office/drawing/2008/diagram" relId="rId12" minVer="http://schemas.openxmlformats.org/drawingml/2006/diagram"/>
     </a:ext>
   </dgm:extLst>
 </dgm:dataModel>
@@ -5075,37 +5075,37 @@
     </dgm:pt>
   </dgm:ptLst>
   <dgm:cxnLst>
+    <dgm:cxn modelId="{7F800F7D-6FE0-495C-AADB-512D7BCCD851}" type="presOf" srcId="{603E6C79-C511-4DA2-9B83-06FD848A88A9}" destId="{40C0B906-B0F8-41AC-998E-CC6EAD196B0F}" srcOrd="0" destOrd="0" presId="urn:microsoft.com/office/officeart/2005/8/layout/process1"/>
+    <dgm:cxn modelId="{7C844402-D793-4E0F-8BC2-BF63FB7DF95C}" srcId="{A9404D15-0FE2-48C7-B124-F3AA4084C521}" destId="{8455D91F-FCF9-4A14-84B9-0A5D80F085F5}" srcOrd="1" destOrd="0" parTransId="{94806B8D-0FA7-4FB4-A5D7-94786E09FC8B}" sibTransId="{D1B971C2-4C0E-4B5D-A4F9-903AA47838E2}"/>
+    <dgm:cxn modelId="{BAE3115C-FF13-43E7-8E62-71625F88D60A}" srcId="{A9404D15-0FE2-48C7-B124-F3AA4084C521}" destId="{A833BA43-9527-4913-863A-ADCED2EB30D7}" srcOrd="6" destOrd="0" parTransId="{82063D08-BEDF-4B87-AA4E-19E5AF88A199}" sibTransId="{6B709411-2AF7-429D-BEE9-BF01DE9BD075}"/>
+    <dgm:cxn modelId="{999033E2-05A1-43ED-9ECA-4019AFBCA3E2}" srcId="{A9404D15-0FE2-48C7-B124-F3AA4084C521}" destId="{104819FF-E3FD-4670-BF4C-75691EE1BC2F}" srcOrd="7" destOrd="0" parTransId="{427F1791-DE8E-4502-9A6F-A3A1D2EB8565}" sibTransId="{076C8251-BC3F-479E-9F2F-D07A7FD938AC}"/>
+    <dgm:cxn modelId="{4EC19A8E-6646-4785-9DB4-9E638A94541B}" type="presOf" srcId="{D1B971C2-4C0E-4B5D-A4F9-903AA47838E2}" destId="{49509D84-2A66-412F-BC24-E3FA0246E3BF}" srcOrd="1" destOrd="0" presId="urn:microsoft.com/office/officeart/2005/8/layout/process1"/>
+    <dgm:cxn modelId="{C500BF6E-EE84-4FF3-9E65-1A828429772F}" type="presOf" srcId="{2C1CA45A-9E01-425B-A98B-7CB05E79D89F}" destId="{4E210EBB-77AC-4270-8B31-8373F5B94957}" srcOrd="0" destOrd="0" presId="urn:microsoft.com/office/officeart/2005/8/layout/process1"/>
+    <dgm:cxn modelId="{C55F99B7-EFCD-4A49-B287-64F17F42C094}" type="presOf" srcId="{6B709411-2AF7-429D-BEE9-BF01DE9BD075}" destId="{7BAAC852-AA74-4C61-A04C-FEDF32584A64}" srcOrd="1" destOrd="0" presId="urn:microsoft.com/office/officeart/2005/8/layout/process1"/>
+    <dgm:cxn modelId="{06218D6C-9858-4497-B9AA-A4F29029AD62}" type="presOf" srcId="{B9F8E4DD-44DF-4E1D-87FA-EE5364E8D2EC}" destId="{61BACCEA-61C1-4723-AF8C-1B36EEF6ABE5}" srcOrd="0" destOrd="0" presId="urn:microsoft.com/office/officeart/2005/8/layout/process1"/>
+    <dgm:cxn modelId="{D88F314D-B319-411C-80BD-E54DDD456946}" type="presOf" srcId="{6B026640-4EB6-41D1-BD82-BCEE24D8EB18}" destId="{11F1FD18-8427-4210-8E38-B264AF8DA68F}" srcOrd="0" destOrd="0" presId="urn:microsoft.com/office/officeart/2005/8/layout/process1"/>
+    <dgm:cxn modelId="{03CCAAE8-E3DB-45C0-A881-89DD89C72DE3}" type="presOf" srcId="{8455D91F-FCF9-4A14-84B9-0A5D80F085F5}" destId="{B93EC08B-667F-483B-AB6B-DDB49872FC96}" srcOrd="0" destOrd="0" presId="urn:microsoft.com/office/officeart/2005/8/layout/process1"/>
+    <dgm:cxn modelId="{FC7DCF3C-A2DE-405F-ADB8-A02C90516DD1}" type="presOf" srcId="{65A9CF9F-C018-4B6E-84D0-7F589B346169}" destId="{C26E7E2D-83BD-4457-B475-F157B59F2827}" srcOrd="1" destOrd="0" presId="urn:microsoft.com/office/officeart/2005/8/layout/process1"/>
+    <dgm:cxn modelId="{673BFD6D-AB2C-483D-97E9-FB95D7E68D3F}" srcId="{A9404D15-0FE2-48C7-B124-F3AA4084C521}" destId="{B7CD2013-BE13-47A0-B83A-8076EB8CFE0A}" srcOrd="4" destOrd="0" parTransId="{1FE23C5F-6A05-4E5D-85FC-C7E7A17EECE6}" sibTransId="{2C1CA45A-9E01-425B-A98B-7CB05E79D89F}"/>
+    <dgm:cxn modelId="{E5229B8F-6F95-4385-BFF6-FE524D397C4E}" type="presOf" srcId="{65A9CF9F-C018-4B6E-84D0-7F589B346169}" destId="{B4D23FF9-57E3-42B4-A7EC-53BEA845F009}" srcOrd="0" destOrd="0" presId="urn:microsoft.com/office/officeart/2005/8/layout/process1"/>
+    <dgm:cxn modelId="{CBB63302-9E50-4C5E-A313-C47AEAE3E8AD}" type="presOf" srcId="{2C1CA45A-9E01-425B-A98B-7CB05E79D89F}" destId="{786A3A9A-F140-449E-8678-74A146AE5613}" srcOrd="1" destOrd="0" presId="urn:microsoft.com/office/officeart/2005/8/layout/process1"/>
+    <dgm:cxn modelId="{9B58F889-4508-42CD-97A6-77FCBF0945FF}" srcId="{A9404D15-0FE2-48C7-B124-F3AA4084C521}" destId="{B9F8E4DD-44DF-4E1D-87FA-EE5364E8D2EC}" srcOrd="5" destOrd="0" parTransId="{9AE0AB3B-5C27-480B-9EA6-3EF53828B9C9}" sibTransId="{12C8F8D2-B214-469F-A5B8-137A5A5F5C78}"/>
+    <dgm:cxn modelId="{F625B371-5E3E-4007-9827-89E7DEB83445}" type="presOf" srcId="{00F39A38-0571-4035-837A-C97C40F3C796}" destId="{96D011E9-A295-45E0-A4EF-46653C059DAF}" srcOrd="0" destOrd="0" presId="urn:microsoft.com/office/officeart/2005/8/layout/process1"/>
+    <dgm:cxn modelId="{157B9DDD-8072-4D9B-B9ED-2F1C8B0698AD}" type="presOf" srcId="{104819FF-E3FD-4670-BF4C-75691EE1BC2F}" destId="{3060179B-F9E4-4C7A-A2C1-0E6B1FBF79A5}" srcOrd="0" destOrd="0" presId="urn:microsoft.com/office/officeart/2005/8/layout/process1"/>
+    <dgm:cxn modelId="{0C0067F0-4353-43C3-9EA1-11C636D07D95}" srcId="{A9404D15-0FE2-48C7-B124-F3AA4084C521}" destId="{0C1973F0-E5DA-4261-BF88-4987F488EC8F}" srcOrd="2" destOrd="0" parTransId="{4920E1E6-90CC-4B13-B6A6-36ACD0C94685}" sibTransId="{603E6C79-C511-4DA2-9B83-06FD848A88A9}"/>
     <dgm:cxn modelId="{23CB348B-EEE6-4FE1-8C1F-DB9B0B8E24A9}" type="presOf" srcId="{D1B971C2-4C0E-4B5D-A4F9-903AA47838E2}" destId="{D9B5B382-4419-4BCD-8C2A-B6D4D2CFE6ED}" srcOrd="0" destOrd="0" presId="urn:microsoft.com/office/officeart/2005/8/layout/process1"/>
-    <dgm:cxn modelId="{0C0067F0-4353-43C3-9EA1-11C636D07D95}" srcId="{A9404D15-0FE2-48C7-B124-F3AA4084C521}" destId="{0C1973F0-E5DA-4261-BF88-4987F488EC8F}" srcOrd="2" destOrd="0" parTransId="{4920E1E6-90CC-4B13-B6A6-36ACD0C94685}" sibTransId="{603E6C79-C511-4DA2-9B83-06FD848A88A9}"/>
-    <dgm:cxn modelId="{FC7DCF3C-A2DE-405F-ADB8-A02C90516DD1}" type="presOf" srcId="{65A9CF9F-C018-4B6E-84D0-7F589B346169}" destId="{C26E7E2D-83BD-4457-B475-F157B59F2827}" srcOrd="1" destOrd="0" presId="urn:microsoft.com/office/officeart/2005/8/layout/process1"/>
-    <dgm:cxn modelId="{999033E2-05A1-43ED-9ECA-4019AFBCA3E2}" srcId="{A9404D15-0FE2-48C7-B124-F3AA4084C521}" destId="{104819FF-E3FD-4670-BF4C-75691EE1BC2F}" srcOrd="7" destOrd="0" parTransId="{427F1791-DE8E-4502-9A6F-A3A1D2EB8565}" sibTransId="{076C8251-BC3F-479E-9F2F-D07A7FD938AC}"/>
+    <dgm:cxn modelId="{ACAAD77A-89FD-4024-9027-0937F7FA9114}" type="presOf" srcId="{12C8F8D2-B214-469F-A5B8-137A5A5F5C78}" destId="{24EF0AB0-63C7-4EC8-9063-AB9C1B23E1D0}" srcOrd="0" destOrd="0" presId="urn:microsoft.com/office/officeart/2005/8/layout/process1"/>
+    <dgm:cxn modelId="{3D957386-C475-4287-9D90-724A70D9D3FC}" type="presOf" srcId="{6B709411-2AF7-429D-BEE9-BF01DE9BD075}" destId="{FDCE0427-44E3-4613-A014-4EAD39419459}" srcOrd="0" destOrd="0" presId="urn:microsoft.com/office/officeart/2005/8/layout/process1"/>
     <dgm:cxn modelId="{60FF8F3F-D46C-4DA5-930F-1CF312F41540}" type="presOf" srcId="{DD1F5B78-5CC3-494F-BDE6-26B167A10048}" destId="{F8A8CF5F-F8B3-4BD3-8370-2B8EB78D0585}" srcOrd="1" destOrd="0" presId="urn:microsoft.com/office/officeart/2005/8/layout/process1"/>
-    <dgm:cxn modelId="{E5229B8F-6F95-4385-BFF6-FE524D397C4E}" type="presOf" srcId="{65A9CF9F-C018-4B6E-84D0-7F589B346169}" destId="{B4D23FF9-57E3-42B4-A7EC-53BEA845F009}" srcOrd="0" destOrd="0" presId="urn:microsoft.com/office/officeart/2005/8/layout/process1"/>
-    <dgm:cxn modelId="{157B9DDD-8072-4D9B-B9ED-2F1C8B0698AD}" type="presOf" srcId="{104819FF-E3FD-4670-BF4C-75691EE1BC2F}" destId="{3060179B-F9E4-4C7A-A2C1-0E6B1FBF79A5}" srcOrd="0" destOrd="0" presId="urn:microsoft.com/office/officeart/2005/8/layout/process1"/>
+    <dgm:cxn modelId="{56453020-4532-4705-B2A8-205693D71E37}" type="presOf" srcId="{603E6C79-C511-4DA2-9B83-06FD848A88A9}" destId="{0E210ADB-EB7B-4F5D-B29C-42824D602B86}" srcOrd="1" destOrd="0" presId="urn:microsoft.com/office/officeart/2005/8/layout/process1"/>
+    <dgm:cxn modelId="{24B53F25-169F-41DE-9A40-5E5130B6E336}" srcId="{A9404D15-0FE2-48C7-B124-F3AA4084C521}" destId="{00F39A38-0571-4035-837A-C97C40F3C796}" srcOrd="3" destOrd="0" parTransId="{B92E5754-698B-4252-AC8C-8E1FF4DB0706}" sibTransId="{DD1F5B78-5CC3-494F-BDE6-26B167A10048}"/>
+    <dgm:cxn modelId="{D34377F9-A8DD-4D5C-A2B4-E981805ACF11}" type="presOf" srcId="{A833BA43-9527-4913-863A-ADCED2EB30D7}" destId="{4C8CDEEC-2955-42A5-9846-0EFE6EED863D}" srcOrd="0" destOrd="0" presId="urn:microsoft.com/office/officeart/2005/8/layout/process1"/>
+    <dgm:cxn modelId="{E8712FD9-2B0F-42AB-9989-6491109666FA}" type="presOf" srcId="{A9404D15-0FE2-48C7-B124-F3AA4084C521}" destId="{4CE8EB27-9A4E-40ED-8DA0-76DAFD527696}" srcOrd="0" destOrd="0" presId="urn:microsoft.com/office/officeart/2005/8/layout/process1"/>
+    <dgm:cxn modelId="{C99227CA-4FB3-4AA8-AE23-93EA5835290E}" type="presOf" srcId="{0C1973F0-E5DA-4261-BF88-4987F488EC8F}" destId="{4ED1FBEA-F495-4C56-9A27-D2DACB3549B2}" srcOrd="0" destOrd="0" presId="urn:microsoft.com/office/officeart/2005/8/layout/process1"/>
     <dgm:cxn modelId="{0FF167D6-50CD-4BC1-B3EE-038320091596}" type="presOf" srcId="{DD1F5B78-5CC3-494F-BDE6-26B167A10048}" destId="{9D847244-6C20-4217-AEC3-92D406A09F26}" srcOrd="0" destOrd="0" presId="urn:microsoft.com/office/officeart/2005/8/layout/process1"/>
-    <dgm:cxn modelId="{E8712FD9-2B0F-42AB-9989-6491109666FA}" type="presOf" srcId="{A9404D15-0FE2-48C7-B124-F3AA4084C521}" destId="{4CE8EB27-9A4E-40ED-8DA0-76DAFD527696}" srcOrd="0" destOrd="0" presId="urn:microsoft.com/office/officeart/2005/8/layout/process1"/>
-    <dgm:cxn modelId="{7F800F7D-6FE0-495C-AADB-512D7BCCD851}" type="presOf" srcId="{603E6C79-C511-4DA2-9B83-06FD848A88A9}" destId="{40C0B906-B0F8-41AC-998E-CC6EAD196B0F}" srcOrd="0" destOrd="0" presId="urn:microsoft.com/office/officeart/2005/8/layout/process1"/>
-    <dgm:cxn modelId="{4EC19A8E-6646-4785-9DB4-9E638A94541B}" type="presOf" srcId="{D1B971C2-4C0E-4B5D-A4F9-903AA47838E2}" destId="{49509D84-2A66-412F-BC24-E3FA0246E3BF}" srcOrd="1" destOrd="0" presId="urn:microsoft.com/office/officeart/2005/8/layout/process1"/>
-    <dgm:cxn modelId="{F625B371-5E3E-4007-9827-89E7DEB83445}" type="presOf" srcId="{00F39A38-0571-4035-837A-C97C40F3C796}" destId="{96D011E9-A295-45E0-A4EF-46653C059DAF}" srcOrd="0" destOrd="0" presId="urn:microsoft.com/office/officeart/2005/8/layout/process1"/>
     <dgm:cxn modelId="{23012F35-5A92-4BFB-8168-885CB8659AE9}" type="presOf" srcId="{12C8F8D2-B214-469F-A5B8-137A5A5F5C78}" destId="{A4186596-4516-436E-B7F5-62BEA1A004B1}" srcOrd="1" destOrd="0" presId="urn:microsoft.com/office/officeart/2005/8/layout/process1"/>
-    <dgm:cxn modelId="{03CCAAE8-E3DB-45C0-A881-89DD89C72DE3}" type="presOf" srcId="{8455D91F-FCF9-4A14-84B9-0A5D80F085F5}" destId="{B93EC08B-667F-483B-AB6B-DDB49872FC96}" srcOrd="0" destOrd="0" presId="urn:microsoft.com/office/officeart/2005/8/layout/process1"/>
-    <dgm:cxn modelId="{24B53F25-169F-41DE-9A40-5E5130B6E336}" srcId="{A9404D15-0FE2-48C7-B124-F3AA4084C521}" destId="{00F39A38-0571-4035-837A-C97C40F3C796}" srcOrd="3" destOrd="0" parTransId="{B92E5754-698B-4252-AC8C-8E1FF4DB0706}" sibTransId="{DD1F5B78-5CC3-494F-BDE6-26B167A10048}"/>
-    <dgm:cxn modelId="{C500BF6E-EE84-4FF3-9E65-1A828429772F}" type="presOf" srcId="{2C1CA45A-9E01-425B-A98B-7CB05E79D89F}" destId="{4E210EBB-77AC-4270-8B31-8373F5B94957}" srcOrd="0" destOrd="0" presId="urn:microsoft.com/office/officeart/2005/8/layout/process1"/>
-    <dgm:cxn modelId="{ACAAD77A-89FD-4024-9027-0937F7FA9114}" type="presOf" srcId="{12C8F8D2-B214-469F-A5B8-137A5A5F5C78}" destId="{24EF0AB0-63C7-4EC8-9063-AB9C1B23E1D0}" srcOrd="0" destOrd="0" presId="urn:microsoft.com/office/officeart/2005/8/layout/process1"/>
-    <dgm:cxn modelId="{D88F314D-B319-411C-80BD-E54DDD456946}" type="presOf" srcId="{6B026640-4EB6-41D1-BD82-BCEE24D8EB18}" destId="{11F1FD18-8427-4210-8E38-B264AF8DA68F}" srcOrd="0" destOrd="0" presId="urn:microsoft.com/office/officeart/2005/8/layout/process1"/>
-    <dgm:cxn modelId="{7C844402-D793-4E0F-8BC2-BF63FB7DF95C}" srcId="{A9404D15-0FE2-48C7-B124-F3AA4084C521}" destId="{8455D91F-FCF9-4A14-84B9-0A5D80F085F5}" srcOrd="1" destOrd="0" parTransId="{94806B8D-0FA7-4FB4-A5D7-94786E09FC8B}" sibTransId="{D1B971C2-4C0E-4B5D-A4F9-903AA47838E2}"/>
-    <dgm:cxn modelId="{3D957386-C475-4287-9D90-724A70D9D3FC}" type="presOf" srcId="{6B709411-2AF7-429D-BEE9-BF01DE9BD075}" destId="{FDCE0427-44E3-4613-A014-4EAD39419459}" srcOrd="0" destOrd="0" presId="urn:microsoft.com/office/officeart/2005/8/layout/process1"/>
-    <dgm:cxn modelId="{56453020-4532-4705-B2A8-205693D71E37}" type="presOf" srcId="{603E6C79-C511-4DA2-9B83-06FD848A88A9}" destId="{0E210ADB-EB7B-4F5D-B29C-42824D602B86}" srcOrd="1" destOrd="0" presId="urn:microsoft.com/office/officeart/2005/8/layout/process1"/>
-    <dgm:cxn modelId="{CBB63302-9E50-4C5E-A313-C47AEAE3E8AD}" type="presOf" srcId="{2C1CA45A-9E01-425B-A98B-7CB05E79D89F}" destId="{786A3A9A-F140-449E-8678-74A146AE5613}" srcOrd="1" destOrd="0" presId="urn:microsoft.com/office/officeart/2005/8/layout/process1"/>
-    <dgm:cxn modelId="{BAE3115C-FF13-43E7-8E62-71625F88D60A}" srcId="{A9404D15-0FE2-48C7-B124-F3AA4084C521}" destId="{A833BA43-9527-4913-863A-ADCED2EB30D7}" srcOrd="6" destOrd="0" parTransId="{82063D08-BEDF-4B87-AA4E-19E5AF88A199}" sibTransId="{6B709411-2AF7-429D-BEE9-BF01DE9BD075}"/>
     <dgm:cxn modelId="{EE4030C3-0B05-4F68-846F-040FF6215F81}" srcId="{A9404D15-0FE2-48C7-B124-F3AA4084C521}" destId="{6B026640-4EB6-41D1-BD82-BCEE24D8EB18}" srcOrd="0" destOrd="0" parTransId="{8275F2A4-9222-4B11-A1D2-DC49191E0B47}" sibTransId="{65A9CF9F-C018-4B6E-84D0-7F589B346169}"/>
     <dgm:cxn modelId="{BD35440B-517F-4AE9-BBE9-ADF382C5A049}" type="presOf" srcId="{B7CD2013-BE13-47A0-B83A-8076EB8CFE0A}" destId="{260CCCBC-E5D3-4029-A377-D3549F00A094}" srcOrd="0" destOrd="0" presId="urn:microsoft.com/office/officeart/2005/8/layout/process1"/>
-    <dgm:cxn modelId="{673BFD6D-AB2C-483D-97E9-FB95D7E68D3F}" srcId="{A9404D15-0FE2-48C7-B124-F3AA4084C521}" destId="{B7CD2013-BE13-47A0-B83A-8076EB8CFE0A}" srcOrd="4" destOrd="0" parTransId="{1FE23C5F-6A05-4E5D-85FC-C7E7A17EECE6}" sibTransId="{2C1CA45A-9E01-425B-A98B-7CB05E79D89F}"/>
-    <dgm:cxn modelId="{C99227CA-4FB3-4AA8-AE23-93EA5835290E}" type="presOf" srcId="{0C1973F0-E5DA-4261-BF88-4987F488EC8F}" destId="{4ED1FBEA-F495-4C56-9A27-D2DACB3549B2}" srcOrd="0" destOrd="0" presId="urn:microsoft.com/office/officeart/2005/8/layout/process1"/>
-    <dgm:cxn modelId="{C55F99B7-EFCD-4A49-B287-64F17F42C094}" type="presOf" srcId="{6B709411-2AF7-429D-BEE9-BF01DE9BD075}" destId="{7BAAC852-AA74-4C61-A04C-FEDF32584A64}" srcOrd="1" destOrd="0" presId="urn:microsoft.com/office/officeart/2005/8/layout/process1"/>
-    <dgm:cxn modelId="{06218D6C-9858-4497-B9AA-A4F29029AD62}" type="presOf" srcId="{B9F8E4DD-44DF-4E1D-87FA-EE5364E8D2EC}" destId="{61BACCEA-61C1-4723-AF8C-1B36EEF6ABE5}" srcOrd="0" destOrd="0" presId="urn:microsoft.com/office/officeart/2005/8/layout/process1"/>
-    <dgm:cxn modelId="{9B58F889-4508-42CD-97A6-77FCBF0945FF}" srcId="{A9404D15-0FE2-48C7-B124-F3AA4084C521}" destId="{B9F8E4DD-44DF-4E1D-87FA-EE5364E8D2EC}" srcOrd="5" destOrd="0" parTransId="{9AE0AB3B-5C27-480B-9EA6-3EF53828B9C9}" sibTransId="{12C8F8D2-B214-469F-A5B8-137A5A5F5C78}"/>
-    <dgm:cxn modelId="{D34377F9-A8DD-4D5C-A2B4-E981805ACF11}" type="presOf" srcId="{A833BA43-9527-4913-863A-ADCED2EB30D7}" destId="{4C8CDEEC-2955-42A5-9846-0EFE6EED863D}" srcOrd="0" destOrd="0" presId="urn:microsoft.com/office/officeart/2005/8/layout/process1"/>
     <dgm:cxn modelId="{6D2BA475-556E-4C46-92BA-FDF60BC2776A}" type="presParOf" srcId="{4CE8EB27-9A4E-40ED-8DA0-76DAFD527696}" destId="{11F1FD18-8427-4210-8E38-B264AF8DA68F}" srcOrd="0" destOrd="0" presId="urn:microsoft.com/office/officeart/2005/8/layout/process1"/>
     <dgm:cxn modelId="{4F2BA390-9948-47DC-ABA9-9E560950AEEB}" type="presParOf" srcId="{4CE8EB27-9A4E-40ED-8DA0-76DAFD527696}" destId="{B4D23FF9-57E3-42B4-A7EC-53BEA845F009}" srcOrd="1" destOrd="0" presId="urn:microsoft.com/office/officeart/2005/8/layout/process1"/>
     <dgm:cxn modelId="{863074FB-A2CB-4D23-B39A-17CC4C57611F}" type="presParOf" srcId="{B4D23FF9-57E3-42B4-A7EC-53BEA845F009}" destId="{C26E7E2D-83BD-4457-B475-F157B59F2827}" srcOrd="0" destOrd="0" presId="urn:microsoft.com/office/officeart/2005/8/layout/process1"/>
@@ -5133,7 +5133,7 @@
   <dgm:whole/>
   <dgm:extLst>
     <a:ext uri="http://schemas.microsoft.com/office/drawing/2008/diagram">
-      <dsp:dataModelExt xmlns:dsp="http://schemas.microsoft.com/office/drawing/2008/diagram" xmlns="" relId="rId6" minVer="http://schemas.openxmlformats.org/drawingml/2006/diagram"/>
+      <dsp:dataModelExt xmlns:dsp="http://schemas.microsoft.com/office/drawing/2008/diagram" relId="rId6" minVer="http://schemas.openxmlformats.org/drawingml/2006/diagram"/>
     </a:ext>
   </dgm:extLst>
 </dgm:dataModel>
@@ -5758,37 +5758,37 @@
     </dgm:pt>
   </dgm:ptLst>
   <dgm:cxnLst>
+    <dgm:cxn modelId="{5F1D3798-7062-4201-8D7D-75B622E2203F}" type="presOf" srcId="{CA02BF23-DCC9-4E31-A073-6DFB23CA5B0C}" destId="{7A195775-A776-4477-AAE4-9045E67C6713}" srcOrd="0" destOrd="2" presId="urn:microsoft.com/office/officeart/2005/8/layout/process2"/>
+    <dgm:cxn modelId="{667F899A-2A28-448B-9D9D-146F6B9612BE}" type="presOf" srcId="{C675EFCB-F894-44D7-ABB2-D3B825DE6C66}" destId="{34F05ADA-F875-4E51-A411-35829CF438E0}" srcOrd="1" destOrd="0" presId="urn:microsoft.com/office/officeart/2005/8/layout/process2"/>
+    <dgm:cxn modelId="{759F95AE-8D02-4DF9-BC7F-0060BDADC3BC}" srcId="{D798F737-8283-4C0C-B96B-00E07F4FDD14}" destId="{C2E8DA81-00BD-4F1F-A3AD-327387590727}" srcOrd="1" destOrd="0" parTransId="{EF39F424-8D76-4FD1-995A-30D1C373EBEE}" sibTransId="{BC3EF7C7-D099-49A2-81FE-207303A85E91}"/>
+    <dgm:cxn modelId="{A8559640-26FD-4BBF-970B-2B6F0F4E71F7}" type="presOf" srcId="{D747E4EE-075C-4D50-9FBC-684C92DEA969}" destId="{C409EAA2-6C98-4D52-B1FB-5A72A5A21E56}" srcOrd="0" destOrd="2" presId="urn:microsoft.com/office/officeart/2005/8/layout/process2"/>
+    <dgm:cxn modelId="{8DD3BB3F-5259-44BB-B09C-15505DF3FE58}" type="presOf" srcId="{E18926CB-AA09-4AE3-98B9-CDF0672FFB09}" destId="{C409EAA2-6C98-4D52-B1FB-5A72A5A21E56}" srcOrd="0" destOrd="0" presId="urn:microsoft.com/office/officeart/2005/8/layout/process2"/>
+    <dgm:cxn modelId="{DE4FAFB8-F45C-44CF-A5C0-0217D14F751C}" srcId="{5A4C9242-0947-4829-9308-37674E420474}" destId="{B6564F96-94F9-4A14-9ABE-2DFB417ABFB4}" srcOrd="1" destOrd="0" parTransId="{C5E72ACE-601A-479D-8717-8B2D00D5D1F4}" sibTransId="{66D2DD8A-6EB2-4EFF-BA49-7C61C386FF4B}"/>
+    <dgm:cxn modelId="{A8DAAF8F-916F-4DD3-82C2-8AAEEABA9CCD}" srcId="{963AC17F-9D9F-489F-AB85-B501836E101D}" destId="{5A4C9242-0947-4829-9308-37674E420474}" srcOrd="3" destOrd="0" parTransId="{C7D08FD7-757C-402D-A4E8-FBC996A62204}" sibTransId="{C2218C3B-8E68-474E-AF1B-1FC939B5E0AA}"/>
+    <dgm:cxn modelId="{1E35FAEC-6BCD-4EA6-9FF8-95C1E665F2FB}" srcId="{E18926CB-AA09-4AE3-98B9-CDF0672FFB09}" destId="{D747E4EE-075C-4D50-9FBC-684C92DEA969}" srcOrd="1" destOrd="0" parTransId="{D1158A60-FC9A-4B34-B47D-957DA05D46AF}" sibTransId="{DE67E0E4-D972-4CBC-80CE-E149F586C431}"/>
+    <dgm:cxn modelId="{EB20A069-81BC-4E46-AA36-0CD84E94B9DC}" type="presOf" srcId="{B6564F96-94F9-4A14-9ABE-2DFB417ABFB4}" destId="{6000A985-A315-4B7F-A890-70B34583CE92}" srcOrd="0" destOrd="2" presId="urn:microsoft.com/office/officeart/2005/8/layout/process2"/>
+    <dgm:cxn modelId="{EEBD0890-5D1D-45D0-A673-83EF5B6CF93E}" srcId="{963AC17F-9D9F-489F-AB85-B501836E101D}" destId="{D798F737-8283-4C0C-B96B-00E07F4FDD14}" srcOrd="0" destOrd="0" parTransId="{CAFF2345-13B5-45E1-9F88-802EE05E9A5A}" sibTransId="{9BB1DDC0-334B-4402-B3AE-AC0150FA4BD3}"/>
+    <dgm:cxn modelId="{ADFD8FC7-DA52-45D6-8902-92FA5AD8886A}" srcId="{963AC17F-9D9F-489F-AB85-B501836E101D}" destId="{9CC09261-16CA-4EC2-B395-262CF4000709}" srcOrd="2" destOrd="0" parTransId="{782577F9-5BC1-42F2-9FA1-1899F9D10892}" sibTransId="{C675EFCB-F894-44D7-ABB2-D3B825DE6C66}"/>
+    <dgm:cxn modelId="{CA0F6E9C-ABA2-4982-94BD-AE5A4C76DC71}" type="presOf" srcId="{5A1D3876-754F-40F7-8F25-EF121EB41242}" destId="{7A195775-A776-4477-AAE4-9045E67C6713}" srcOrd="0" destOrd="1" presId="urn:microsoft.com/office/officeart/2005/8/layout/process2"/>
+    <dgm:cxn modelId="{BDC75906-D1EA-4068-ADB5-0EE8680A759B}" srcId="{9CC09261-16CA-4EC2-B395-262CF4000709}" destId="{CA02BF23-DCC9-4E31-A073-6DFB23CA5B0C}" srcOrd="1" destOrd="0" parTransId="{CA82F55B-88F0-4EA0-BA05-7ADDB73F354F}" sibTransId="{AA7AFD1A-683F-4E9E-AD6B-099050F410C8}"/>
+    <dgm:cxn modelId="{EE4EE5DA-C34F-4D77-94B0-2C6F3B0F3504}" type="presOf" srcId="{C2E8DA81-00BD-4F1F-A3AD-327387590727}" destId="{D3E295EC-B36B-46E1-8C2E-C99918E917EC}" srcOrd="0" destOrd="2" presId="urn:microsoft.com/office/officeart/2005/8/layout/process2"/>
+    <dgm:cxn modelId="{6B052875-3433-4123-8D60-4A09C1077132}" srcId="{963AC17F-9D9F-489F-AB85-B501836E101D}" destId="{E18926CB-AA09-4AE3-98B9-CDF0672FFB09}" srcOrd="1" destOrd="0" parTransId="{13023068-E6D3-4091-8291-6B68A166472A}" sibTransId="{3AC1E29E-F1DD-4B77-AB6D-E75AC072B2E4}"/>
+    <dgm:cxn modelId="{F3A626D7-A5B8-470F-8CD5-4182AE8499CB}" srcId="{5A4C9242-0947-4829-9308-37674E420474}" destId="{070E32FB-0F40-4A39-A84C-DFEBE682817C}" srcOrd="0" destOrd="0" parTransId="{7C19778F-918D-48E2-93F4-2DE5CA08DB7B}" sibTransId="{36FF2B40-A85D-4A8C-8AB3-2B7363776C42}"/>
+    <dgm:cxn modelId="{2740D879-874B-452C-8122-0720784E2714}" srcId="{E18926CB-AA09-4AE3-98B9-CDF0672FFB09}" destId="{E7398FED-6B4C-4A61-9914-D185AC780BAA}" srcOrd="0" destOrd="0" parTransId="{714FB7C3-9663-4D92-B40B-41DF7ED33370}" sibTransId="{DA15C907-E62A-4944-B869-6E7705582452}"/>
+    <dgm:cxn modelId="{1F6EC1D7-408C-464B-877C-49766C5BBB44}" type="presOf" srcId="{C675EFCB-F894-44D7-ABB2-D3B825DE6C66}" destId="{D9DFA680-0D7B-4961-822C-730E98277F49}" srcOrd="0" destOrd="0" presId="urn:microsoft.com/office/officeart/2005/8/layout/process2"/>
+    <dgm:cxn modelId="{F4191519-AF3F-455B-9351-F243A46AA717}" type="presOf" srcId="{070E32FB-0F40-4A39-A84C-DFEBE682817C}" destId="{6000A985-A315-4B7F-A890-70B34583CE92}" srcOrd="0" destOrd="1" presId="urn:microsoft.com/office/officeart/2005/8/layout/process2"/>
+    <dgm:cxn modelId="{BF504378-D8D4-42F8-9ECF-D423A7639A54}" type="presOf" srcId="{3AC1E29E-F1DD-4B77-AB6D-E75AC072B2E4}" destId="{6036B0E9-A64E-4557-997C-E9DA29D644EC}" srcOrd="1" destOrd="0" presId="urn:microsoft.com/office/officeart/2005/8/layout/process2"/>
+    <dgm:cxn modelId="{2DEC41D9-498E-4283-8B20-E46AEEB52C48}" type="presOf" srcId="{9CC09261-16CA-4EC2-B395-262CF4000709}" destId="{7A195775-A776-4477-AAE4-9045E67C6713}" srcOrd="0" destOrd="0" presId="urn:microsoft.com/office/officeart/2005/8/layout/process2"/>
+    <dgm:cxn modelId="{9E97AB53-5370-4C32-B7F4-AB71493D72F2}" type="presOf" srcId="{E7398FED-6B4C-4A61-9914-D185AC780BAA}" destId="{C409EAA2-6C98-4D52-B1FB-5A72A5A21E56}" srcOrd="0" destOrd="1" presId="urn:microsoft.com/office/officeart/2005/8/layout/process2"/>
+    <dgm:cxn modelId="{AC3D4589-C019-4597-8F3B-1602D8EF611E}" type="presOf" srcId="{5A4C9242-0947-4829-9308-37674E420474}" destId="{6000A985-A315-4B7F-A890-70B34583CE92}" srcOrd="0" destOrd="0" presId="urn:microsoft.com/office/officeart/2005/8/layout/process2"/>
+    <dgm:cxn modelId="{C0570E7E-72F2-40C7-A556-0A0721337B1D}" type="presOf" srcId="{D798F737-8283-4C0C-B96B-00E07F4FDD14}" destId="{D3E295EC-B36B-46E1-8C2E-C99918E917EC}" srcOrd="0" destOrd="0" presId="urn:microsoft.com/office/officeart/2005/8/layout/process2"/>
     <dgm:cxn modelId="{CEED8862-A0C0-463E-83C5-FE80CE7E9E64}" srcId="{9CC09261-16CA-4EC2-B395-262CF4000709}" destId="{5A1D3876-754F-40F7-8F25-EF121EB41242}" srcOrd="0" destOrd="0" parTransId="{066FFB11-22EE-4DB9-8CAD-EDC8D10BEA64}" sibTransId="{FA88543C-7F53-4179-BDD2-72B3E4AF4513}"/>
-    <dgm:cxn modelId="{A8559640-26FD-4BBF-970B-2B6F0F4E71F7}" type="presOf" srcId="{D747E4EE-075C-4D50-9FBC-684C92DEA969}" destId="{C409EAA2-6C98-4D52-B1FB-5A72A5A21E56}" srcOrd="0" destOrd="2" presId="urn:microsoft.com/office/officeart/2005/8/layout/process2"/>
+    <dgm:cxn modelId="{99DD22B3-A2F7-4992-997D-733A526A7DEB}" type="presOf" srcId="{444E769D-FE95-4234-9D62-6AA42C890900}" destId="{D3E295EC-B36B-46E1-8C2E-C99918E917EC}" srcOrd="0" destOrd="1" presId="urn:microsoft.com/office/officeart/2005/8/layout/process2"/>
+    <dgm:cxn modelId="{42B62EB6-6DF1-449A-BD1A-6938AEF1C5EC}" type="presOf" srcId="{9BB1DDC0-334B-4402-B3AE-AC0150FA4BD3}" destId="{F843E46D-AEEF-4983-80E8-6F20E00016FE}" srcOrd="1" destOrd="0" presId="urn:microsoft.com/office/officeart/2005/8/layout/process2"/>
+    <dgm:cxn modelId="{8126E19E-8EBC-4CEC-8032-3CA6E069C5DD}" type="presOf" srcId="{3AC1E29E-F1DD-4B77-AB6D-E75AC072B2E4}" destId="{EFE1D112-B732-47A2-AA00-01C441A1EB8D}" srcOrd="0" destOrd="0" presId="urn:microsoft.com/office/officeart/2005/8/layout/process2"/>
+    <dgm:cxn modelId="{DC4F27E3-4302-4190-A570-31CADB2D5824}" srcId="{D798F737-8283-4C0C-B96B-00E07F4FDD14}" destId="{444E769D-FE95-4234-9D62-6AA42C890900}" srcOrd="0" destOrd="0" parTransId="{CB7C3C04-0D7C-43BE-9963-2854077A5BF3}" sibTransId="{34D00DBC-F6CD-44C7-A3DE-B965518217E1}"/>
+    <dgm:cxn modelId="{74C85A84-9CAD-4E26-9DAF-46C5426F018E}" type="presOf" srcId="{9BB1DDC0-334B-4402-B3AE-AC0150FA4BD3}" destId="{28C96A49-E33C-46B7-9291-0DEC4204F35C}" srcOrd="0" destOrd="0" presId="urn:microsoft.com/office/officeart/2005/8/layout/process2"/>
     <dgm:cxn modelId="{710D4325-A422-4A29-A9C0-ADFB60EFC511}" type="presOf" srcId="{963AC17F-9D9F-489F-AB85-B501836E101D}" destId="{677F11FD-2259-43A0-8AE5-D03BD3E442C1}" srcOrd="0" destOrd="0" presId="urn:microsoft.com/office/officeart/2005/8/layout/process2"/>
-    <dgm:cxn modelId="{759F95AE-8D02-4DF9-BC7F-0060BDADC3BC}" srcId="{D798F737-8283-4C0C-B96B-00E07F4FDD14}" destId="{C2E8DA81-00BD-4F1F-A3AD-327387590727}" srcOrd="1" destOrd="0" parTransId="{EF39F424-8D76-4FD1-995A-30D1C373EBEE}" sibTransId="{BC3EF7C7-D099-49A2-81FE-207303A85E91}"/>
-    <dgm:cxn modelId="{CA0F6E9C-ABA2-4982-94BD-AE5A4C76DC71}" type="presOf" srcId="{5A1D3876-754F-40F7-8F25-EF121EB41242}" destId="{7A195775-A776-4477-AAE4-9045E67C6713}" srcOrd="0" destOrd="1" presId="urn:microsoft.com/office/officeart/2005/8/layout/process2"/>
-    <dgm:cxn modelId="{AC3D4589-C019-4597-8F3B-1602D8EF611E}" type="presOf" srcId="{5A4C9242-0947-4829-9308-37674E420474}" destId="{6000A985-A315-4B7F-A890-70B34583CE92}" srcOrd="0" destOrd="0" presId="urn:microsoft.com/office/officeart/2005/8/layout/process2"/>
-    <dgm:cxn modelId="{F3A626D7-A5B8-470F-8CD5-4182AE8499CB}" srcId="{5A4C9242-0947-4829-9308-37674E420474}" destId="{070E32FB-0F40-4A39-A84C-DFEBE682817C}" srcOrd="0" destOrd="0" parTransId="{7C19778F-918D-48E2-93F4-2DE5CA08DB7B}" sibTransId="{36FF2B40-A85D-4A8C-8AB3-2B7363776C42}"/>
-    <dgm:cxn modelId="{74C85A84-9CAD-4E26-9DAF-46C5426F018E}" type="presOf" srcId="{9BB1DDC0-334B-4402-B3AE-AC0150FA4BD3}" destId="{28C96A49-E33C-46B7-9291-0DEC4204F35C}" srcOrd="0" destOrd="0" presId="urn:microsoft.com/office/officeart/2005/8/layout/process2"/>
-    <dgm:cxn modelId="{EE4EE5DA-C34F-4D77-94B0-2C6F3B0F3504}" type="presOf" srcId="{C2E8DA81-00BD-4F1F-A3AD-327387590727}" destId="{D3E295EC-B36B-46E1-8C2E-C99918E917EC}" srcOrd="0" destOrd="2" presId="urn:microsoft.com/office/officeart/2005/8/layout/process2"/>
-    <dgm:cxn modelId="{2DEC41D9-498E-4283-8B20-E46AEEB52C48}" type="presOf" srcId="{9CC09261-16CA-4EC2-B395-262CF4000709}" destId="{7A195775-A776-4477-AAE4-9045E67C6713}" srcOrd="0" destOrd="0" presId="urn:microsoft.com/office/officeart/2005/8/layout/process2"/>
-    <dgm:cxn modelId="{EEBD0890-5D1D-45D0-A673-83EF5B6CF93E}" srcId="{963AC17F-9D9F-489F-AB85-B501836E101D}" destId="{D798F737-8283-4C0C-B96B-00E07F4FDD14}" srcOrd="0" destOrd="0" parTransId="{CAFF2345-13B5-45E1-9F88-802EE05E9A5A}" sibTransId="{9BB1DDC0-334B-4402-B3AE-AC0150FA4BD3}"/>
-    <dgm:cxn modelId="{42B62EB6-6DF1-449A-BD1A-6938AEF1C5EC}" type="presOf" srcId="{9BB1DDC0-334B-4402-B3AE-AC0150FA4BD3}" destId="{F843E46D-AEEF-4983-80E8-6F20E00016FE}" srcOrd="1" destOrd="0" presId="urn:microsoft.com/office/officeart/2005/8/layout/process2"/>
-    <dgm:cxn modelId="{ADFD8FC7-DA52-45D6-8902-92FA5AD8886A}" srcId="{963AC17F-9D9F-489F-AB85-B501836E101D}" destId="{9CC09261-16CA-4EC2-B395-262CF4000709}" srcOrd="2" destOrd="0" parTransId="{782577F9-5BC1-42F2-9FA1-1899F9D10892}" sibTransId="{C675EFCB-F894-44D7-ABB2-D3B825DE6C66}"/>
-    <dgm:cxn modelId="{EB20A069-81BC-4E46-AA36-0CD84E94B9DC}" type="presOf" srcId="{B6564F96-94F9-4A14-9ABE-2DFB417ABFB4}" destId="{6000A985-A315-4B7F-A890-70B34583CE92}" srcOrd="0" destOrd="2" presId="urn:microsoft.com/office/officeart/2005/8/layout/process2"/>
-    <dgm:cxn modelId="{99DD22B3-A2F7-4992-997D-733A526A7DEB}" type="presOf" srcId="{444E769D-FE95-4234-9D62-6AA42C890900}" destId="{D3E295EC-B36B-46E1-8C2E-C99918E917EC}" srcOrd="0" destOrd="1" presId="urn:microsoft.com/office/officeart/2005/8/layout/process2"/>
-    <dgm:cxn modelId="{A8DAAF8F-916F-4DD3-82C2-8AAEEABA9CCD}" srcId="{963AC17F-9D9F-489F-AB85-B501836E101D}" destId="{5A4C9242-0947-4829-9308-37674E420474}" srcOrd="3" destOrd="0" parTransId="{C7D08FD7-757C-402D-A4E8-FBC996A62204}" sibTransId="{C2218C3B-8E68-474E-AF1B-1FC939B5E0AA}"/>
-    <dgm:cxn modelId="{DE4FAFB8-F45C-44CF-A5C0-0217D14F751C}" srcId="{5A4C9242-0947-4829-9308-37674E420474}" destId="{B6564F96-94F9-4A14-9ABE-2DFB417ABFB4}" srcOrd="1" destOrd="0" parTransId="{C5E72ACE-601A-479D-8717-8B2D00D5D1F4}" sibTransId="{66D2DD8A-6EB2-4EFF-BA49-7C61C386FF4B}"/>
-    <dgm:cxn modelId="{6B052875-3433-4123-8D60-4A09C1077132}" srcId="{963AC17F-9D9F-489F-AB85-B501836E101D}" destId="{E18926CB-AA09-4AE3-98B9-CDF0672FFB09}" srcOrd="1" destOrd="0" parTransId="{13023068-E6D3-4091-8291-6B68A166472A}" sibTransId="{3AC1E29E-F1DD-4B77-AB6D-E75AC072B2E4}"/>
-    <dgm:cxn modelId="{DC4F27E3-4302-4190-A570-31CADB2D5824}" srcId="{D798F737-8283-4C0C-B96B-00E07F4FDD14}" destId="{444E769D-FE95-4234-9D62-6AA42C890900}" srcOrd="0" destOrd="0" parTransId="{CB7C3C04-0D7C-43BE-9963-2854077A5BF3}" sibTransId="{34D00DBC-F6CD-44C7-A3DE-B965518217E1}"/>
-    <dgm:cxn modelId="{C0570E7E-72F2-40C7-A556-0A0721337B1D}" type="presOf" srcId="{D798F737-8283-4C0C-B96B-00E07F4FDD14}" destId="{D3E295EC-B36B-46E1-8C2E-C99918E917EC}" srcOrd="0" destOrd="0" presId="urn:microsoft.com/office/officeart/2005/8/layout/process2"/>
-    <dgm:cxn modelId="{9E97AB53-5370-4C32-B7F4-AB71493D72F2}" type="presOf" srcId="{E7398FED-6B4C-4A61-9914-D185AC780BAA}" destId="{C409EAA2-6C98-4D52-B1FB-5A72A5A21E56}" srcOrd="0" destOrd="1" presId="urn:microsoft.com/office/officeart/2005/8/layout/process2"/>
-    <dgm:cxn modelId="{1E35FAEC-6BCD-4EA6-9FF8-95C1E665F2FB}" srcId="{E18926CB-AA09-4AE3-98B9-CDF0672FFB09}" destId="{D747E4EE-075C-4D50-9FBC-684C92DEA969}" srcOrd="1" destOrd="0" parTransId="{D1158A60-FC9A-4B34-B47D-957DA05D46AF}" sibTransId="{DE67E0E4-D972-4CBC-80CE-E149F586C431}"/>
-    <dgm:cxn modelId="{1F6EC1D7-408C-464B-877C-49766C5BBB44}" type="presOf" srcId="{C675EFCB-F894-44D7-ABB2-D3B825DE6C66}" destId="{D9DFA680-0D7B-4961-822C-730E98277F49}" srcOrd="0" destOrd="0" presId="urn:microsoft.com/office/officeart/2005/8/layout/process2"/>
-    <dgm:cxn modelId="{667F899A-2A28-448B-9D9D-146F6B9612BE}" type="presOf" srcId="{C675EFCB-F894-44D7-ABB2-D3B825DE6C66}" destId="{34F05ADA-F875-4E51-A411-35829CF438E0}" srcOrd="1" destOrd="0" presId="urn:microsoft.com/office/officeart/2005/8/layout/process2"/>
-    <dgm:cxn modelId="{8126E19E-8EBC-4CEC-8032-3CA6E069C5DD}" type="presOf" srcId="{3AC1E29E-F1DD-4B77-AB6D-E75AC072B2E4}" destId="{EFE1D112-B732-47A2-AA00-01C441A1EB8D}" srcOrd="0" destOrd="0" presId="urn:microsoft.com/office/officeart/2005/8/layout/process2"/>
-    <dgm:cxn modelId="{8DD3BB3F-5259-44BB-B09C-15505DF3FE58}" type="presOf" srcId="{E18926CB-AA09-4AE3-98B9-CDF0672FFB09}" destId="{C409EAA2-6C98-4D52-B1FB-5A72A5A21E56}" srcOrd="0" destOrd="0" presId="urn:microsoft.com/office/officeart/2005/8/layout/process2"/>
-    <dgm:cxn modelId="{F4191519-AF3F-455B-9351-F243A46AA717}" type="presOf" srcId="{070E32FB-0F40-4A39-A84C-DFEBE682817C}" destId="{6000A985-A315-4B7F-A890-70B34583CE92}" srcOrd="0" destOrd="1" presId="urn:microsoft.com/office/officeart/2005/8/layout/process2"/>
-    <dgm:cxn modelId="{5F1D3798-7062-4201-8D7D-75B622E2203F}" type="presOf" srcId="{CA02BF23-DCC9-4E31-A073-6DFB23CA5B0C}" destId="{7A195775-A776-4477-AAE4-9045E67C6713}" srcOrd="0" destOrd="2" presId="urn:microsoft.com/office/officeart/2005/8/layout/process2"/>
-    <dgm:cxn modelId="{BF504378-D8D4-42F8-9ECF-D423A7639A54}" type="presOf" srcId="{3AC1E29E-F1DD-4B77-AB6D-E75AC072B2E4}" destId="{6036B0E9-A64E-4557-997C-E9DA29D644EC}" srcOrd="1" destOrd="0" presId="urn:microsoft.com/office/officeart/2005/8/layout/process2"/>
-    <dgm:cxn modelId="{2740D879-874B-452C-8122-0720784E2714}" srcId="{E18926CB-AA09-4AE3-98B9-CDF0672FFB09}" destId="{E7398FED-6B4C-4A61-9914-D185AC780BAA}" srcOrd="0" destOrd="0" parTransId="{714FB7C3-9663-4D92-B40B-41DF7ED33370}" sibTransId="{DA15C907-E62A-4944-B869-6E7705582452}"/>
-    <dgm:cxn modelId="{BDC75906-D1EA-4068-ADB5-0EE8680A759B}" srcId="{9CC09261-16CA-4EC2-B395-262CF4000709}" destId="{CA02BF23-DCC9-4E31-A073-6DFB23CA5B0C}" srcOrd="1" destOrd="0" parTransId="{CA82F55B-88F0-4EA0-BA05-7ADDB73F354F}" sibTransId="{AA7AFD1A-683F-4E9E-AD6B-099050F410C8}"/>
     <dgm:cxn modelId="{FD235B32-52C8-4E32-911D-3471E5F0F4A5}" type="presParOf" srcId="{677F11FD-2259-43A0-8AE5-D03BD3E442C1}" destId="{D3E295EC-B36B-46E1-8C2E-C99918E917EC}" srcOrd="0" destOrd="0" presId="urn:microsoft.com/office/officeart/2005/8/layout/process2"/>
     <dgm:cxn modelId="{B5F4A869-FC11-4E92-8B52-BD4A8E78C7B8}" type="presParOf" srcId="{677F11FD-2259-43A0-8AE5-D03BD3E442C1}" destId="{28C96A49-E33C-46B7-9291-0DEC4204F35C}" srcOrd="1" destOrd="0" presId="urn:microsoft.com/office/officeart/2005/8/layout/process2"/>
     <dgm:cxn modelId="{4099B8D8-FA1B-4DCC-9899-CA0B99ED20B4}" type="presParOf" srcId="{28C96A49-E33C-46B7-9291-0DEC4204F35C}" destId="{F843E46D-AEEF-4983-80E8-6F20E00016FE}" srcOrd="0" destOrd="0" presId="urn:microsoft.com/office/officeart/2005/8/layout/process2"/>
@@ -5804,14 +5804,14 @@
   <dgm:whole/>
   <dgm:extLst>
     <a:ext uri="http://schemas.microsoft.com/office/drawing/2008/diagram">
-      <dsp:dataModelExt xmlns:dsp="http://schemas.microsoft.com/office/drawing/2008/diagram" xmlns="" relId="rId11" minVer="http://schemas.openxmlformats.org/drawingml/2006/diagram"/>
+      <dsp:dataModelExt xmlns:dsp="http://schemas.microsoft.com/office/drawing/2008/diagram" relId="rId11" minVer="http://schemas.openxmlformats.org/drawingml/2006/diagram"/>
     </a:ext>
   </dgm:extLst>
 </dgm:dataModel>
 </file>
 
 <file path=ppt/diagrams/drawing1.xml><?xml version="1.0" encoding="utf-8"?>
-<dsp:drawing xmlns:dgm="http://schemas.openxmlformats.org/drawingml/2006/diagram" xmlns:a="http://schemas.openxmlformats.org/drawingml/2006/main" xmlns:dsp="http://schemas.microsoft.com/office/drawing/2008/diagram">
+<dsp:drawing xmlns:dgm="http://schemas.openxmlformats.org/drawingml/2006/diagram" xmlns:dsp="http://schemas.microsoft.com/office/drawing/2008/diagram" xmlns:a="http://schemas.openxmlformats.org/drawingml/2006/main">
   <dsp:spTree>
     <dsp:nvGrpSpPr>
       <dsp:cNvPr id="0" name=""/>
@@ -5893,8 +5893,8 @@
         </a:p>
       </dsp:txBody>
       <dsp:txXfrm>
-        <a:off x="1379404" y="927284"/>
-        <a:ext cx="1122090" cy="1218202"/>
+        <a:off x="1412269" y="960149"/>
+        <a:ext cx="1056360" cy="1152472"/>
       </dsp:txXfrm>
     </dsp:sp>
     <dsp:sp modelId="{B4D23FF9-57E3-42B4-A7EC-53BEA845F009}">
@@ -5958,9 +5958,9 @@
           <a:endParaRPr lang="en-US" sz="1400" kern="1200" baseline="0"/>
         </a:p>
       </dsp:txBody>
-      <dsp:txXfrm rot="22337">
-        <a:off x="2530986" y="1403346"/>
-        <a:ext cx="696583" cy="278278"/>
+      <dsp:txXfrm>
+        <a:off x="2530987" y="1458731"/>
+        <a:ext cx="613100" cy="166966"/>
       </dsp:txXfrm>
     </dsp:sp>
     <dsp:sp modelId="{B93EC08B-667F-483B-AB6B-DDB49872FC96}">
@@ -6038,8 +6038,8 @@
         </a:p>
       </dsp:txBody>
       <dsp:txXfrm>
-        <a:off x="3235054" y="951398"/>
-        <a:ext cx="1122090" cy="1194088"/>
+        <a:off x="3267919" y="984263"/>
+        <a:ext cx="1056360" cy="1128358"/>
       </dsp:txXfrm>
     </dsp:sp>
     <dsp:sp modelId="{D9B5B382-4419-4BCD-8C2A-B6D4D2CFE6ED}">
@@ -6106,9 +6106,9 @@
           <a:endParaRPr lang="en-US" sz="1400" kern="1200" baseline="0"/>
         </a:p>
       </dsp:txBody>
-      <dsp:txXfrm rot="21552218">
-        <a:off x="4379006" y="1396693"/>
-        <a:ext cx="648494" cy="278278"/>
+      <dsp:txXfrm>
+        <a:off x="4379010" y="1452929"/>
+        <a:ext cx="565011" cy="166966"/>
       </dsp:txXfrm>
     </dsp:sp>
     <dsp:sp modelId="{4ED1FBEA-F495-4C56-9A27-D2DACB3549B2}">
@@ -6186,8 +6186,8 @@
         </a:p>
       </dsp:txBody>
       <dsp:txXfrm>
-        <a:off x="5029200" y="914402"/>
-        <a:ext cx="1122090" cy="1218202"/>
+        <a:off x="5062065" y="947267"/>
+        <a:ext cx="1056360" cy="1152472"/>
       </dsp:txXfrm>
     </dsp:sp>
     <dsp:sp modelId="{40C0B906-B0F8-41AC-998E-CC6EAD196B0F}">
@@ -6254,9 +6254,9 @@
           <a:endParaRPr lang="en-US" sz="1400" kern="1200" baseline="0"/>
         </a:p>
       </dsp:txBody>
-      <dsp:txXfrm rot="21064">
-        <a:off x="6190202" y="1390895"/>
-        <a:ext cx="931791" cy="278278"/>
+      <dsp:txXfrm>
+        <a:off x="6190203" y="1446295"/>
+        <a:ext cx="848308" cy="166966"/>
       </dsp:txXfrm>
     </dsp:sp>
     <dsp:sp modelId="{96D011E9-A295-45E0-A4EF-46653C059DAF}">
@@ -6334,8 +6334,8 @@
         </a:p>
       </dsp:txBody>
       <dsp:txXfrm>
-        <a:off x="7131499" y="927284"/>
-        <a:ext cx="1122090" cy="1218202"/>
+        <a:off x="7164364" y="960149"/>
+        <a:ext cx="1056360" cy="1152472"/>
       </dsp:txXfrm>
     </dsp:sp>
     <dsp:sp modelId="{9D847244-6C20-4217-AEC3-92D406A09F26}">
@@ -6402,9 +6402,9 @@
           <a:endParaRPr lang="en-US" sz="1400" kern="1200" baseline="0"/>
         </a:p>
       </dsp:txBody>
-      <dsp:txXfrm rot="9013634">
-        <a:off x="2159671" y="2928537"/>
-        <a:ext cx="5195372" cy="278278"/>
+      <dsp:txXfrm rot="10800000">
+        <a:off x="2237644" y="2963466"/>
+        <a:ext cx="5111889" cy="166966"/>
       </dsp:txXfrm>
     </dsp:sp>
     <dsp:sp modelId="{260CCCBC-E5D3-4029-A377-D3549F00A094}">
@@ -6482,8 +6482,8 @@
         </a:p>
       </dsp:txBody>
       <dsp:txXfrm>
-        <a:off x="1371600" y="4184010"/>
-        <a:ext cx="1122090" cy="1294933"/>
+        <a:off x="1404465" y="4216875"/>
+        <a:ext cx="1056360" cy="1229203"/>
       </dsp:txXfrm>
     </dsp:sp>
     <dsp:sp modelId="{4E210EBB-77AC-4270-8B31-8373F5B94957}">
@@ -6551,8 +6551,8 @@
         </a:p>
       </dsp:txBody>
       <dsp:txXfrm>
-        <a:off x="2487664" y="4692337"/>
-        <a:ext cx="739965" cy="278278"/>
+        <a:off x="2487664" y="4747993"/>
+        <a:ext cx="656482" cy="166966"/>
       </dsp:txXfrm>
     </dsp:sp>
     <dsp:sp modelId="{61BACCEA-61C1-4723-AF8C-1B36EEF6ABE5}">
@@ -6630,8 +6630,8 @@
         </a:p>
       </dsp:txBody>
       <dsp:txXfrm>
-        <a:off x="3200400" y="4184010"/>
-        <a:ext cx="1122090" cy="1294933"/>
+        <a:off x="3233265" y="4216875"/>
+        <a:ext cx="1056360" cy="1229203"/>
       </dsp:txXfrm>
     </dsp:sp>
     <dsp:sp modelId="{24EF0AB0-63C7-4EC8-9063-AB9C1B23E1D0}">
@@ -6698,9 +6698,9 @@
           <a:endParaRPr lang="en-US" sz="1400" kern="1200" baseline="0"/>
         </a:p>
       </dsp:txBody>
-      <dsp:txXfrm rot="15431">
-        <a:off x="4342739" y="4696489"/>
-        <a:ext cx="687414" cy="278278"/>
+      <dsp:txXfrm>
+        <a:off x="4342739" y="4751958"/>
+        <a:ext cx="603931" cy="166966"/>
       </dsp:txXfrm>
     </dsp:sp>
     <dsp:sp modelId="{4C8CDEEC-2955-42A5-9846-0EFE6EED863D}">
@@ -6778,8 +6778,8 @@
         </a:p>
       </dsp:txBody>
       <dsp:txXfrm>
-        <a:off x="5029200" y="4184010"/>
-        <a:ext cx="1122090" cy="1311352"/>
+        <a:off x="5062065" y="4216875"/>
+        <a:ext cx="1056360" cy="1245622"/>
       </dsp:txXfrm>
     </dsp:sp>
     <dsp:sp modelId="{FDCE0427-44E3-4613-A014-4EAD39419459}">
@@ -6846,9 +6846,9 @@
           <a:endParaRPr lang="en-US" sz="1400" kern="1200" baseline="0"/>
         </a:p>
       </dsp:txBody>
-      <dsp:txXfrm rot="24456">
-        <a:off x="6171572" y="4707127"/>
-        <a:ext cx="687346" cy="278278"/>
+      <dsp:txXfrm>
+        <a:off x="6171573" y="4762486"/>
+        <a:ext cx="603863" cy="166966"/>
       </dsp:txXfrm>
     </dsp:sp>
     <dsp:sp modelId="{3060179B-F9E4-4C7A-A2C1-0E6B1FBF79A5}">
@@ -6926,8 +6926,8 @@
         </a:p>
       </dsp:txBody>
       <dsp:txXfrm>
-        <a:off x="6858000" y="4184010"/>
-        <a:ext cx="1122090" cy="1337371"/>
+        <a:off x="6890865" y="4216875"/>
+        <a:ext cx="1056360" cy="1271641"/>
       </dsp:txXfrm>
     </dsp:sp>
   </dsp:spTree>
@@ -6935,7 +6935,7 @@
 </file>
 
 <file path=ppt/diagrams/drawing2.xml><?xml version="1.0" encoding="utf-8"?>
-<dsp:drawing xmlns:dgm="http://schemas.openxmlformats.org/drawingml/2006/diagram" xmlns:a="http://schemas.openxmlformats.org/drawingml/2006/main" xmlns:dsp="http://schemas.microsoft.com/office/drawing/2008/diagram">
+<dsp:drawing xmlns:dgm="http://schemas.openxmlformats.org/drawingml/2006/diagram" xmlns:dsp="http://schemas.microsoft.com/office/drawing/2008/diagram" xmlns:a="http://schemas.openxmlformats.org/drawingml/2006/main">
   <dsp:spTree>
     <dsp:nvGrpSpPr>
       <dsp:cNvPr id="0" name=""/>
@@ -7059,8 +7059,8 @@
         </a:p>
       </dsp:txBody>
       <dsp:txXfrm>
-        <a:off x="1264272" y="282849"/>
-        <a:ext cx="1115260" cy="568911"/>
+        <a:off x="1280935" y="299512"/>
+        <a:ext cx="1081934" cy="535585"/>
       </dsp:txXfrm>
     </dsp:sp>
     <dsp:sp modelId="{28C96A49-E33C-46B7-9291-0DEC4204F35C}">
@@ -7127,9 +7127,9 @@
           <a:endParaRPr lang="en-US" sz="1000" kern="1200"/>
         </a:p>
       </dsp:txBody>
-      <dsp:txXfrm rot="17551">
-        <a:off x="2419220" y="444603"/>
-        <a:ext cx="238138" cy="252717"/>
+      <dsp:txXfrm>
+        <a:off x="2419220" y="494964"/>
+        <a:ext cx="166697" cy="151631"/>
       </dsp:txXfrm>
     </dsp:sp>
     <dsp:sp modelId="{C409EAA2-6C98-4D52-B1FB-5A72A5A21E56}">
@@ -7266,8 +7266,8 @@
         </a:p>
       </dsp:txBody>
       <dsp:txXfrm>
-        <a:off x="2697046" y="290163"/>
-        <a:ext cx="1115260" cy="568911"/>
+        <a:off x="2713709" y="306826"/>
+        <a:ext cx="1081934" cy="535585"/>
       </dsp:txXfrm>
     </dsp:sp>
     <dsp:sp modelId="{EFE1D112-B732-47A2-AA00-01C441A1EB8D}">
@@ -7334,9 +7334,9 @@
           <a:endParaRPr lang="en-US" sz="1000" kern="1200"/>
         </a:p>
       </dsp:txBody>
-      <dsp:txXfrm rot="17557">
-        <a:off x="3851994" y="451919"/>
-        <a:ext cx="238138" cy="252717"/>
+      <dsp:txXfrm>
+        <a:off x="3851994" y="502280"/>
+        <a:ext cx="166697" cy="151631"/>
       </dsp:txXfrm>
     </dsp:sp>
     <dsp:sp modelId="{7A195775-A776-4477-AAE4-9045E67C6713}">
@@ -7460,8 +7460,8 @@
         </a:p>
       </dsp:txBody>
       <dsp:txXfrm>
-        <a:off x="4129820" y="297481"/>
-        <a:ext cx="1115260" cy="568911"/>
+        <a:off x="4146483" y="314144"/>
+        <a:ext cx="1081934" cy="535585"/>
       </dsp:txXfrm>
     </dsp:sp>
     <dsp:sp modelId="{D9DFA680-0D7B-4961-822C-730E98277F49}">
@@ -7528,9 +7528,9 @@
           <a:endParaRPr lang="en-US" sz="1000" kern="1200"/>
         </a:p>
       </dsp:txBody>
-      <dsp:txXfrm rot="17557">
-        <a:off x="5284770" y="459237"/>
-        <a:ext cx="238145" cy="252717"/>
+      <dsp:txXfrm>
+        <a:off x="5284770" y="509598"/>
+        <a:ext cx="166702" cy="151631"/>
       </dsp:txXfrm>
     </dsp:sp>
     <dsp:sp modelId="{6000A985-A315-4B7F-A890-70B34583CE92}">
@@ -7642,8 +7642,8 @@
         </a:p>
       </dsp:txBody>
       <dsp:txXfrm>
-        <a:off x="5562605" y="304798"/>
-        <a:ext cx="1115260" cy="568911"/>
+        <a:off x="5579268" y="321461"/>
+        <a:ext cx="1081934" cy="535585"/>
       </dsp:txXfrm>
     </dsp:sp>
   </dsp:spTree>
@@ -7651,7 +7651,7 @@
 </file>
 
 <file path=ppt/diagrams/drawing3.xml><?xml version="1.0" encoding="utf-8"?>
-<dsp:drawing xmlns:dgm="http://schemas.openxmlformats.org/drawingml/2006/diagram" xmlns:a="http://schemas.openxmlformats.org/drawingml/2006/main" xmlns:dsp="http://schemas.microsoft.com/office/drawing/2008/diagram">
+<dsp:drawing xmlns:dgm="http://schemas.openxmlformats.org/drawingml/2006/diagram" xmlns:dsp="http://schemas.microsoft.com/office/drawing/2008/diagram" xmlns:a="http://schemas.openxmlformats.org/drawingml/2006/main">
   <dsp:spTree>
     <dsp:nvGrpSpPr>
       <dsp:cNvPr id="0" name=""/>
@@ -7733,8 +7733,8 @@
         </a:p>
       </dsp:txBody>
       <dsp:txXfrm>
-        <a:off x="1379404" y="927284"/>
-        <a:ext cx="1122090" cy="1218202"/>
+        <a:off x="1412269" y="960149"/>
+        <a:ext cx="1056360" cy="1152472"/>
       </dsp:txXfrm>
     </dsp:sp>
     <dsp:sp modelId="{B4D23FF9-57E3-42B4-A7EC-53BEA845F009}">
@@ -7798,9 +7798,9 @@
           <a:endParaRPr lang="en-US" sz="1400" kern="1200" baseline="0"/>
         </a:p>
       </dsp:txBody>
-      <dsp:txXfrm rot="22337">
-        <a:off x="2530986" y="1403346"/>
-        <a:ext cx="696583" cy="278278"/>
+      <dsp:txXfrm>
+        <a:off x="2530987" y="1458731"/>
+        <a:ext cx="613100" cy="166966"/>
       </dsp:txXfrm>
     </dsp:sp>
     <dsp:sp modelId="{B93EC08B-667F-483B-AB6B-DDB49872FC96}">
@@ -7878,8 +7878,8 @@
         </a:p>
       </dsp:txBody>
       <dsp:txXfrm>
-        <a:off x="3235054" y="951398"/>
-        <a:ext cx="1122090" cy="1194088"/>
+        <a:off x="3267919" y="984263"/>
+        <a:ext cx="1056360" cy="1128358"/>
       </dsp:txXfrm>
     </dsp:sp>
     <dsp:sp modelId="{D9B5B382-4419-4BCD-8C2A-B6D4D2CFE6ED}">
@@ -7946,9 +7946,9 @@
           <a:endParaRPr lang="en-US" sz="1400" kern="1200" baseline="0"/>
         </a:p>
       </dsp:txBody>
-      <dsp:txXfrm rot="21552218">
-        <a:off x="4379006" y="1396693"/>
-        <a:ext cx="648494" cy="278278"/>
+      <dsp:txXfrm>
+        <a:off x="4379010" y="1452929"/>
+        <a:ext cx="565011" cy="166966"/>
       </dsp:txXfrm>
     </dsp:sp>
     <dsp:sp modelId="{4ED1FBEA-F495-4C56-9A27-D2DACB3549B2}">
@@ -8026,8 +8026,8 @@
         </a:p>
       </dsp:txBody>
       <dsp:txXfrm>
-        <a:off x="5029200" y="914402"/>
-        <a:ext cx="1122090" cy="1218202"/>
+        <a:off x="5062065" y="947267"/>
+        <a:ext cx="1056360" cy="1152472"/>
       </dsp:txXfrm>
     </dsp:sp>
     <dsp:sp modelId="{40C0B906-B0F8-41AC-998E-CC6EAD196B0F}">
@@ -8094,9 +8094,9 @@
           <a:endParaRPr lang="en-US" sz="1400" kern="1200" baseline="0"/>
         </a:p>
       </dsp:txBody>
-      <dsp:txXfrm rot="21064">
-        <a:off x="6190202" y="1390895"/>
-        <a:ext cx="931791" cy="278278"/>
+      <dsp:txXfrm>
+        <a:off x="6190203" y="1446295"/>
+        <a:ext cx="848308" cy="166966"/>
       </dsp:txXfrm>
     </dsp:sp>
     <dsp:sp modelId="{96D011E9-A295-45E0-A4EF-46653C059DAF}">
@@ -8174,8 +8174,8 @@
         </a:p>
       </dsp:txBody>
       <dsp:txXfrm>
-        <a:off x="7131499" y="927284"/>
-        <a:ext cx="1122090" cy="1218202"/>
+        <a:off x="7164364" y="960149"/>
+        <a:ext cx="1056360" cy="1152472"/>
       </dsp:txXfrm>
     </dsp:sp>
     <dsp:sp modelId="{9D847244-6C20-4217-AEC3-92D406A09F26}">
@@ -8242,9 +8242,9 @@
           <a:endParaRPr lang="en-US" sz="1400" kern="1200" baseline="0"/>
         </a:p>
       </dsp:txBody>
-      <dsp:txXfrm rot="9013634">
-        <a:off x="2159671" y="2928537"/>
-        <a:ext cx="5195372" cy="278278"/>
+      <dsp:txXfrm rot="10800000">
+        <a:off x="2237644" y="2963466"/>
+        <a:ext cx="5111889" cy="166966"/>
       </dsp:txXfrm>
     </dsp:sp>
     <dsp:sp modelId="{260CCCBC-E5D3-4029-A377-D3549F00A094}">
@@ -8322,8 +8322,8 @@
         </a:p>
       </dsp:txBody>
       <dsp:txXfrm>
-        <a:off x="1371600" y="4184010"/>
-        <a:ext cx="1122090" cy="1294933"/>
+        <a:off x="1404465" y="4216875"/>
+        <a:ext cx="1056360" cy="1229203"/>
       </dsp:txXfrm>
     </dsp:sp>
     <dsp:sp modelId="{4E210EBB-77AC-4270-8B31-8373F5B94957}">
@@ -8391,8 +8391,8 @@
         </a:p>
       </dsp:txBody>
       <dsp:txXfrm>
-        <a:off x="2487664" y="4692337"/>
-        <a:ext cx="739965" cy="278278"/>
+        <a:off x="2487664" y="4747993"/>
+        <a:ext cx="656482" cy="166966"/>
       </dsp:txXfrm>
     </dsp:sp>
     <dsp:sp modelId="{61BACCEA-61C1-4723-AF8C-1B36EEF6ABE5}">
@@ -8470,8 +8470,8 @@
         </a:p>
       </dsp:txBody>
       <dsp:txXfrm>
-        <a:off x="3200400" y="4184010"/>
-        <a:ext cx="1122090" cy="1294933"/>
+        <a:off x="3233265" y="4216875"/>
+        <a:ext cx="1056360" cy="1229203"/>
       </dsp:txXfrm>
     </dsp:sp>
     <dsp:sp modelId="{24EF0AB0-63C7-4EC8-9063-AB9C1B23E1D0}">
@@ -8538,9 +8538,9 @@
           <a:endParaRPr lang="en-US" sz="1400" kern="1200" baseline="0"/>
         </a:p>
       </dsp:txBody>
-      <dsp:txXfrm rot="15431">
-        <a:off x="4342739" y="4696489"/>
-        <a:ext cx="687414" cy="278278"/>
+      <dsp:txXfrm>
+        <a:off x="4342739" y="4751958"/>
+        <a:ext cx="603931" cy="166966"/>
       </dsp:txXfrm>
     </dsp:sp>
     <dsp:sp modelId="{4C8CDEEC-2955-42A5-9846-0EFE6EED863D}">
@@ -8618,8 +8618,8 @@
         </a:p>
       </dsp:txBody>
       <dsp:txXfrm>
-        <a:off x="5029200" y="4184010"/>
-        <a:ext cx="1122090" cy="1311352"/>
+        <a:off x="5062065" y="4216875"/>
+        <a:ext cx="1056360" cy="1245622"/>
       </dsp:txXfrm>
     </dsp:sp>
     <dsp:sp modelId="{FDCE0427-44E3-4613-A014-4EAD39419459}">
@@ -8686,9 +8686,9 @@
           <a:endParaRPr lang="en-US" sz="1400" kern="1200" baseline="0"/>
         </a:p>
       </dsp:txBody>
-      <dsp:txXfrm rot="24456">
-        <a:off x="6171572" y="4707127"/>
-        <a:ext cx="687346" cy="278278"/>
+      <dsp:txXfrm>
+        <a:off x="6171573" y="4762486"/>
+        <a:ext cx="603863" cy="166966"/>
       </dsp:txXfrm>
     </dsp:sp>
     <dsp:sp modelId="{3060179B-F9E4-4C7A-A2C1-0E6B1FBF79A5}">
@@ -8766,8 +8766,8 @@
         </a:p>
       </dsp:txBody>
       <dsp:txXfrm>
-        <a:off x="6858000" y="4184010"/>
-        <a:ext cx="1122090" cy="1337371"/>
+        <a:off x="6890865" y="4216875"/>
+        <a:ext cx="1056360" cy="1271641"/>
       </dsp:txXfrm>
     </dsp:sp>
   </dsp:spTree>
@@ -8775,7 +8775,7 @@
 </file>
 
 <file path=ppt/diagrams/drawing4.xml><?xml version="1.0" encoding="utf-8"?>
-<dsp:drawing xmlns:dgm="http://schemas.openxmlformats.org/drawingml/2006/diagram" xmlns:a="http://schemas.openxmlformats.org/drawingml/2006/main" xmlns:dsp="http://schemas.microsoft.com/office/drawing/2008/diagram">
+<dsp:drawing xmlns:dgm="http://schemas.openxmlformats.org/drawingml/2006/diagram" xmlns:dsp="http://schemas.microsoft.com/office/drawing/2008/diagram" xmlns:a="http://schemas.openxmlformats.org/drawingml/2006/main">
   <dsp:spTree>
     <dsp:nvGrpSpPr>
       <dsp:cNvPr id="0" name=""/>
@@ -8899,8 +8899,8 @@
         </a:p>
       </dsp:txBody>
       <dsp:txXfrm>
-        <a:off x="1264272" y="282849"/>
-        <a:ext cx="1115260" cy="568911"/>
+        <a:off x="1280935" y="299512"/>
+        <a:ext cx="1081934" cy="535585"/>
       </dsp:txXfrm>
     </dsp:sp>
     <dsp:sp modelId="{28C96A49-E33C-46B7-9291-0DEC4204F35C}">
@@ -8967,9 +8967,9 @@
           <a:endParaRPr lang="en-US" sz="1000" kern="1200"/>
         </a:p>
       </dsp:txBody>
-      <dsp:txXfrm rot="17551">
-        <a:off x="2419220" y="444603"/>
-        <a:ext cx="238138" cy="252717"/>
+      <dsp:txXfrm>
+        <a:off x="2419220" y="494964"/>
+        <a:ext cx="166697" cy="151631"/>
       </dsp:txXfrm>
     </dsp:sp>
     <dsp:sp modelId="{C409EAA2-6C98-4D52-B1FB-5A72A5A21E56}">
@@ -9106,8 +9106,8 @@
         </a:p>
       </dsp:txBody>
       <dsp:txXfrm>
-        <a:off x="2697046" y="290163"/>
-        <a:ext cx="1115260" cy="568911"/>
+        <a:off x="2713709" y="306826"/>
+        <a:ext cx="1081934" cy="535585"/>
       </dsp:txXfrm>
     </dsp:sp>
     <dsp:sp modelId="{EFE1D112-B732-47A2-AA00-01C441A1EB8D}">
@@ -9174,9 +9174,9 @@
           <a:endParaRPr lang="en-US" sz="1000" kern="1200"/>
         </a:p>
       </dsp:txBody>
-      <dsp:txXfrm rot="17557">
-        <a:off x="3851994" y="451919"/>
-        <a:ext cx="238138" cy="252717"/>
+      <dsp:txXfrm>
+        <a:off x="3851994" y="502280"/>
+        <a:ext cx="166697" cy="151631"/>
       </dsp:txXfrm>
     </dsp:sp>
     <dsp:sp modelId="{7A195775-A776-4477-AAE4-9045E67C6713}">
@@ -9300,8 +9300,8 @@
         </a:p>
       </dsp:txBody>
       <dsp:txXfrm>
-        <a:off x="4129820" y="297481"/>
-        <a:ext cx="1115260" cy="568911"/>
+        <a:off x="4146483" y="314144"/>
+        <a:ext cx="1081934" cy="535585"/>
       </dsp:txXfrm>
     </dsp:sp>
     <dsp:sp modelId="{D9DFA680-0D7B-4961-822C-730E98277F49}">
@@ -9368,9 +9368,9 @@
           <a:endParaRPr lang="en-US" sz="1000" kern="1200"/>
         </a:p>
       </dsp:txBody>
-      <dsp:txXfrm rot="17557">
-        <a:off x="5284770" y="459237"/>
-        <a:ext cx="238145" cy="252717"/>
+      <dsp:txXfrm>
+        <a:off x="5284770" y="509598"/>
+        <a:ext cx="166702" cy="151631"/>
       </dsp:txXfrm>
     </dsp:sp>
     <dsp:sp modelId="{6000A985-A315-4B7F-A890-70B34583CE92}">
@@ -9482,8 +9482,8 @@
         </a:p>
       </dsp:txBody>
       <dsp:txXfrm>
-        <a:off x="5562605" y="304798"/>
-        <a:ext cx="1115260" cy="568911"/>
+        <a:off x="5579268" y="321461"/>
+        <a:ext cx="1081934" cy="535585"/>
       </dsp:txXfrm>
     </dsp:sp>
   </dsp:spTree>
@@ -14327,7 +14327,7 @@
               <a:pPr>
                 <a:defRPr/>
               </a:pPr>
-              <a:t>24-1-2013</a:t>
+              <a:t>28-1-2013</a:t>
             </a:fld>
             <a:endParaRPr lang="nl-NL"/>
           </a:p>
@@ -14518,7 +14518,7 @@
               <a:pPr>
                 <a:defRPr/>
               </a:pPr>
-              <a:t>‹nr.›</a:t>
+              <a:t>‹#›</a:t>
             </a:fld>
             <a:endParaRPr lang="nl-NL"/>
           </a:p>
@@ -14527,7 +14527,7 @@
     </p:spTree>
     <p:extLst>
       <p:ext uri="{BB962C8B-B14F-4D97-AF65-F5344CB8AC3E}">
-        <p14:creationId xmlns="" xmlns:p14="http://schemas.microsoft.com/office/powerpoint/2010/main" val="942217321"/>
+        <p14:creationId xmlns:p14="http://schemas.microsoft.com/office/powerpoint/2010/main" val="942217321"/>
       </p:ext>
     </p:extLst>
   </p:cSld>
@@ -17030,7 +17030,7 @@
               <a:pPr>
                 <a:defRPr/>
               </a:pPr>
-              <a:t>24-1-2013</a:t>
+              <a:t>28-1-2013</a:t>
             </a:fld>
             <a:endParaRPr lang="nl-NL"/>
           </a:p>
@@ -17081,7 +17081,7 @@
               <a:pPr>
                 <a:defRPr/>
               </a:pPr>
-              <a:t>‹nr.›</a:t>
+              <a:t>‹#›</a:t>
             </a:fld>
             <a:endParaRPr lang="nl-NL"/>
           </a:p>
@@ -17210,7 +17210,7 @@
               <a:pPr>
                 <a:defRPr/>
               </a:pPr>
-              <a:t>24-1-2013</a:t>
+              <a:t>28-1-2013</a:t>
             </a:fld>
             <a:endParaRPr lang="nl-NL"/>
           </a:p>
@@ -17261,7 +17261,7 @@
               <a:pPr>
                 <a:defRPr/>
               </a:pPr>
-              <a:t>‹nr.›</a:t>
+              <a:t>‹#›</a:t>
             </a:fld>
             <a:endParaRPr lang="nl-NL"/>
           </a:p>
@@ -17400,7 +17400,7 @@
               <a:pPr>
                 <a:defRPr/>
               </a:pPr>
-              <a:t>24-1-2013</a:t>
+              <a:t>28-1-2013</a:t>
             </a:fld>
             <a:endParaRPr lang="nl-NL"/>
           </a:p>
@@ -17451,7 +17451,7 @@
               <a:pPr>
                 <a:defRPr/>
               </a:pPr>
-              <a:t>‹nr.›</a:t>
+              <a:t>‹#›</a:t>
             </a:fld>
             <a:endParaRPr lang="nl-NL"/>
           </a:p>
@@ -17580,7 +17580,7 @@
               <a:pPr>
                 <a:defRPr/>
               </a:pPr>
-              <a:t>24-1-2013</a:t>
+              <a:t>28-1-2013</a:t>
             </a:fld>
             <a:endParaRPr lang="nl-NL"/>
           </a:p>
@@ -17631,7 +17631,7 @@
               <a:pPr>
                 <a:defRPr/>
               </a:pPr>
-              <a:t>‹nr.›</a:t>
+              <a:t>‹#›</a:t>
             </a:fld>
             <a:endParaRPr lang="nl-NL"/>
           </a:p>
@@ -17836,7 +17836,7 @@
               <a:pPr>
                 <a:defRPr/>
               </a:pPr>
-              <a:t>24-1-2013</a:t>
+              <a:t>28-1-2013</a:t>
             </a:fld>
             <a:endParaRPr lang="nl-NL"/>
           </a:p>
@@ -17887,7 +17887,7 @@
               <a:pPr>
                 <a:defRPr/>
               </a:pPr>
-              <a:t>‹nr.›</a:t>
+              <a:t>‹#›</a:t>
             </a:fld>
             <a:endParaRPr lang="nl-NL"/>
           </a:p>
@@ -18134,7 +18134,7 @@
               <a:pPr>
                 <a:defRPr/>
               </a:pPr>
-              <a:t>24-1-2013</a:t>
+              <a:t>28-1-2013</a:t>
             </a:fld>
             <a:endParaRPr lang="nl-NL"/>
           </a:p>
@@ -18185,7 +18185,7 @@
               <a:pPr>
                 <a:defRPr/>
               </a:pPr>
-              <a:t>‹nr.›</a:t>
+              <a:t>‹#›</a:t>
             </a:fld>
             <a:endParaRPr lang="nl-NL"/>
           </a:p>
@@ -18566,7 +18566,7 @@
               <a:pPr>
                 <a:defRPr/>
               </a:pPr>
-              <a:t>24-1-2013</a:t>
+              <a:t>28-1-2013</a:t>
             </a:fld>
             <a:endParaRPr lang="nl-NL"/>
           </a:p>
@@ -18617,7 +18617,7 @@
               <a:pPr>
                 <a:defRPr/>
               </a:pPr>
-              <a:t>‹nr.›</a:t>
+              <a:t>‹#›</a:t>
             </a:fld>
             <a:endParaRPr lang="nl-NL"/>
           </a:p>
@@ -18694,7 +18694,7 @@
               <a:pPr>
                 <a:defRPr/>
               </a:pPr>
-              <a:t>24-1-2013</a:t>
+              <a:t>28-1-2013</a:t>
             </a:fld>
             <a:endParaRPr lang="nl-NL"/>
           </a:p>
@@ -18745,7 +18745,7 @@
               <a:pPr>
                 <a:defRPr/>
               </a:pPr>
-              <a:t>‹nr.›</a:t>
+              <a:t>‹#›</a:t>
             </a:fld>
             <a:endParaRPr lang="nl-NL"/>
           </a:p>
@@ -18799,7 +18799,7 @@
               <a:pPr>
                 <a:defRPr/>
               </a:pPr>
-              <a:t>24-1-2013</a:t>
+              <a:t>28-1-2013</a:t>
             </a:fld>
             <a:endParaRPr lang="nl-NL"/>
           </a:p>
@@ -18850,7 +18850,7 @@
               <a:pPr>
                 <a:defRPr/>
               </a:pPr>
-              <a:t>‹nr.›</a:t>
+              <a:t>‹#›</a:t>
             </a:fld>
             <a:endParaRPr lang="nl-NL"/>
           </a:p>
@@ -19086,7 +19086,7 @@
               <a:pPr>
                 <a:defRPr/>
               </a:pPr>
-              <a:t>24-1-2013</a:t>
+              <a:t>28-1-2013</a:t>
             </a:fld>
             <a:endParaRPr lang="nl-NL"/>
           </a:p>
@@ -19137,7 +19137,7 @@
               <a:pPr>
                 <a:defRPr/>
               </a:pPr>
-              <a:t>‹nr.›</a:t>
+              <a:t>‹#›</a:t>
             </a:fld>
             <a:endParaRPr lang="nl-NL"/>
           </a:p>
@@ -19349,7 +19349,7 @@
               <a:pPr>
                 <a:defRPr/>
               </a:pPr>
-              <a:t>24-1-2013</a:t>
+              <a:t>28-1-2013</a:t>
             </a:fld>
             <a:endParaRPr lang="nl-NL"/>
           </a:p>
@@ -19400,7 +19400,7 @@
               <a:pPr>
                 <a:defRPr/>
               </a:pPr>
-              <a:t>‹nr.›</a:t>
+              <a:t>‹#›</a:t>
             </a:fld>
             <a:endParaRPr lang="nl-NL"/>
           </a:p>
@@ -19572,7 +19572,7 @@
               <a:pPr>
                 <a:defRPr/>
               </a:pPr>
-              <a:t>24-1-2013</a:t>
+              <a:t>28-1-2013</a:t>
             </a:fld>
             <a:endParaRPr lang="nl-NL"/>
           </a:p>
@@ -19659,7 +19659,7 @@
               <a:pPr>
                 <a:defRPr/>
               </a:pPr>
-              <a:t>‹nr.›</a:t>
+              <a:t>‹#›</a:t>
             </a:fld>
             <a:endParaRPr lang="nl-NL"/>
           </a:p>
@@ -20308,7 +20308,7 @@
           <p:nvPr>
             <p:extLst>
               <p:ext uri="{D42A27DB-BD31-4B8C-83A1-F6EECF244321}">
-                <p14:modId xmlns="" xmlns:p14="http://schemas.microsoft.com/office/powerpoint/2010/main" val="3090677026"/>
+                <p14:modId xmlns:p14="http://schemas.microsoft.com/office/powerpoint/2010/main" val="3090677026"/>
               </p:ext>
             </p:extLst>
           </p:nvPr>
@@ -20402,7 +20402,7 @@
     </p:spTree>
     <p:extLst>
       <p:ext uri="{BB962C8B-B14F-4D97-AF65-F5344CB8AC3E}">
-        <p14:creationId xmlns="" xmlns:p14="http://schemas.microsoft.com/office/powerpoint/2010/main" val="3803839452"/>
+        <p14:creationId xmlns:p14="http://schemas.microsoft.com/office/powerpoint/2010/main" val="3803839452"/>
       </p:ext>
     </p:extLst>
   </p:cSld>
@@ -20878,13 +20878,8 @@
             </a:r>
             <a:r>
               <a:rPr lang="nl-NL" dirty="0" smtClean="0"/>
-              <a:t> </a:t>
-            </a:r>
-            <a:r>
-              <a:rPr lang="nl-NL" dirty="0" smtClean="0"/>
-              <a:t>Linux)</a:t>
-            </a:r>
-            <a:endParaRPr lang="nl-NL" dirty="0" smtClean="0"/>
+              <a:t> Linux)</a:t>
+            </a:r>
           </a:p>
           <a:p>
             <a:pPr eaLnBrk="1" hangingPunct="1"/>
@@ -21055,11 +21050,7 @@
             <a:pPr eaLnBrk="1" hangingPunct="1"/>
             <a:r>
               <a:rPr lang="en-US" dirty="0" smtClean="0"/>
-              <a:t>3 week trial </a:t>
-            </a:r>
-            <a:r>
-              <a:rPr lang="en-US" dirty="0" smtClean="0"/>
-              <a:t>version.</a:t>
+              <a:t>3 week trial version.</a:t>
             </a:r>
             <a:endParaRPr lang="en-US" dirty="0">
               <a:solidFill>
@@ -21423,7 +21414,6 @@
               <a:rPr lang="nl-NL" dirty="0" smtClean="0"/>
               <a:t>Freeware</a:t>
             </a:r>
-            <a:endParaRPr lang="nl-NL" dirty="0" smtClean="0"/>
           </a:p>
           <a:p>
             <a:pPr eaLnBrk="1" hangingPunct="1"/>
@@ -21873,7 +21863,6 @@
               <a:rPr lang="nl-NL" dirty="0" smtClean="0"/>
               <a:t> (&gt;97%?)  </a:t>
             </a:r>
-            <a:endParaRPr lang="nl-NL" dirty="0" smtClean="0"/>
           </a:p>
           <a:p>
             <a:endParaRPr lang="en-US" dirty="0"/>
@@ -22194,7 +22183,7 @@
         </p:nvSpPr>
         <p:spPr bwMode="auto">
           <a:xfrm>
-            <a:off x="539750" y="3025775"/>
+            <a:off x="540941" y="2703512"/>
             <a:ext cx="1584325" cy="366713"/>
           </a:xfrm>
           <a:prstGeom prst="rect">
@@ -22236,7 +22225,7 @@
         </p:nvSpPr>
         <p:spPr bwMode="auto">
           <a:xfrm>
-            <a:off x="539750" y="4129088"/>
+            <a:off x="588368" y="3501008"/>
             <a:ext cx="1584325" cy="366712"/>
           </a:xfrm>
           <a:prstGeom prst="rect">
@@ -22279,7 +22268,7 @@
         </p:nvSpPr>
         <p:spPr>
           <a:xfrm>
-            <a:off x="611560" y="5157192"/>
+            <a:off x="319964" y="4149080"/>
             <a:ext cx="1805302" cy="369332"/>
           </a:xfrm>
           <a:prstGeom prst="rect">
@@ -22307,13 +22296,81 @@
           </a:p>
         </p:txBody>
       </p:sp>
+      <p:sp>
+        <p:nvSpPr>
+          <p:cNvPr id="2" name="TextBox 1"/>
+          <p:cNvSpPr txBox="1"/>
+          <p:nvPr/>
+        </p:nvSpPr>
+        <p:spPr>
+          <a:xfrm>
+            <a:off x="1043608" y="5373216"/>
+            <a:ext cx="7857279" cy="1200329"/>
+          </a:xfrm>
+          <a:prstGeom prst="rect">
+            <a:avLst/>
+          </a:prstGeom>
+          <a:noFill/>
+        </p:spPr>
+        <p:txBody>
+          <a:bodyPr wrap="none" rtlCol="0">
+            <a:spAutoFit/>
+          </a:bodyPr>
+          <a:lstStyle/>
+          <a:p>
+            <a:r>
+              <a:rPr lang="en-US" dirty="0" smtClean="0"/>
+              <a:t>Though only </a:t>
+            </a:r>
+            <a:r>
+              <a:rPr lang="en-US" dirty="0" err="1" smtClean="0"/>
+              <a:t>Geneious</a:t>
+            </a:r>
+            <a:r>
+              <a:rPr lang="en-US" dirty="0" smtClean="0"/>
+              <a:t> provides </a:t>
+            </a:r>
+            <a:r>
+              <a:rPr lang="en-US" dirty="0" err="1" smtClean="0"/>
+              <a:t>Aquilaria</a:t>
+            </a:r>
+            <a:r>
+              <a:rPr lang="en-US" dirty="0" smtClean="0"/>
+              <a:t> in this sample,</a:t>
+            </a:r>
+          </a:p>
+          <a:p>
+            <a:r>
+              <a:rPr lang="en-US" dirty="0" smtClean="0"/>
+              <a:t> CITES-checker finds that exact hit on </a:t>
+            </a:r>
+            <a:r>
+              <a:rPr lang="en-US" dirty="0" err="1" smtClean="0"/>
+              <a:t>contig</a:t>
+            </a:r>
+            <a:r>
+              <a:rPr lang="en-US" dirty="0" smtClean="0"/>
+              <a:t> 5.</a:t>
+            </a:r>
+          </a:p>
+          <a:p>
+            <a:endParaRPr lang="en-US" dirty="0"/>
+          </a:p>
+        </p:txBody>
+      </p:sp>
       <p:graphicFrame>
         <p:nvGraphicFramePr>
-          <p:cNvPr id="4100" name="Object 4"/>
+          <p:cNvPr id="3" name="Object 2"/>
           <p:cNvGraphicFramePr>
             <a:graphicFrameLocks noChangeAspect="1"/>
           </p:cNvGraphicFramePr>
-          <p:nvPr/>
+          <p:nvPr>
+            <p:extLst>
+              <p:ext uri="{D42A27DB-BD31-4B8C-83A1-F6EECF244321}">
+                <p14:modId xmlns:p14="http://schemas.microsoft.com/office/powerpoint/2010/main" val="920746296"/>
+              </p:ext>
+            </p:extLst>
+          </p:nvPr>
         </p:nvGraphicFramePr>
         <p:xfrm>
           <a:off x="2411413" y="1628775"/>
@@ -22321,9 +22378,72 @@
         </p:xfrm>
         <a:graphic>
           <a:graphicData uri="http://schemas.openxmlformats.org/presentationml/2006/ole">
-            <p:oleObj spid="_x0000_s4100" name="Werkblad" r:id="rId4" imgW="7324655" imgH="4010040" progId="Excel.Sheet.12">
-              <p:embed/>
-            </p:oleObj>
+            <mc:AlternateContent xmlns:mc="http://schemas.openxmlformats.org/markup-compatibility/2006">
+              <mc:Choice xmlns:v="urn:schemas-microsoft-com:vml" Requires="v">
+                <p:oleObj spid="_x0000_s4107" name="Worksheet" r:id="rId4" imgW="7324655" imgH="4010040" progId="Excel.Sheet.12">
+                  <p:embed/>
+                </p:oleObj>
+              </mc:Choice>
+              <mc:Fallback>
+                <p:oleObj name="Worksheet" r:id="rId4" imgW="7324655" imgH="4010040" progId="Excel.Sheet.12">
+                  <p:embed/>
+                  <p:pic>
+                    <p:nvPicPr>
+                      <p:cNvPr id="0" name="Object 4"/>
+                      <p:cNvPicPr>
+                        <a:picLocks noChangeAspect="1" noChangeArrowheads="1"/>
+                      </p:cNvPicPr>
+                      <p:nvPr/>
+                    </p:nvPicPr>
+                    <p:blipFill>
+                      <a:blip r:embed="rId5">
+                        <a:extLst>
+                          <a:ext uri="{28A0092B-C50C-407E-A947-70E740481C1C}">
+                            <a14:useLocalDpi xmlns:a14="http://schemas.microsoft.com/office/drawing/2010/main" val="0"/>
+                          </a:ext>
+                        </a:extLst>
+                      </a:blip>
+                      <a:srcRect/>
+                      <a:stretch>
+                        <a:fillRect/>
+                      </a:stretch>
+                    </p:blipFill>
+                    <p:spPr bwMode="auto">
+                      <a:xfrm>
+                        <a:off x="2411413" y="1628775"/>
+                        <a:ext cx="7324725" cy="4010025"/>
+                      </a:xfrm>
+                      <a:prstGeom prst="rect">
+                        <a:avLst/>
+                      </a:prstGeom>
+                      <a:noFill/>
+                      <a:ln>
+                        <a:noFill/>
+                      </a:ln>
+                      <a:extLst>
+                        <a:ext uri="{909E8E84-426E-40DD-AFC4-6F175D3DCCD1}">
+                          <a14:hiddenFill xmlns:a14="http://schemas.microsoft.com/office/drawing/2010/main">
+                            <a:solidFill>
+                              <a:srgbClr val="FFFFFF"/>
+                            </a:solidFill>
+                          </a14:hiddenFill>
+                        </a:ext>
+                        <a:ext uri="{91240B29-F687-4F45-9708-019B960494DF}">
+                          <a14:hiddenLine xmlns:a14="http://schemas.microsoft.com/office/drawing/2010/main" w="9525">
+                            <a:solidFill>
+                              <a:srgbClr val="000000"/>
+                            </a:solidFill>
+                            <a:miter lim="800000"/>
+                            <a:headEnd/>
+                            <a:tailEnd/>
+                          </a14:hiddenLine>
+                        </a:ext>
+                      </a:extLst>
+                    </p:spPr>
+                  </p:pic>
+                </p:oleObj>
+              </mc:Fallback>
+            </mc:AlternateContent>
           </a:graphicData>
         </a:graphic>
       </p:graphicFrame>
@@ -22450,7 +22570,6 @@
               <a:rPr lang="en-US" sz="2400" dirty="0" smtClean="0"/>
               <a:t>Conclusions</a:t>
             </a:r>
-            <a:endParaRPr lang="en-US" sz="2400" dirty="0" smtClean="0"/>
           </a:p>
           <a:p>
             <a:pPr eaLnBrk="1" hangingPunct="1"/>
@@ -22663,7 +22782,7 @@
         </p:nvSpPr>
         <p:spPr bwMode="auto">
           <a:xfrm>
-            <a:off x="539552" y="1916832"/>
+            <a:off x="539750" y="1924050"/>
             <a:ext cx="2160588" cy="366713"/>
           </a:xfrm>
           <a:prstGeom prst="rect">
@@ -22687,20 +22806,11 @@
           <a:lstStyle/>
           <a:p>
             <a:r>
-              <a:rPr lang="nl-NL" sz="1800" dirty="0">
+              <a:rPr lang="nl-NL" sz="1800">
                 <a:latin typeface="Lucida Sans Unicode" charset="0"/>
               </a:rPr>
-              <a:t>CLC </a:t>
-            </a:r>
-            <a:r>
-              <a:rPr lang="nl-NL" sz="1800" dirty="0" err="1">
-                <a:latin typeface="Lucida Sans Unicode" charset="0"/>
-              </a:rPr>
-              <a:t>Bio</a:t>
-            </a:r>
-            <a:endParaRPr lang="nl-NL" sz="1800" dirty="0">
-              <a:latin typeface="Lucida Sans Unicode" charset="0"/>
-            </a:endParaRPr>
+              <a:t>CLC Bio</a:t>
+            </a:r>
           </a:p>
         </p:txBody>
       </p:sp>
@@ -22714,7 +22824,7 @@
         </p:nvSpPr>
         <p:spPr bwMode="auto">
           <a:xfrm>
-            <a:off x="539750" y="3025775"/>
+            <a:off x="540941" y="2703512"/>
             <a:ext cx="1584325" cy="366713"/>
           </a:xfrm>
           <a:prstGeom prst="rect">
@@ -22756,7 +22866,7 @@
         </p:nvSpPr>
         <p:spPr bwMode="auto">
           <a:xfrm>
-            <a:off x="539750" y="4129088"/>
+            <a:off x="588368" y="3501008"/>
             <a:ext cx="1584325" cy="366712"/>
           </a:xfrm>
           <a:prstGeom prst="rect">
@@ -22799,7 +22909,7 @@
         </p:nvSpPr>
         <p:spPr>
           <a:xfrm>
-            <a:off x="611560" y="5157192"/>
+            <a:off x="319964" y="4149080"/>
             <a:ext cx="1805302" cy="369332"/>
           </a:xfrm>
           <a:prstGeom prst="rect">
@@ -22829,11 +22939,17 @@
       </p:sp>
       <p:graphicFrame>
         <p:nvGraphicFramePr>
-          <p:cNvPr id="6146" name="Object 2"/>
+          <p:cNvPr id="4100" name="Object 4"/>
           <p:cNvGraphicFramePr>
             <a:graphicFrameLocks noChangeAspect="1"/>
           </p:cNvGraphicFramePr>
-          <p:nvPr/>
+          <p:nvPr>
+            <p:extLst>
+              <p:ext uri="{D42A27DB-BD31-4B8C-83A1-F6EECF244321}">
+                <p14:modId xmlns:p14="http://schemas.microsoft.com/office/powerpoint/2010/main" val="920746296"/>
+              </p:ext>
+            </p:extLst>
+          </p:nvPr>
         </p:nvGraphicFramePr>
         <p:xfrm>
           <a:off x="2411413" y="1628775"/>
@@ -22841,13 +22957,164 @@
         </p:xfrm>
         <a:graphic>
           <a:graphicData uri="http://schemas.openxmlformats.org/presentationml/2006/ole">
-            <p:oleObj spid="_x0000_s6146" name="Werkblad" r:id="rId4" imgW="7324655" imgH="4010040" progId="Excel.Sheet.12">
-              <p:embed/>
-            </p:oleObj>
+            <mc:AlternateContent xmlns:mc="http://schemas.openxmlformats.org/markup-compatibility/2006">
+              <mc:Choice xmlns:v="urn:schemas-microsoft-com:vml" Requires="v">
+                <p:oleObj spid="_x0000_s8197" name="Worksheet" r:id="rId4" imgW="7324655" imgH="4010040" progId="Excel.Sheet.12">
+                  <p:embed/>
+                </p:oleObj>
+              </mc:Choice>
+              <mc:Fallback>
+                <p:oleObj name="Worksheet" r:id="rId4" imgW="7324655" imgH="4010040" progId="Excel.Sheet.12">
+                  <p:embed/>
+                  <p:pic>
+                    <p:nvPicPr>
+                      <p:cNvPr id="0" name=""/>
+                      <p:cNvPicPr>
+                        <a:picLocks noChangeAspect="1" noChangeArrowheads="1"/>
+                      </p:cNvPicPr>
+                      <p:nvPr/>
+                    </p:nvPicPr>
+                    <p:blipFill>
+                      <a:blip r:embed="rId5"/>
+                      <a:srcRect/>
+                      <a:stretch>
+                        <a:fillRect/>
+                      </a:stretch>
+                    </p:blipFill>
+                    <p:spPr bwMode="auto">
+                      <a:xfrm>
+                        <a:off x="2411413" y="1628775"/>
+                        <a:ext cx="7324725" cy="4010025"/>
+                      </a:xfrm>
+                      <a:prstGeom prst="rect">
+                        <a:avLst/>
+                      </a:prstGeom>
+                      <a:noFill/>
+                      <a:extLst>
+                        <a:ext uri="{909E8E84-426E-40DD-AFC4-6F175D3DCCD1}">
+                          <a14:hiddenFill xmlns:a14="http://schemas.microsoft.com/office/drawing/2010/main">
+                            <a:solidFill>
+                              <a:srgbClr val="FFFFFF"/>
+                            </a:solidFill>
+                          </a14:hiddenFill>
+                        </a:ext>
+                      </a:extLst>
+                    </p:spPr>
+                  </p:pic>
+                </p:oleObj>
+              </mc:Fallback>
+            </mc:AlternateContent>
           </a:graphicData>
         </a:graphic>
       </p:graphicFrame>
+      <p:sp>
+        <p:nvSpPr>
+          <p:cNvPr id="2" name="TextBox 1"/>
+          <p:cNvSpPr txBox="1"/>
+          <p:nvPr/>
+        </p:nvSpPr>
+        <p:spPr>
+          <a:xfrm>
+            <a:off x="1043608" y="5373216"/>
+            <a:ext cx="7857279" cy="1200329"/>
+          </a:xfrm>
+          <a:prstGeom prst="rect">
+            <a:avLst/>
+          </a:prstGeom>
+          <a:noFill/>
+        </p:spPr>
+        <p:txBody>
+          <a:bodyPr wrap="none" rtlCol="0">
+            <a:spAutoFit/>
+          </a:bodyPr>
+          <a:lstStyle/>
+          <a:p>
+            <a:r>
+              <a:rPr lang="en-US" dirty="0" smtClean="0"/>
+              <a:t>Though only </a:t>
+            </a:r>
+            <a:r>
+              <a:rPr lang="en-US" dirty="0" err="1" smtClean="0"/>
+              <a:t>Geneious</a:t>
+            </a:r>
+            <a:r>
+              <a:rPr lang="en-US" dirty="0" smtClean="0"/>
+              <a:t> provides </a:t>
+            </a:r>
+            <a:r>
+              <a:rPr lang="en-US" dirty="0" err="1" smtClean="0"/>
+              <a:t>Aquilaria</a:t>
+            </a:r>
+            <a:r>
+              <a:rPr lang="en-US" dirty="0" smtClean="0"/>
+              <a:t> in this sample,</a:t>
+            </a:r>
+          </a:p>
+          <a:p>
+            <a:r>
+              <a:rPr lang="en-US" dirty="0" smtClean="0"/>
+              <a:t> CITES-checker finds that exact hit on </a:t>
+            </a:r>
+            <a:r>
+              <a:rPr lang="en-US" dirty="0" err="1" smtClean="0"/>
+              <a:t>contig</a:t>
+            </a:r>
+            <a:r>
+              <a:rPr lang="en-US" dirty="0" smtClean="0"/>
+              <a:t> 5.</a:t>
+            </a:r>
+          </a:p>
+          <a:p>
+            <a:endParaRPr lang="en-US" dirty="0"/>
+          </a:p>
+        </p:txBody>
+      </p:sp>
+      <p:sp>
+        <p:nvSpPr>
+          <p:cNvPr id="3" name="Up Arrow 2"/>
+          <p:cNvSpPr/>
+          <p:nvPr/>
+        </p:nvSpPr>
+        <p:spPr>
+          <a:xfrm rot="7004865">
+            <a:off x="2155178" y="3141791"/>
+            <a:ext cx="648072" cy="792088"/>
+          </a:xfrm>
+          <a:prstGeom prst="upArrow">
+            <a:avLst/>
+          </a:prstGeom>
+        </p:spPr>
+        <p:style>
+          <a:lnRef idx="2">
+            <a:schemeClr val="accent1">
+              <a:shade val="50000"/>
+            </a:schemeClr>
+          </a:lnRef>
+          <a:fillRef idx="1">
+            <a:schemeClr val="accent1"/>
+          </a:fillRef>
+          <a:effectRef idx="0">
+            <a:schemeClr val="accent1"/>
+          </a:effectRef>
+          <a:fontRef idx="minor">
+            <a:schemeClr val="lt1"/>
+          </a:fontRef>
+        </p:style>
+        <p:txBody>
+          <a:bodyPr rtlCol="0" anchor="ctr"/>
+          <a:lstStyle/>
+          <a:p>
+            <a:pPr algn="ctr"/>
+            <a:endParaRPr lang="en-US"/>
+          </a:p>
+        </p:txBody>
+      </p:sp>
     </p:spTree>
+    <p:extLst>
+      <p:ext uri="{BB962C8B-B14F-4D97-AF65-F5344CB8AC3E}">
+        <p14:creationId xmlns:p14="http://schemas.microsoft.com/office/powerpoint/2010/main" val="2258353348"/>
+      </p:ext>
+    </p:extLst>
   </p:cSld>
   <p:clrMapOvr>
     <a:masterClrMapping/>
@@ -22963,6 +23230,47 @@
           </a:ln>
         </p:spPr>
       </p:pic>
+      <p:sp>
+        <p:nvSpPr>
+          <p:cNvPr id="3" name="TextBox 2"/>
+          <p:cNvSpPr txBox="1"/>
+          <p:nvPr/>
+        </p:nvSpPr>
+        <p:spPr>
+          <a:xfrm>
+            <a:off x="611560" y="5350539"/>
+            <a:ext cx="8424936" cy="830997"/>
+          </a:xfrm>
+          <a:prstGeom prst="rect">
+            <a:avLst/>
+          </a:prstGeom>
+          <a:noFill/>
+        </p:spPr>
+        <p:txBody>
+          <a:bodyPr wrap="square" rtlCol="0">
+            <a:spAutoFit/>
+          </a:bodyPr>
+          <a:lstStyle/>
+          <a:p>
+            <a:r>
+              <a:rPr lang="en-US" dirty="0" smtClean="0"/>
+              <a:t>CITES-checker was included as well, using CLC BIO’s </a:t>
+            </a:r>
+            <a:r>
+              <a:rPr lang="en-US" smtClean="0"/>
+              <a:t/>
+            </a:r>
+            <a:br>
+              <a:rPr lang="en-US" smtClean="0"/>
+            </a:br>
+            <a:r>
+              <a:rPr lang="en-US" smtClean="0"/>
+              <a:t>Settings.</a:t>
+            </a:r>
+            <a:endParaRPr lang="en-US" dirty="0"/>
+          </a:p>
+        </p:txBody>
+      </p:sp>
     </p:spTree>
   </p:cSld>
   <p:clrMapOvr>
@@ -23130,7 +23438,7 @@
         </p:nvSpPr>
         <p:spPr bwMode="auto">
           <a:xfrm>
-            <a:off x="539750" y="3025775"/>
+            <a:off x="528638" y="2655887"/>
             <a:ext cx="1584325" cy="366713"/>
           </a:xfrm>
           <a:prstGeom prst="rect">
@@ -23154,7 +23462,7 @@
           <a:lstStyle/>
           <a:p>
             <a:r>
-              <a:rPr lang="nl-NL" sz="1800">
+              <a:rPr lang="nl-NL" sz="1800" dirty="0">
                 <a:latin typeface="Lucida Sans Unicode" pitchFamily="34" charset="0"/>
                 <a:cs typeface="Lucida Sans Unicode" pitchFamily="34" charset="0"/>
               </a:rPr>
@@ -23173,7 +23481,7 @@
         </p:nvSpPr>
         <p:spPr bwMode="auto">
           <a:xfrm>
-            <a:off x="539750" y="4129088"/>
+            <a:off x="539750" y="3429000"/>
             <a:ext cx="1584325" cy="366712"/>
           </a:xfrm>
           <a:prstGeom prst="rect">
@@ -23218,7 +23526,7 @@
         </p:nvSpPr>
         <p:spPr>
           <a:xfrm>
-            <a:off x="539552" y="5373216"/>
+            <a:off x="536749" y="4117722"/>
             <a:ext cx="1805302" cy="369332"/>
           </a:xfrm>
           <a:prstGeom prst="rect">
@@ -23252,7 +23560,13 @@
           <p:cNvGraphicFramePr>
             <a:graphicFrameLocks noChangeAspect="1"/>
           </p:cNvGraphicFramePr>
-          <p:nvPr/>
+          <p:nvPr>
+            <p:extLst>
+              <p:ext uri="{D42A27DB-BD31-4B8C-83A1-F6EECF244321}">
+                <p14:modId xmlns:p14="http://schemas.microsoft.com/office/powerpoint/2010/main" val="3450395534"/>
+              </p:ext>
+            </p:extLst>
+          </p:nvPr>
         </p:nvGraphicFramePr>
         <p:xfrm>
           <a:off x="2411413" y="1628775"/>
@@ -23260,13 +23574,62 @@
         </p:xfrm>
         <a:graphic>
           <a:graphicData uri="http://schemas.openxmlformats.org/presentationml/2006/ole">
-            <p:oleObj spid="_x0000_s7171" name="Werkblad" r:id="rId4" imgW="7324655" imgH="4010040" progId="Excel.Sheet.12">
-              <p:embed/>
-            </p:oleObj>
+            <mc:AlternateContent xmlns:mc="http://schemas.openxmlformats.org/markup-compatibility/2006">
+              <mc:Choice xmlns:v="urn:schemas-microsoft-com:vml" Requires="v">
+                <p:oleObj spid="_x0000_s9220" name="Worksheet" r:id="rId4" imgW="7324655" imgH="4010040" progId="Excel.Sheet.12">
+                  <p:embed/>
+                </p:oleObj>
+              </mc:Choice>
+              <mc:Fallback>
+                <p:oleObj name="Worksheet" r:id="rId4" imgW="7324655" imgH="4010040" progId="Excel.Sheet.12">
+                  <p:embed/>
+                  <p:pic>
+                    <p:nvPicPr>
+                      <p:cNvPr id="0" name=""/>
+                      <p:cNvPicPr>
+                        <a:picLocks noChangeAspect="1" noChangeArrowheads="1"/>
+                      </p:cNvPicPr>
+                      <p:nvPr/>
+                    </p:nvPicPr>
+                    <p:blipFill>
+                      <a:blip r:embed="rId5"/>
+                      <a:srcRect/>
+                      <a:stretch>
+                        <a:fillRect/>
+                      </a:stretch>
+                    </p:blipFill>
+                    <p:spPr bwMode="auto">
+                      <a:xfrm>
+                        <a:off x="2411413" y="1628775"/>
+                        <a:ext cx="7324725" cy="4010025"/>
+                      </a:xfrm>
+                      <a:prstGeom prst="rect">
+                        <a:avLst/>
+                      </a:prstGeom>
+                      <a:noFill/>
+                      <a:extLst>
+                        <a:ext uri="{909E8E84-426E-40DD-AFC4-6F175D3DCCD1}">
+                          <a14:hiddenFill xmlns:a14="http://schemas.microsoft.com/office/drawing/2010/main">
+                            <a:solidFill>
+                              <a:srgbClr val="FFFFFF"/>
+                            </a:solidFill>
+                          </a14:hiddenFill>
+                        </a:ext>
+                      </a:extLst>
+                    </p:spPr>
+                  </p:pic>
+                </p:oleObj>
+              </mc:Fallback>
+            </mc:AlternateContent>
           </a:graphicData>
         </a:graphic>
       </p:graphicFrame>
     </p:spTree>
+    <p:extLst>
+      <p:ext uri="{BB962C8B-B14F-4D97-AF65-F5344CB8AC3E}">
+        <p14:creationId xmlns:p14="http://schemas.microsoft.com/office/powerpoint/2010/main" val="3272947871"/>
+      </p:ext>
+    </p:extLst>
   </p:cSld>
   <p:clrMapOvr>
     <a:masterClrMapping/>
@@ -23440,7 +23803,7 @@
         </p:nvSpPr>
         <p:spPr bwMode="auto">
           <a:xfrm>
-            <a:off x="539750" y="3025775"/>
+            <a:off x="528638" y="2655887"/>
             <a:ext cx="1584325" cy="366713"/>
           </a:xfrm>
           <a:prstGeom prst="rect">
@@ -23464,7 +23827,7 @@
           <a:lstStyle/>
           <a:p>
             <a:r>
-              <a:rPr lang="nl-NL" sz="1800">
+              <a:rPr lang="nl-NL" sz="1800" dirty="0">
                 <a:latin typeface="Lucida Sans Unicode" pitchFamily="34" charset="0"/>
                 <a:cs typeface="Lucida Sans Unicode" pitchFamily="34" charset="0"/>
               </a:rPr>
@@ -23483,7 +23846,7 @@
         </p:nvSpPr>
         <p:spPr bwMode="auto">
           <a:xfrm>
-            <a:off x="539750" y="4129088"/>
+            <a:off x="539750" y="3429000"/>
             <a:ext cx="1584325" cy="366712"/>
           </a:xfrm>
           <a:prstGeom prst="rect">
@@ -23528,7 +23891,7 @@
         </p:nvSpPr>
         <p:spPr>
           <a:xfrm>
-            <a:off x="539552" y="5373216"/>
+            <a:off x="536749" y="4117722"/>
             <a:ext cx="1805302" cy="369332"/>
           </a:xfrm>
           <a:prstGeom prst="rect">
@@ -23553,6 +23916,181 @@
               <a:latin typeface="Lucida Sans Unicode" pitchFamily="34" charset="0"/>
               <a:cs typeface="Lucida Sans Unicode" pitchFamily="34" charset="0"/>
             </a:endParaRPr>
+          </a:p>
+        </p:txBody>
+      </p:sp>
+      <p:sp>
+        <p:nvSpPr>
+          <p:cNvPr id="2" name="Down Arrow 1"/>
+          <p:cNvSpPr/>
+          <p:nvPr/>
+        </p:nvSpPr>
+        <p:spPr>
+          <a:xfrm rot="18797192">
+            <a:off x="2171452" y="2929389"/>
+            <a:ext cx="781050" cy="864096"/>
+          </a:xfrm>
+          <a:prstGeom prst="downArrow">
+            <a:avLst/>
+          </a:prstGeom>
+        </p:spPr>
+        <p:style>
+          <a:lnRef idx="2">
+            <a:schemeClr val="accent1">
+              <a:shade val="50000"/>
+            </a:schemeClr>
+          </a:lnRef>
+          <a:fillRef idx="1">
+            <a:schemeClr val="accent1"/>
+          </a:fillRef>
+          <a:effectRef idx="0">
+            <a:schemeClr val="accent1"/>
+          </a:effectRef>
+          <a:fontRef idx="minor">
+            <a:schemeClr val="lt1"/>
+          </a:fontRef>
+        </p:style>
+        <p:txBody>
+          <a:bodyPr rtlCol="0" anchor="ctr"/>
+          <a:lstStyle/>
+          <a:p>
+            <a:pPr algn="ctr"/>
+            <a:endParaRPr lang="en-US"/>
+          </a:p>
+        </p:txBody>
+      </p:sp>
+      <p:graphicFrame>
+        <p:nvGraphicFramePr>
+          <p:cNvPr id="3" name="Object 2"/>
+          <p:cNvGraphicFramePr>
+            <a:graphicFrameLocks noChangeAspect="1"/>
+          </p:cNvGraphicFramePr>
+          <p:nvPr>
+            <p:extLst>
+              <p:ext uri="{D42A27DB-BD31-4B8C-83A1-F6EECF244321}">
+                <p14:modId xmlns:p14="http://schemas.microsoft.com/office/powerpoint/2010/main" val="3450395534"/>
+              </p:ext>
+            </p:extLst>
+          </p:nvPr>
+        </p:nvGraphicFramePr>
+        <p:xfrm>
+          <a:off x="2411413" y="1628775"/>
+          <a:ext cx="7324725" cy="4010025"/>
+        </p:xfrm>
+        <a:graphic>
+          <a:graphicData uri="http://schemas.openxmlformats.org/presentationml/2006/ole">
+            <mc:AlternateContent xmlns:mc="http://schemas.openxmlformats.org/markup-compatibility/2006">
+              <mc:Choice xmlns:v="urn:schemas-microsoft-com:vml" Requires="v">
+                <p:oleObj spid="_x0000_s7177" name="Worksheet" r:id="rId4" imgW="7324655" imgH="4010040" progId="Excel.Sheet.12">
+                  <p:embed/>
+                </p:oleObj>
+              </mc:Choice>
+              <mc:Fallback>
+                <p:oleObj name="Worksheet" r:id="rId4" imgW="7324655" imgH="4010040" progId="Excel.Sheet.12">
+                  <p:embed/>
+                  <p:pic>
+                    <p:nvPicPr>
+                      <p:cNvPr id="0" name="Object 3"/>
+                      <p:cNvPicPr>
+                        <a:picLocks noChangeAspect="1" noChangeArrowheads="1"/>
+                      </p:cNvPicPr>
+                      <p:nvPr/>
+                    </p:nvPicPr>
+                    <p:blipFill>
+                      <a:blip r:embed="rId5">
+                        <a:extLst>
+                          <a:ext uri="{28A0092B-C50C-407E-A947-70E740481C1C}">
+                            <a14:useLocalDpi xmlns:a14="http://schemas.microsoft.com/office/drawing/2010/main" val="0"/>
+                          </a:ext>
+                        </a:extLst>
+                      </a:blip>
+                      <a:srcRect/>
+                      <a:stretch>
+                        <a:fillRect/>
+                      </a:stretch>
+                    </p:blipFill>
+                    <p:spPr bwMode="auto">
+                      <a:xfrm>
+                        <a:off x="2411413" y="1628775"/>
+                        <a:ext cx="7324725" cy="4010025"/>
+                      </a:xfrm>
+                      <a:prstGeom prst="rect">
+                        <a:avLst/>
+                      </a:prstGeom>
+                      <a:noFill/>
+                      <a:ln>
+                        <a:noFill/>
+                      </a:ln>
+                      <a:extLst>
+                        <a:ext uri="{909E8E84-426E-40DD-AFC4-6F175D3DCCD1}">
+                          <a14:hiddenFill xmlns:a14="http://schemas.microsoft.com/office/drawing/2010/main">
+                            <a:solidFill>
+                              <a:srgbClr val="FFFFFF"/>
+                            </a:solidFill>
+                          </a14:hiddenFill>
+                        </a:ext>
+                        <a:ext uri="{91240B29-F687-4F45-9708-019B960494DF}">
+                          <a14:hiddenLine xmlns:a14="http://schemas.microsoft.com/office/drawing/2010/main" w="9525">
+                            <a:solidFill>
+                              <a:srgbClr val="000000"/>
+                            </a:solidFill>
+                            <a:miter lim="800000"/>
+                            <a:headEnd/>
+                            <a:tailEnd/>
+                          </a14:hiddenLine>
+                        </a:ext>
+                      </a:extLst>
+                    </p:spPr>
+                  </p:pic>
+                </p:oleObj>
+              </mc:Fallback>
+            </mc:AlternateContent>
+          </a:graphicData>
+        </a:graphic>
+      </p:graphicFrame>
+      <p:sp>
+        <p:nvSpPr>
+          <p:cNvPr id="4" name="TextBox 3"/>
+          <p:cNvSpPr txBox="1"/>
+          <p:nvPr/>
+        </p:nvSpPr>
+        <p:spPr>
+          <a:xfrm>
+            <a:off x="251520" y="4869160"/>
+            <a:ext cx="9073008" cy="830997"/>
+          </a:xfrm>
+          <a:prstGeom prst="rect">
+            <a:avLst/>
+          </a:prstGeom>
+          <a:noFill/>
+        </p:spPr>
+        <p:txBody>
+          <a:bodyPr wrap="square" rtlCol="0">
+            <a:spAutoFit/>
+          </a:bodyPr>
+          <a:lstStyle/>
+          <a:p>
+            <a:r>
+              <a:rPr lang="en-US" dirty="0" smtClean="0"/>
+              <a:t>Again, CITES-checker does not list the </a:t>
+            </a:r>
+            <a:r>
+              <a:rPr lang="en-US" dirty="0" err="1" smtClean="0"/>
+              <a:t>Aquilaria</a:t>
+            </a:r>
+            <a:r>
+              <a:rPr lang="en-US" dirty="0" smtClean="0"/>
+              <a:t> hit; however, CITES-checker still finds the exact same hit on </a:t>
+            </a:r>
+            <a:r>
+              <a:rPr lang="en-US" dirty="0" err="1" smtClean="0"/>
+              <a:t>contig</a:t>
+            </a:r>
+            <a:r>
+              <a:rPr lang="en-US" dirty="0" smtClean="0"/>
+              <a:t> 5 instead.</a:t>
+            </a:r>
+            <a:endParaRPr lang="en-US" dirty="0"/>
           </a:p>
         </p:txBody>
       </p:sp>
@@ -23751,11 +24289,7 @@
             </a:r>
             <a:r>
               <a:rPr lang="nl-NL" dirty="0" err="1" smtClean="0"/>
-              <a:t>G</a:t>
-            </a:r>
-            <a:r>
-              <a:rPr lang="nl-NL" dirty="0" err="1" smtClean="0"/>
-              <a:t>eneious</a:t>
+              <a:t>Geneious</a:t>
             </a:r>
             <a:r>
               <a:rPr lang="nl-NL" dirty="0" smtClean="0"/>
@@ -23931,15 +24465,7 @@
             </a:r>
             <a:r>
               <a:rPr lang="en-US" dirty="0" smtClean="0"/>
-              <a:t>Different programs use different </a:t>
-            </a:r>
-            <a:r>
-              <a:rPr lang="en-US" dirty="0" smtClean="0"/>
-              <a:t>default settings</a:t>
-            </a:r>
-            <a:r>
-              <a:rPr lang="en-US" dirty="0" smtClean="0"/>
-              <a:t>.</a:t>
+              <a:t>Different programs use different default settings.</a:t>
             </a:r>
           </a:p>
           <a:p>
@@ -23954,11 +24480,7 @@
             </a:r>
             <a:r>
               <a:rPr lang="nl-NL" dirty="0" smtClean="0"/>
-              <a:t> </a:t>
-            </a:r>
-            <a:r>
-              <a:rPr lang="nl-NL" dirty="0" smtClean="0"/>
-              <a:t>1: Different programs </a:t>
+              <a:t> 1: Different programs </a:t>
             </a:r>
             <a:r>
               <a:rPr lang="nl-NL" dirty="0" err="1" smtClean="0"/>
@@ -24166,11 +24688,7 @@
             </a:r>
             <a:r>
               <a:rPr lang="nl-NL" dirty="0" smtClean="0"/>
-              <a:t> </a:t>
-            </a:r>
-            <a:r>
-              <a:rPr lang="nl-NL" dirty="0" smtClean="0"/>
-              <a:t>2: </a:t>
+              <a:t> 2: </a:t>
             </a:r>
             <a:r>
               <a:rPr lang="nl-NL" dirty="0" err="1" smtClean="0"/>
@@ -24186,11 +24704,7 @@
             </a:r>
             <a:r>
               <a:rPr lang="nl-NL" dirty="0" smtClean="0"/>
-              <a:t> </a:t>
-            </a:r>
-            <a:r>
-              <a:rPr lang="nl-NL" dirty="0" smtClean="0"/>
-              <a:t>and </a:t>
+              <a:t> and </a:t>
             </a:r>
             <a:r>
               <a:rPr lang="nl-NL" dirty="0" err="1" smtClean="0"/>
@@ -24206,11 +24720,7 @@
             </a:r>
             <a:r>
               <a:rPr lang="nl-NL" dirty="0" smtClean="0"/>
-              <a:t> to the most accurate of the </a:t>
-            </a:r>
-            <a:r>
-              <a:rPr lang="nl-NL" dirty="0" smtClean="0"/>
-              <a:t>programs we </a:t>
+              <a:t> to the most accurate of the programs we </a:t>
             </a:r>
             <a:r>
               <a:rPr lang="nl-NL" dirty="0" err="1" smtClean="0"/>
@@ -24220,7 +24730,6 @@
               <a:rPr lang="nl-NL" dirty="0" smtClean="0"/>
               <a:t>.</a:t>
             </a:r>
-            <a:endParaRPr lang="nl-NL" dirty="0" smtClean="0"/>
           </a:p>
           <a:p>
             <a:pPr lvl="1" eaLnBrk="1" hangingPunct="1"/>
@@ -24506,13 +25015,7 @@
               <a:rPr lang="nl-NL" dirty="0" smtClean="0">
                 <a:latin typeface="Lucida Sans" pitchFamily="34" charset="0"/>
               </a:rPr>
-              <a:t> as medicines</a:t>
-            </a:r>
-            <a:r>
-              <a:rPr lang="nl-NL" dirty="0" smtClean="0">
-                <a:latin typeface="Lucida Sans" pitchFamily="34" charset="0"/>
-              </a:rPr>
-              <a:t> and </a:t>
+              <a:t> as medicines and </a:t>
             </a:r>
             <a:r>
               <a:rPr lang="nl-NL" dirty="0" err="1" smtClean="0">
@@ -24550,9 +25053,6 @@
               </a:rPr>
               <a:t>.</a:t>
             </a:r>
-            <a:endParaRPr lang="nl-NL" dirty="0" smtClean="0">
-              <a:latin typeface="Lucida Sans" pitchFamily="34" charset="0"/>
-            </a:endParaRPr>
           </a:p>
           <a:p>
             <a:pPr eaLnBrk="1" hangingPunct="1">
@@ -24953,9 +25453,6 @@
               </a:rPr>
               <a:t> NCBI and the CITES Appendices.</a:t>
             </a:r>
-            <a:endParaRPr lang="nl-NL" dirty="0" smtClean="0">
-              <a:latin typeface="Lucida Sans" pitchFamily="34" charset="0"/>
-            </a:endParaRPr>
           </a:p>
           <a:p>
             <a:pPr eaLnBrk="1" hangingPunct="1">
@@ -25708,9 +26205,6 @@
               </a:rPr>
               <a:t> surveillance</a:t>
             </a:r>
-            <a:endParaRPr lang="nl-NL" dirty="0" smtClean="0">
-              <a:latin typeface="Lucida Sans" pitchFamily="34" charset="0"/>
-            </a:endParaRPr>
           </a:p>
           <a:p>
             <a:pPr eaLnBrk="1" hangingPunct="1"/>
@@ -25730,13 +26224,7 @@
               <a:rPr lang="nl-NL" dirty="0" smtClean="0">
                 <a:latin typeface="Lucida Sans" pitchFamily="34" charset="0"/>
               </a:rPr>
-              <a:t> </a:t>
-            </a:r>
-            <a:r>
-              <a:rPr lang="nl-NL" dirty="0" smtClean="0">
-                <a:latin typeface="Lucida Sans" pitchFamily="34" charset="0"/>
-              </a:rPr>
-              <a:t>contents</a:t>
+              <a:t> contents</a:t>
             </a:r>
             <a:endParaRPr lang="en-US" dirty="0" smtClean="0">
               <a:latin typeface="Lucida Sans" pitchFamily="34" charset="0"/>
@@ -26022,13 +26510,7 @@
               <a:rPr lang="nl-NL" sz="2700" dirty="0" smtClean="0">
                 <a:latin typeface="Lucida Sans Unicode" charset="0"/>
               </a:rPr>
-              <a:t> </a:t>
-            </a:r>
-            <a:r>
-              <a:rPr lang="nl-NL" sz="2700" dirty="0" smtClean="0">
-                <a:latin typeface="Lucida Sans Unicode" charset="0"/>
-              </a:rPr>
-              <a:t>Markers</a:t>
+              <a:t> Markers</a:t>
             </a:r>
           </a:p>
           <a:p>
@@ -26352,18 +26834,7 @@
                 <a:ea typeface="Times New Roman" pitchFamily="18" charset="0"/>
                 <a:cs typeface="Calibri" pitchFamily="34" charset="0"/>
               </a:rPr>
-              <a:t>Writing reports in </a:t>
-            </a:r>
-            <a:r>
-              <a:rPr lang="en-US" dirty="0" smtClean="0">
-                <a:solidFill>
-                  <a:srgbClr val="00000A"/>
-                </a:solidFill>
-                <a:latin typeface="Calibri" pitchFamily="34" charset="0"/>
-                <a:ea typeface="Times New Roman" pitchFamily="18" charset="0"/>
-                <a:cs typeface="Calibri" pitchFamily="34" charset="0"/>
-              </a:rPr>
-              <a:t>English</a:t>
+              <a:t>Writing reports in English</a:t>
             </a:r>
             <a:endParaRPr lang="en-US" sz="800" dirty="0" smtClean="0">
               <a:latin typeface="Arial" pitchFamily="34" charset="0"/>
@@ -26423,29 +26894,7 @@
                 <a:ea typeface="Times New Roman" pitchFamily="18" charset="0"/>
                 <a:cs typeface="Calibri" pitchFamily="34" charset="0"/>
               </a:rPr>
-              <a:t>Learning </a:t>
-            </a:r>
-            <a:r>
-              <a:rPr lang="en-US" dirty="0" smtClean="0">
-                <a:solidFill>
-                  <a:srgbClr val="00000A"/>
-                </a:solidFill>
-                <a:latin typeface="Calibri" pitchFamily="34" charset="0"/>
-                <a:ea typeface="Times New Roman" pitchFamily="18" charset="0"/>
-                <a:cs typeface="Calibri" pitchFamily="34" charset="0"/>
-              </a:rPr>
-              <a:t>how to recommend software based on </a:t>
-            </a:r>
-            <a:r>
-              <a:rPr lang="en-US" dirty="0" smtClean="0">
-                <a:solidFill>
-                  <a:srgbClr val="00000A"/>
-                </a:solidFill>
-                <a:latin typeface="Calibri" pitchFamily="34" charset="0"/>
-                <a:ea typeface="Times New Roman" pitchFamily="18" charset="0"/>
-                <a:cs typeface="Calibri" pitchFamily="34" charset="0"/>
-              </a:rPr>
-              <a:t>our own research</a:t>
+              <a:t>Learning how to recommend software based on our own research</a:t>
             </a:r>
             <a:endParaRPr lang="en-US" sz="800" dirty="0" smtClean="0">
               <a:latin typeface="Arial" pitchFamily="34" charset="0"/>
@@ -26475,18 +26924,7 @@
                 <a:ea typeface="Times New Roman" pitchFamily="18" charset="0"/>
                 <a:cs typeface="Calibri" pitchFamily="34" charset="0"/>
               </a:rPr>
-              <a:t>Learning to work with Microsoft </a:t>
-            </a:r>
-            <a:r>
-              <a:rPr lang="en-US" dirty="0" smtClean="0">
-                <a:solidFill>
-                  <a:srgbClr val="00000A"/>
-                </a:solidFill>
-                <a:latin typeface="Calibri" pitchFamily="34" charset="0"/>
-                <a:ea typeface="Times New Roman" pitchFamily="18" charset="0"/>
-                <a:cs typeface="Calibri" pitchFamily="34" charset="0"/>
-              </a:rPr>
-              <a:t>Word</a:t>
+              <a:t>Learning to work with Microsoft Word</a:t>
             </a:r>
             <a:endParaRPr lang="en-US" sz="800" dirty="0" smtClean="0">
               <a:latin typeface="Arial" pitchFamily="34" charset="0"/>
@@ -26513,15 +26951,7 @@
                 <a:ea typeface="Times New Roman" pitchFamily="18" charset="0"/>
                 <a:cs typeface="Calibri" pitchFamily="34" charset="0"/>
               </a:rPr>
-              <a:t>Communication with teachers and </a:t>
-            </a:r>
-            <a:r>
-              <a:rPr lang="en-US" dirty="0" smtClean="0">
-                <a:latin typeface="Calibri" pitchFamily="34" charset="0"/>
-                <a:ea typeface="Times New Roman" pitchFamily="18" charset="0"/>
-                <a:cs typeface="Calibri" pitchFamily="34" charset="0"/>
-              </a:rPr>
-              <a:t>clients</a:t>
+              <a:t>Communication with teachers and clients</a:t>
             </a:r>
             <a:endParaRPr lang="en-US" sz="800" dirty="0" smtClean="0">
               <a:latin typeface="Arial" pitchFamily="34" charset="0"/>
@@ -27183,7 +27613,7 @@
           <p:nvPr>
             <p:extLst>
               <p:ext uri="{D42A27DB-BD31-4B8C-83A1-F6EECF244321}">
-                <p14:modId xmlns="" xmlns:p14="http://schemas.microsoft.com/office/powerpoint/2010/main" val="3090677026"/>
+                <p14:modId xmlns:p14="http://schemas.microsoft.com/office/powerpoint/2010/main" val="3090677026"/>
               </p:ext>
             </p:extLst>
           </p:nvPr>

</xml_diff>

<commit_message>
Presentatie, feedback dinsdag veranderingen
</commit_message>
<xml_diff>
--- a/doc/presentationV4.pptx
+++ b/doc/presentationV4.pptx
@@ -5761,11 +5761,11 @@
     <dgm:cxn modelId="{5F1D3798-7062-4201-8D7D-75B622E2203F}" type="presOf" srcId="{CA02BF23-DCC9-4E31-A073-6DFB23CA5B0C}" destId="{7A195775-A776-4477-AAE4-9045E67C6713}" srcOrd="0" destOrd="2" presId="urn:microsoft.com/office/officeart/2005/8/layout/process2"/>
     <dgm:cxn modelId="{667F899A-2A28-448B-9D9D-146F6B9612BE}" type="presOf" srcId="{C675EFCB-F894-44D7-ABB2-D3B825DE6C66}" destId="{34F05ADA-F875-4E51-A411-35829CF438E0}" srcOrd="1" destOrd="0" presId="urn:microsoft.com/office/officeart/2005/8/layout/process2"/>
     <dgm:cxn modelId="{759F95AE-8D02-4DF9-BC7F-0060BDADC3BC}" srcId="{D798F737-8283-4C0C-B96B-00E07F4FDD14}" destId="{C2E8DA81-00BD-4F1F-A3AD-327387590727}" srcOrd="1" destOrd="0" parTransId="{EF39F424-8D76-4FD1-995A-30D1C373EBEE}" sibTransId="{BC3EF7C7-D099-49A2-81FE-207303A85E91}"/>
+    <dgm:cxn modelId="{8DD3BB3F-5259-44BB-B09C-15505DF3FE58}" type="presOf" srcId="{E18926CB-AA09-4AE3-98B9-CDF0672FFB09}" destId="{C409EAA2-6C98-4D52-B1FB-5A72A5A21E56}" srcOrd="0" destOrd="0" presId="urn:microsoft.com/office/officeart/2005/8/layout/process2"/>
     <dgm:cxn modelId="{A8559640-26FD-4BBF-970B-2B6F0F4E71F7}" type="presOf" srcId="{D747E4EE-075C-4D50-9FBC-684C92DEA969}" destId="{C409EAA2-6C98-4D52-B1FB-5A72A5A21E56}" srcOrd="0" destOrd="2" presId="urn:microsoft.com/office/officeart/2005/8/layout/process2"/>
-    <dgm:cxn modelId="{8DD3BB3F-5259-44BB-B09C-15505DF3FE58}" type="presOf" srcId="{E18926CB-AA09-4AE3-98B9-CDF0672FFB09}" destId="{C409EAA2-6C98-4D52-B1FB-5A72A5A21E56}" srcOrd="0" destOrd="0" presId="urn:microsoft.com/office/officeart/2005/8/layout/process2"/>
     <dgm:cxn modelId="{DE4FAFB8-F45C-44CF-A5C0-0217D14F751C}" srcId="{5A4C9242-0947-4829-9308-37674E420474}" destId="{B6564F96-94F9-4A14-9ABE-2DFB417ABFB4}" srcOrd="1" destOrd="0" parTransId="{C5E72ACE-601A-479D-8717-8B2D00D5D1F4}" sibTransId="{66D2DD8A-6EB2-4EFF-BA49-7C61C386FF4B}"/>
+    <dgm:cxn modelId="{1E35FAEC-6BCD-4EA6-9FF8-95C1E665F2FB}" srcId="{E18926CB-AA09-4AE3-98B9-CDF0672FFB09}" destId="{D747E4EE-075C-4D50-9FBC-684C92DEA969}" srcOrd="1" destOrd="0" parTransId="{D1158A60-FC9A-4B34-B47D-957DA05D46AF}" sibTransId="{DE67E0E4-D972-4CBC-80CE-E149F586C431}"/>
     <dgm:cxn modelId="{A8DAAF8F-916F-4DD3-82C2-8AAEEABA9CCD}" srcId="{963AC17F-9D9F-489F-AB85-B501836E101D}" destId="{5A4C9242-0947-4829-9308-37674E420474}" srcOrd="3" destOrd="0" parTransId="{C7D08FD7-757C-402D-A4E8-FBC996A62204}" sibTransId="{C2218C3B-8E68-474E-AF1B-1FC939B5E0AA}"/>
-    <dgm:cxn modelId="{1E35FAEC-6BCD-4EA6-9FF8-95C1E665F2FB}" srcId="{E18926CB-AA09-4AE3-98B9-CDF0672FFB09}" destId="{D747E4EE-075C-4D50-9FBC-684C92DEA969}" srcOrd="1" destOrd="0" parTransId="{D1158A60-FC9A-4B34-B47D-957DA05D46AF}" sibTransId="{DE67E0E4-D972-4CBC-80CE-E149F586C431}"/>
     <dgm:cxn modelId="{EB20A069-81BC-4E46-AA36-0CD84E94B9DC}" type="presOf" srcId="{B6564F96-94F9-4A14-9ABE-2DFB417ABFB4}" destId="{6000A985-A315-4B7F-A890-70B34583CE92}" srcOrd="0" destOrd="2" presId="urn:microsoft.com/office/officeart/2005/8/layout/process2"/>
     <dgm:cxn modelId="{EEBD0890-5D1D-45D0-A673-83EF5B6CF93E}" srcId="{963AC17F-9D9F-489F-AB85-B501836E101D}" destId="{D798F737-8283-4C0C-B96B-00E07F4FDD14}" srcOrd="0" destOrd="0" parTransId="{CAFF2345-13B5-45E1-9F88-802EE05E9A5A}" sibTransId="{9BB1DDC0-334B-4402-B3AE-AC0150FA4BD3}"/>
     <dgm:cxn modelId="{ADFD8FC7-DA52-45D6-8902-92FA5AD8886A}" srcId="{963AC17F-9D9F-489F-AB85-B501836E101D}" destId="{9CC09261-16CA-4EC2-B395-262CF4000709}" srcOrd="2" destOrd="0" parTransId="{782577F9-5BC1-42F2-9FA1-1899F9D10892}" sibTransId="{C675EFCB-F894-44D7-ABB2-D3B825DE6C66}"/>
@@ -14327,7 +14327,7 @@
               <a:pPr>
                 <a:defRPr/>
               </a:pPr>
-              <a:t>28-1-2013</a:t>
+              <a:t>30-1-2013</a:t>
             </a:fld>
             <a:endParaRPr lang="nl-NL"/>
           </a:p>
@@ -17030,7 +17030,7 @@
               <a:pPr>
                 <a:defRPr/>
               </a:pPr>
-              <a:t>28-1-2013</a:t>
+              <a:t>30-1-2013</a:t>
             </a:fld>
             <a:endParaRPr lang="nl-NL"/>
           </a:p>
@@ -17210,7 +17210,7 @@
               <a:pPr>
                 <a:defRPr/>
               </a:pPr>
-              <a:t>28-1-2013</a:t>
+              <a:t>30-1-2013</a:t>
             </a:fld>
             <a:endParaRPr lang="nl-NL"/>
           </a:p>
@@ -17400,7 +17400,7 @@
               <a:pPr>
                 <a:defRPr/>
               </a:pPr>
-              <a:t>28-1-2013</a:t>
+              <a:t>30-1-2013</a:t>
             </a:fld>
             <a:endParaRPr lang="nl-NL"/>
           </a:p>
@@ -17580,7 +17580,7 @@
               <a:pPr>
                 <a:defRPr/>
               </a:pPr>
-              <a:t>28-1-2013</a:t>
+              <a:t>30-1-2013</a:t>
             </a:fld>
             <a:endParaRPr lang="nl-NL"/>
           </a:p>
@@ -17836,7 +17836,7 @@
               <a:pPr>
                 <a:defRPr/>
               </a:pPr>
-              <a:t>28-1-2013</a:t>
+              <a:t>30-1-2013</a:t>
             </a:fld>
             <a:endParaRPr lang="nl-NL"/>
           </a:p>
@@ -18134,7 +18134,7 @@
               <a:pPr>
                 <a:defRPr/>
               </a:pPr>
-              <a:t>28-1-2013</a:t>
+              <a:t>30-1-2013</a:t>
             </a:fld>
             <a:endParaRPr lang="nl-NL"/>
           </a:p>
@@ -18566,7 +18566,7 @@
               <a:pPr>
                 <a:defRPr/>
               </a:pPr>
-              <a:t>28-1-2013</a:t>
+              <a:t>30-1-2013</a:t>
             </a:fld>
             <a:endParaRPr lang="nl-NL"/>
           </a:p>
@@ -18694,7 +18694,7 @@
               <a:pPr>
                 <a:defRPr/>
               </a:pPr>
-              <a:t>28-1-2013</a:t>
+              <a:t>30-1-2013</a:t>
             </a:fld>
             <a:endParaRPr lang="nl-NL"/>
           </a:p>
@@ -18799,7 +18799,7 @@
               <a:pPr>
                 <a:defRPr/>
               </a:pPr>
-              <a:t>28-1-2013</a:t>
+              <a:t>30-1-2013</a:t>
             </a:fld>
             <a:endParaRPr lang="nl-NL"/>
           </a:p>
@@ -19086,7 +19086,7 @@
               <a:pPr>
                 <a:defRPr/>
               </a:pPr>
-              <a:t>28-1-2013</a:t>
+              <a:t>30-1-2013</a:t>
             </a:fld>
             <a:endParaRPr lang="nl-NL"/>
           </a:p>
@@ -19349,7 +19349,7 @@
               <a:pPr>
                 <a:defRPr/>
               </a:pPr>
-              <a:t>28-1-2013</a:t>
+              <a:t>30-1-2013</a:t>
             </a:fld>
             <a:endParaRPr lang="nl-NL"/>
           </a:p>
@@ -19572,7 +19572,7 @@
               <a:pPr>
                 <a:defRPr/>
               </a:pPr>
-              <a:t>28-1-2013</a:t>
+              <a:t>30-1-2013</a:t>
             </a:fld>
             <a:endParaRPr lang="nl-NL"/>
           </a:p>
@@ -22296,68 +22296,6 @@
           </a:p>
         </p:txBody>
       </p:sp>
-      <p:sp>
-        <p:nvSpPr>
-          <p:cNvPr id="2" name="TextBox 1"/>
-          <p:cNvSpPr txBox="1"/>
-          <p:nvPr/>
-        </p:nvSpPr>
-        <p:spPr>
-          <a:xfrm>
-            <a:off x="1043608" y="5373216"/>
-            <a:ext cx="7857279" cy="1200329"/>
-          </a:xfrm>
-          <a:prstGeom prst="rect">
-            <a:avLst/>
-          </a:prstGeom>
-          <a:noFill/>
-        </p:spPr>
-        <p:txBody>
-          <a:bodyPr wrap="none" rtlCol="0">
-            <a:spAutoFit/>
-          </a:bodyPr>
-          <a:lstStyle/>
-          <a:p>
-            <a:r>
-              <a:rPr lang="en-US" dirty="0" smtClean="0"/>
-              <a:t>Though only </a:t>
-            </a:r>
-            <a:r>
-              <a:rPr lang="en-US" dirty="0" err="1" smtClean="0"/>
-              <a:t>Geneious</a:t>
-            </a:r>
-            <a:r>
-              <a:rPr lang="en-US" dirty="0" smtClean="0"/>
-              <a:t> provides </a:t>
-            </a:r>
-            <a:r>
-              <a:rPr lang="en-US" dirty="0" err="1" smtClean="0"/>
-              <a:t>Aquilaria</a:t>
-            </a:r>
-            <a:r>
-              <a:rPr lang="en-US" dirty="0" smtClean="0"/>
-              <a:t> in this sample,</a:t>
-            </a:r>
-          </a:p>
-          <a:p>
-            <a:r>
-              <a:rPr lang="en-US" dirty="0" smtClean="0"/>
-              <a:t> CITES-checker finds that exact hit on </a:t>
-            </a:r>
-            <a:r>
-              <a:rPr lang="en-US" dirty="0" err="1" smtClean="0"/>
-              <a:t>contig</a:t>
-            </a:r>
-            <a:r>
-              <a:rPr lang="en-US" dirty="0" smtClean="0"/>
-              <a:t> 5.</a:t>
-            </a:r>
-          </a:p>
-          <a:p>
-            <a:endParaRPr lang="en-US" dirty="0"/>
-          </a:p>
-        </p:txBody>
-      </p:sp>
       <p:graphicFrame>
         <p:nvGraphicFramePr>
           <p:cNvPr id="3" name="Object 2"/>
@@ -22367,20 +22305,20 @@
           <p:nvPr>
             <p:extLst>
               <p:ext uri="{D42A27DB-BD31-4B8C-83A1-F6EECF244321}">
-                <p14:modId xmlns:p14="http://schemas.microsoft.com/office/powerpoint/2010/main" val="920746296"/>
+                <p14:modId xmlns:p14="http://schemas.microsoft.com/office/powerpoint/2010/main" val="1650290320"/>
               </p:ext>
             </p:extLst>
           </p:nvPr>
         </p:nvGraphicFramePr>
         <p:xfrm>
-          <a:off x="2411413" y="1628775"/>
+          <a:off x="2411760" y="1628800"/>
           <a:ext cx="7324725" cy="4010025"/>
         </p:xfrm>
         <a:graphic>
           <a:graphicData uri="http://schemas.openxmlformats.org/presentationml/2006/ole">
             <mc:AlternateContent xmlns:mc="http://schemas.openxmlformats.org/markup-compatibility/2006">
               <mc:Choice xmlns:v="urn:schemas-microsoft-com:vml" Requires="v">
-                <p:oleObj spid="_x0000_s4107" name="Worksheet" r:id="rId4" imgW="7324655" imgH="4010040" progId="Excel.Sheet.12">
+                <p:oleObj spid="_x0000_s4112" name="Worksheet" r:id="rId4" imgW="7324655" imgH="4010040" progId="Excel.Sheet.12">
                   <p:embed/>
                 </p:oleObj>
               </mc:Choice>
@@ -22396,13 +22334,7 @@
                       <p:nvPr/>
                     </p:nvPicPr>
                     <p:blipFill>
-                      <a:blip r:embed="rId5">
-                        <a:extLst>
-                          <a:ext uri="{28A0092B-C50C-407E-A947-70E740481C1C}">
-                            <a14:useLocalDpi xmlns:a14="http://schemas.microsoft.com/office/drawing/2010/main" val="0"/>
-                          </a:ext>
-                        </a:extLst>
-                      </a:blip>
+                      <a:blip r:embed="rId5"/>
                       <a:srcRect/>
                       <a:stretch>
                         <a:fillRect/>
@@ -22410,7 +22342,7 @@
                     </p:blipFill>
                     <p:spPr bwMode="auto">
                       <a:xfrm>
-                        <a:off x="2411413" y="1628775"/>
+                        <a:off x="2411760" y="1628800"/>
                         <a:ext cx="7324725" cy="4010025"/>
                       </a:xfrm>
                       <a:prstGeom prst="rect">
@@ -22447,6 +22379,91 @@
           </a:graphicData>
         </a:graphic>
       </p:graphicFrame>
+      <p:sp>
+        <p:nvSpPr>
+          <p:cNvPr id="11" name="TextBox 10"/>
+          <p:cNvSpPr txBox="1"/>
+          <p:nvPr/>
+        </p:nvSpPr>
+        <p:spPr>
+          <a:xfrm>
+            <a:off x="1043608" y="5373216"/>
+            <a:ext cx="7857279" cy="1569660"/>
+          </a:xfrm>
+          <a:prstGeom prst="rect">
+            <a:avLst/>
+          </a:prstGeom>
+          <a:noFill/>
+        </p:spPr>
+        <p:txBody>
+          <a:bodyPr wrap="none" rtlCol="0">
+            <a:spAutoFit/>
+          </a:bodyPr>
+          <a:lstStyle/>
+          <a:p>
+            <a:r>
+              <a:rPr lang="en-US" dirty="0" smtClean="0"/>
+              <a:t>Though only </a:t>
+            </a:r>
+            <a:r>
+              <a:rPr lang="en-US" dirty="0" err="1" smtClean="0"/>
+              <a:t>Geneious</a:t>
+            </a:r>
+            <a:r>
+              <a:rPr lang="en-US" dirty="0" smtClean="0"/>
+              <a:t> provides </a:t>
+            </a:r>
+            <a:r>
+              <a:rPr lang="en-US" dirty="0" err="1" smtClean="0"/>
+              <a:t>Aquilaria</a:t>
+            </a:r>
+            <a:r>
+              <a:rPr lang="en-US" dirty="0" smtClean="0"/>
+              <a:t> in this sample,</a:t>
+            </a:r>
+          </a:p>
+          <a:p>
+            <a:r>
+              <a:rPr lang="en-US" dirty="0" smtClean="0"/>
+              <a:t>All others hit </a:t>
+            </a:r>
+            <a:r>
+              <a:rPr lang="en-US" dirty="0" smtClean="0"/>
+              <a:t>on </a:t>
+            </a:r>
+            <a:r>
+              <a:rPr lang="en-US" dirty="0" err="1" smtClean="0"/>
+              <a:t>contig</a:t>
+            </a:r>
+            <a:r>
+              <a:rPr lang="en-US" dirty="0" smtClean="0"/>
+              <a:t> 5</a:t>
+            </a:r>
+            <a:r>
+              <a:rPr lang="en-US" dirty="0" smtClean="0"/>
+              <a:t>. </a:t>
+            </a:r>
+            <a:r>
+              <a:rPr lang="en-US" dirty="0" err="1" smtClean="0"/>
+              <a:t>Geneious</a:t>
+            </a:r>
+            <a:r>
+              <a:rPr lang="en-US" dirty="0" smtClean="0"/>
+              <a:t> is doing something</a:t>
+            </a:r>
+          </a:p>
+          <a:p>
+            <a:r>
+              <a:rPr lang="en-US" dirty="0" smtClean="0"/>
+              <a:t>different.</a:t>
+            </a:r>
+            <a:endParaRPr lang="en-US" dirty="0" smtClean="0"/>
+          </a:p>
+          <a:p>
+            <a:endParaRPr lang="en-US" dirty="0"/>
+          </a:p>
+        </p:txBody>
+      </p:sp>
     </p:spTree>
   </p:cSld>
   <p:clrMapOvr>
@@ -22937,76 +22954,6 @@
           </a:p>
         </p:txBody>
       </p:sp>
-      <p:graphicFrame>
-        <p:nvGraphicFramePr>
-          <p:cNvPr id="4100" name="Object 4"/>
-          <p:cNvGraphicFramePr>
-            <a:graphicFrameLocks noChangeAspect="1"/>
-          </p:cNvGraphicFramePr>
-          <p:nvPr>
-            <p:extLst>
-              <p:ext uri="{D42A27DB-BD31-4B8C-83A1-F6EECF244321}">
-                <p14:modId xmlns:p14="http://schemas.microsoft.com/office/powerpoint/2010/main" val="920746296"/>
-              </p:ext>
-            </p:extLst>
-          </p:nvPr>
-        </p:nvGraphicFramePr>
-        <p:xfrm>
-          <a:off x="2411413" y="1628775"/>
-          <a:ext cx="7324725" cy="4010025"/>
-        </p:xfrm>
-        <a:graphic>
-          <a:graphicData uri="http://schemas.openxmlformats.org/presentationml/2006/ole">
-            <mc:AlternateContent xmlns:mc="http://schemas.openxmlformats.org/markup-compatibility/2006">
-              <mc:Choice xmlns:v="urn:schemas-microsoft-com:vml" Requires="v">
-                <p:oleObj spid="_x0000_s8197" name="Worksheet" r:id="rId4" imgW="7324655" imgH="4010040" progId="Excel.Sheet.12">
-                  <p:embed/>
-                </p:oleObj>
-              </mc:Choice>
-              <mc:Fallback>
-                <p:oleObj name="Worksheet" r:id="rId4" imgW="7324655" imgH="4010040" progId="Excel.Sheet.12">
-                  <p:embed/>
-                  <p:pic>
-                    <p:nvPicPr>
-                      <p:cNvPr id="0" name=""/>
-                      <p:cNvPicPr>
-                        <a:picLocks noChangeAspect="1" noChangeArrowheads="1"/>
-                      </p:cNvPicPr>
-                      <p:nvPr/>
-                    </p:nvPicPr>
-                    <p:blipFill>
-                      <a:blip r:embed="rId5"/>
-                      <a:srcRect/>
-                      <a:stretch>
-                        <a:fillRect/>
-                      </a:stretch>
-                    </p:blipFill>
-                    <p:spPr bwMode="auto">
-                      <a:xfrm>
-                        <a:off x="2411413" y="1628775"/>
-                        <a:ext cx="7324725" cy="4010025"/>
-                      </a:xfrm>
-                      <a:prstGeom prst="rect">
-                        <a:avLst/>
-                      </a:prstGeom>
-                      <a:noFill/>
-                      <a:extLst>
-                        <a:ext uri="{909E8E84-426E-40DD-AFC4-6F175D3DCCD1}">
-                          <a14:hiddenFill xmlns:a14="http://schemas.microsoft.com/office/drawing/2010/main">
-                            <a:solidFill>
-                              <a:srgbClr val="FFFFFF"/>
-                            </a:solidFill>
-                          </a14:hiddenFill>
-                        </a:ext>
-                      </a:extLst>
-                    </p:spPr>
-                  </p:pic>
-                </p:oleObj>
-              </mc:Fallback>
-            </mc:AlternateContent>
-          </a:graphicData>
-        </a:graphic>
-      </p:graphicFrame>
       <p:sp>
         <p:nvSpPr>
           <p:cNvPr id="2" name="TextBox 1"/>
@@ -23016,7 +22963,7 @@
         <p:spPr>
           <a:xfrm>
             <a:off x="1043608" y="5373216"/>
-            <a:ext cx="7857279" cy="1200329"/>
+            <a:ext cx="7857279" cy="1569660"/>
           </a:xfrm>
           <a:prstGeom prst="rect">
             <a:avLst/>
@@ -23053,7 +23000,11 @@
           <a:p>
             <a:r>
               <a:rPr lang="en-US" dirty="0" smtClean="0"/>
-              <a:t> CITES-checker finds that exact hit on </a:t>
+              <a:t>All others hit </a:t>
+            </a:r>
+            <a:r>
+              <a:rPr lang="en-US" dirty="0" smtClean="0"/>
+              <a:t>on </a:t>
             </a:r>
             <a:r>
               <a:rPr lang="en-US" dirty="0" err="1" smtClean="0"/>
@@ -23061,8 +23012,27 @@
             </a:r>
             <a:r>
               <a:rPr lang="en-US" dirty="0" smtClean="0"/>
-              <a:t> 5.</a:t>
-            </a:r>
+              <a:t> 5</a:t>
+            </a:r>
+            <a:r>
+              <a:rPr lang="en-US" dirty="0" smtClean="0"/>
+              <a:t>. </a:t>
+            </a:r>
+            <a:r>
+              <a:rPr lang="en-US" dirty="0" err="1" smtClean="0"/>
+              <a:t>Geneious</a:t>
+            </a:r>
+            <a:r>
+              <a:rPr lang="en-US" dirty="0" smtClean="0"/>
+              <a:t> is doing something</a:t>
+            </a:r>
+          </a:p>
+          <a:p>
+            <a:r>
+              <a:rPr lang="en-US" dirty="0" smtClean="0"/>
+              <a:t>different.</a:t>
+            </a:r>
+            <a:endParaRPr lang="en-US" dirty="0" smtClean="0"/>
           </a:p>
           <a:p>
             <a:endParaRPr lang="en-US" dirty="0"/>
@@ -23109,6 +23079,89 @@
           </a:p>
         </p:txBody>
       </p:sp>
+      <p:graphicFrame>
+        <p:nvGraphicFramePr>
+          <p:cNvPr id="5" name="Object 4"/>
+          <p:cNvGraphicFramePr>
+            <a:graphicFrameLocks noChangeAspect="1"/>
+          </p:cNvGraphicFramePr>
+          <p:nvPr>
+            <p:extLst>
+              <p:ext uri="{D42A27DB-BD31-4B8C-83A1-F6EECF244321}">
+                <p14:modId xmlns:p14="http://schemas.microsoft.com/office/powerpoint/2010/main" val="4141394051"/>
+              </p:ext>
+            </p:extLst>
+          </p:nvPr>
+        </p:nvGraphicFramePr>
+        <p:xfrm>
+          <a:off x="2411413" y="1628775"/>
+          <a:ext cx="7324725" cy="4010025"/>
+        </p:xfrm>
+        <a:graphic>
+          <a:graphicData uri="http://schemas.openxmlformats.org/presentationml/2006/ole">
+            <mc:AlternateContent xmlns:mc="http://schemas.openxmlformats.org/markup-compatibility/2006">
+              <mc:Choice xmlns:v="urn:schemas-microsoft-com:vml" Requires="v">
+                <p:oleObj spid="_x0000_s8203" name="Worksheet" r:id="rId4" imgW="7324655" imgH="4010040" progId="Excel.Sheet.12">
+                  <p:embed/>
+                </p:oleObj>
+              </mc:Choice>
+              <mc:Fallback>
+                <p:oleObj name="Worksheet" r:id="rId4" imgW="7324655" imgH="4010040" progId="Excel.Sheet.12">
+                  <p:embed/>
+                  <p:pic>
+                    <p:nvPicPr>
+                      <p:cNvPr id="0" name="Object 2"/>
+                      <p:cNvPicPr>
+                        <a:picLocks noChangeAspect="1" noChangeArrowheads="1"/>
+                      </p:cNvPicPr>
+                      <p:nvPr/>
+                    </p:nvPicPr>
+                    <p:blipFill>
+                      <a:blip r:embed="rId5"/>
+                      <a:srcRect/>
+                      <a:stretch>
+                        <a:fillRect/>
+                      </a:stretch>
+                    </p:blipFill>
+                    <p:spPr bwMode="auto">
+                      <a:xfrm>
+                        <a:off x="2411413" y="1628775"/>
+                        <a:ext cx="7324725" cy="4010025"/>
+                      </a:xfrm>
+                      <a:prstGeom prst="rect">
+                        <a:avLst/>
+                      </a:prstGeom>
+                      <a:noFill/>
+                      <a:ln>
+                        <a:noFill/>
+                      </a:ln>
+                      <a:extLst>
+                        <a:ext uri="{909E8E84-426E-40DD-AFC4-6F175D3DCCD1}">
+                          <a14:hiddenFill xmlns:a14="http://schemas.microsoft.com/office/drawing/2010/main">
+                            <a:solidFill>
+                              <a:srgbClr val="FFFFFF"/>
+                            </a:solidFill>
+                          </a14:hiddenFill>
+                        </a:ext>
+                        <a:ext uri="{91240B29-F687-4F45-9708-019B960494DF}">
+                          <a14:hiddenLine xmlns:a14="http://schemas.microsoft.com/office/drawing/2010/main" w="9525">
+                            <a:solidFill>
+                              <a:srgbClr val="000000"/>
+                            </a:solidFill>
+                            <a:miter lim="800000"/>
+                            <a:headEnd/>
+                            <a:tailEnd/>
+                          </a14:hiddenLine>
+                        </a:ext>
+                      </a:extLst>
+                    </p:spPr>
+                  </p:pic>
+                </p:oleObj>
+              </mc:Fallback>
+            </mc:AlternateContent>
+          </a:graphicData>
+        </a:graphic>
+      </p:graphicFrame>
     </p:spTree>
     <p:extLst>
       <p:ext uri="{BB962C8B-B14F-4D97-AF65-F5344CB8AC3E}">
@@ -23563,7 +23616,7 @@
           <p:nvPr>
             <p:extLst>
               <p:ext uri="{D42A27DB-BD31-4B8C-83A1-F6EECF244321}">
-                <p14:modId xmlns:p14="http://schemas.microsoft.com/office/powerpoint/2010/main" val="3450395534"/>
+                <p14:modId xmlns:p14="http://schemas.microsoft.com/office/powerpoint/2010/main" val="3391917162"/>
               </p:ext>
             </p:extLst>
           </p:nvPr>
@@ -23576,7 +23629,7 @@
           <a:graphicData uri="http://schemas.openxmlformats.org/presentationml/2006/ole">
             <mc:AlternateContent xmlns:mc="http://schemas.openxmlformats.org/markup-compatibility/2006">
               <mc:Choice xmlns:v="urn:schemas-microsoft-com:vml" Requires="v">
-                <p:oleObj spid="_x0000_s9220" name="Worksheet" r:id="rId4" imgW="7324655" imgH="4010040" progId="Excel.Sheet.12">
+                <p:oleObj spid="_x0000_s9225" name="Worksheet" r:id="rId4" imgW="7324655" imgH="4010040" progId="Excel.Sheet.12">
                   <p:embed/>
                 </p:oleObj>
               </mc:Choice>
@@ -23959,16 +24012,62 @@
           </a:p>
         </p:txBody>
       </p:sp>
+      <p:sp>
+        <p:nvSpPr>
+          <p:cNvPr id="4" name="TextBox 3"/>
+          <p:cNvSpPr txBox="1"/>
+          <p:nvPr/>
+        </p:nvSpPr>
+        <p:spPr>
+          <a:xfrm>
+            <a:off x="251520" y="4869160"/>
+            <a:ext cx="9073008" cy="830997"/>
+          </a:xfrm>
+          <a:prstGeom prst="rect">
+            <a:avLst/>
+          </a:prstGeom>
+          <a:noFill/>
+        </p:spPr>
+        <p:txBody>
+          <a:bodyPr wrap="square" rtlCol="0">
+            <a:spAutoFit/>
+          </a:bodyPr>
+          <a:lstStyle/>
+          <a:p>
+            <a:r>
+              <a:rPr lang="en-US" dirty="0" smtClean="0"/>
+              <a:t>Again </a:t>
+            </a:r>
+            <a:r>
+              <a:rPr lang="en-US" dirty="0" err="1" smtClean="0"/>
+              <a:t>Geneious</a:t>
+            </a:r>
+            <a:r>
+              <a:rPr lang="en-US" dirty="0" smtClean="0"/>
+              <a:t> does not find the hit on </a:t>
+            </a:r>
+            <a:r>
+              <a:rPr lang="en-US" dirty="0" err="1" smtClean="0"/>
+              <a:t>contig</a:t>
+            </a:r>
+            <a:r>
+              <a:rPr lang="en-US" dirty="0" smtClean="0"/>
+              <a:t> 5, but does find it on 13 instead.</a:t>
+            </a:r>
+            <a:endParaRPr lang="en-US" dirty="0"/>
+          </a:p>
+        </p:txBody>
+      </p:sp>
       <p:graphicFrame>
         <p:nvGraphicFramePr>
-          <p:cNvPr id="3" name="Object 2"/>
+          <p:cNvPr id="5" name="Object 4"/>
           <p:cNvGraphicFramePr>
             <a:graphicFrameLocks noChangeAspect="1"/>
           </p:cNvGraphicFramePr>
           <p:nvPr>
             <p:extLst>
               <p:ext uri="{D42A27DB-BD31-4B8C-83A1-F6EECF244321}">
-                <p14:modId xmlns:p14="http://schemas.microsoft.com/office/powerpoint/2010/main" val="3450395534"/>
+                <p14:modId xmlns:p14="http://schemas.microsoft.com/office/powerpoint/2010/main" val="3391917162"/>
               </p:ext>
             </p:extLst>
           </p:nvPr>
@@ -23981,7 +24080,7 @@
           <a:graphicData uri="http://schemas.openxmlformats.org/presentationml/2006/ole">
             <mc:AlternateContent xmlns:mc="http://schemas.openxmlformats.org/markup-compatibility/2006">
               <mc:Choice xmlns:v="urn:schemas-microsoft-com:vml" Requires="v">
-                <p:oleObj spid="_x0000_s7177" name="Worksheet" r:id="rId4" imgW="7324655" imgH="4010040" progId="Excel.Sheet.12">
+                <p:oleObj spid="_x0000_s7182" name="Worksheet" r:id="rId4" imgW="7324655" imgH="4010040" progId="Excel.Sheet.12">
                   <p:embed/>
                 </p:oleObj>
               </mc:Choice>
@@ -24048,52 +24147,6 @@
           </a:graphicData>
         </a:graphic>
       </p:graphicFrame>
-      <p:sp>
-        <p:nvSpPr>
-          <p:cNvPr id="4" name="TextBox 3"/>
-          <p:cNvSpPr txBox="1"/>
-          <p:nvPr/>
-        </p:nvSpPr>
-        <p:spPr>
-          <a:xfrm>
-            <a:off x="251520" y="4869160"/>
-            <a:ext cx="9073008" cy="830997"/>
-          </a:xfrm>
-          <a:prstGeom prst="rect">
-            <a:avLst/>
-          </a:prstGeom>
-          <a:noFill/>
-        </p:spPr>
-        <p:txBody>
-          <a:bodyPr wrap="square" rtlCol="0">
-            <a:spAutoFit/>
-          </a:bodyPr>
-          <a:lstStyle/>
-          <a:p>
-            <a:r>
-              <a:rPr lang="en-US" dirty="0" smtClean="0"/>
-              <a:t>Again, CITES-checker does not list the </a:t>
-            </a:r>
-            <a:r>
-              <a:rPr lang="en-US" dirty="0" err="1" smtClean="0"/>
-              <a:t>Aquilaria</a:t>
-            </a:r>
-            <a:r>
-              <a:rPr lang="en-US" dirty="0" smtClean="0"/>
-              <a:t> hit; however, CITES-checker still finds the exact same hit on </a:t>
-            </a:r>
-            <a:r>
-              <a:rPr lang="en-US" dirty="0" err="1" smtClean="0"/>
-              <a:t>contig</a:t>
-            </a:r>
-            <a:r>
-              <a:rPr lang="en-US" dirty="0" smtClean="0"/>
-              <a:t> 5 instead.</a:t>
-            </a:r>
-            <a:endParaRPr lang="en-US" dirty="0"/>
-          </a:p>
-        </p:txBody>
-      </p:sp>
     </p:spTree>
   </p:cSld>
   <p:clrMapOvr>

</xml_diff>